<commit_message>
Revisions per HLD re: tracking specimen disease status
</commit_message>
<xml_diff>
--- a/NCH-PEDMATCH - Integration Walkthrough.pptx
+++ b/NCH-PEDMATCH - Integration Walkthrough.pptx
@@ -7,12 +7,12 @@
   <p:sldIdLst>
     <p:sldId id="256" r:id="rId2"/>
     <p:sldId id="260" r:id="rId3"/>
-    <p:sldId id="257" r:id="rId4"/>
-    <p:sldId id="262" r:id="rId5"/>
-    <p:sldId id="263" r:id="rId6"/>
-    <p:sldId id="261" r:id="rId7"/>
-    <p:sldId id="258" r:id="rId8"/>
-    <p:sldId id="259" r:id="rId9"/>
+    <p:sldId id="264" r:id="rId4"/>
+    <p:sldId id="266" r:id="rId5"/>
+    <p:sldId id="267" r:id="rId6"/>
+    <p:sldId id="257" r:id="rId7"/>
+    <p:sldId id="262" r:id="rId8"/>
+    <p:sldId id="263" r:id="rId9"/>
   </p:sldIdLst>
   <p:sldSz cx="9144000" cy="6858000" type="screen4x3"/>
   <p:notesSz cx="6858000" cy="9144000"/>
@@ -295,7 +295,7 @@
           <a:p>
             <a:fld id="{10589FC0-A008-4DEA-8067-226D6B8CA3BC}" type="datetimeFigureOut">
               <a:rPr lang="en-US" smtClean="0"/>
-              <a:t>4/25/2016</a:t>
+              <a:t>5/4/2016</a:t>
             </a:fld>
             <a:endParaRPr lang="en-US"/>
           </a:p>
@@ -465,7 +465,7 @@
           <a:p>
             <a:fld id="{10589FC0-A008-4DEA-8067-226D6B8CA3BC}" type="datetimeFigureOut">
               <a:rPr lang="en-US" smtClean="0"/>
-              <a:t>4/25/2016</a:t>
+              <a:t>5/4/2016</a:t>
             </a:fld>
             <a:endParaRPr lang="en-US"/>
           </a:p>
@@ -645,7 +645,7 @@
           <a:p>
             <a:fld id="{10589FC0-A008-4DEA-8067-226D6B8CA3BC}" type="datetimeFigureOut">
               <a:rPr lang="en-US" smtClean="0"/>
-              <a:t>4/25/2016</a:t>
+              <a:t>5/4/2016</a:t>
             </a:fld>
             <a:endParaRPr lang="en-US"/>
           </a:p>
@@ -815,7 +815,7 @@
           <a:p>
             <a:fld id="{10589FC0-A008-4DEA-8067-226D6B8CA3BC}" type="datetimeFigureOut">
               <a:rPr lang="en-US" smtClean="0"/>
-              <a:t>4/25/2016</a:t>
+              <a:t>5/4/2016</a:t>
             </a:fld>
             <a:endParaRPr lang="en-US"/>
           </a:p>
@@ -1061,7 +1061,7 @@
           <a:p>
             <a:fld id="{10589FC0-A008-4DEA-8067-226D6B8CA3BC}" type="datetimeFigureOut">
               <a:rPr lang="en-US" smtClean="0"/>
-              <a:t>4/25/2016</a:t>
+              <a:t>5/4/2016</a:t>
             </a:fld>
             <a:endParaRPr lang="en-US"/>
           </a:p>
@@ -1349,7 +1349,7 @@
           <a:p>
             <a:fld id="{10589FC0-A008-4DEA-8067-226D6B8CA3BC}" type="datetimeFigureOut">
               <a:rPr lang="en-US" smtClean="0"/>
-              <a:t>4/25/2016</a:t>
+              <a:t>5/4/2016</a:t>
             </a:fld>
             <a:endParaRPr lang="en-US"/>
           </a:p>
@@ -1771,7 +1771,7 @@
           <a:p>
             <a:fld id="{10589FC0-A008-4DEA-8067-226D6B8CA3BC}" type="datetimeFigureOut">
               <a:rPr lang="en-US" smtClean="0"/>
-              <a:t>4/25/2016</a:t>
+              <a:t>5/4/2016</a:t>
             </a:fld>
             <a:endParaRPr lang="en-US"/>
           </a:p>
@@ -1889,7 +1889,7 @@
           <a:p>
             <a:fld id="{10589FC0-A008-4DEA-8067-226D6B8CA3BC}" type="datetimeFigureOut">
               <a:rPr lang="en-US" smtClean="0"/>
-              <a:t>4/25/2016</a:t>
+              <a:t>5/4/2016</a:t>
             </a:fld>
             <a:endParaRPr lang="en-US"/>
           </a:p>
@@ -1984,7 +1984,7 @@
           <a:p>
             <a:fld id="{10589FC0-A008-4DEA-8067-226D6B8CA3BC}" type="datetimeFigureOut">
               <a:rPr lang="en-US" smtClean="0"/>
-              <a:t>4/25/2016</a:t>
+              <a:t>5/4/2016</a:t>
             </a:fld>
             <a:endParaRPr lang="en-US"/>
           </a:p>
@@ -2261,7 +2261,7 @@
           <a:p>
             <a:fld id="{10589FC0-A008-4DEA-8067-226D6B8CA3BC}" type="datetimeFigureOut">
               <a:rPr lang="en-US" smtClean="0"/>
-              <a:t>4/25/2016</a:t>
+              <a:t>5/4/2016</a:t>
             </a:fld>
             <a:endParaRPr lang="en-US"/>
           </a:p>
@@ -2514,7 +2514,7 @@
           <a:p>
             <a:fld id="{10589FC0-A008-4DEA-8067-226D6B8CA3BC}" type="datetimeFigureOut">
               <a:rPr lang="en-US" smtClean="0"/>
-              <a:t>4/25/2016</a:t>
+              <a:t>5/4/2016</a:t>
             </a:fld>
             <a:endParaRPr lang="en-US"/>
           </a:p>
@@ -2727,7 +2727,7 @@
           <a:p>
             <a:fld id="{10589FC0-A008-4DEA-8067-226D6B8CA3BC}" type="datetimeFigureOut">
               <a:rPr lang="en-US" smtClean="0"/>
-              <a:t>4/25/2016</a:t>
+              <a:t>5/4/2016</a:t>
             </a:fld>
             <a:endParaRPr lang="en-US"/>
           </a:p>
@@ -3119,7 +3119,11 @@
           <a:p>
             <a:r>
               <a:rPr lang="en-US" dirty="0" smtClean="0"/>
-              <a:t>BPC - PEDMATCH</a:t>
+              <a:t>NCH - </a:t>
+            </a:r>
+            <a:r>
+              <a:rPr lang="en-US" dirty="0" smtClean="0"/>
+              <a:t>PEDMATCH</a:t>
             </a:r>
             <a:endParaRPr lang="en-US" dirty="0"/>
           </a:p>
@@ -3142,9 +3146,19 @@
           <a:p>
             <a:r>
               <a:rPr lang="en-US" dirty="0" smtClean="0"/>
-              <a:t>Integration Overview</a:t>
-            </a:r>
-            <a:endParaRPr lang="en-US" dirty="0"/>
+              <a:t>Integration </a:t>
+            </a:r>
+            <a:r>
+              <a:rPr lang="en-US" dirty="0" smtClean="0"/>
+              <a:t>Overview</a:t>
+            </a:r>
+          </a:p>
+          <a:p>
+            <a:r>
+              <a:rPr lang="en-US" sz="2000" i="1" dirty="0" smtClean="0"/>
+              <a:t>Last revised, 5/4/2016, ESK</a:t>
+            </a:r>
+            <a:endParaRPr lang="en-US" sz="2000" i="1" dirty="0"/>
           </a:p>
         </p:txBody>
       </p:sp>
@@ -3218,30 +3232,51 @@
             <p:ph idx="1"/>
           </p:nvPr>
         </p:nvSpPr>
-        <p:spPr/>
+        <p:spPr>
+          <a:xfrm>
+            <a:off x="304800" y="1600200"/>
+            <a:ext cx="8534400" cy="4525963"/>
+          </a:xfrm>
+        </p:spPr>
         <p:txBody>
           <a:bodyPr>
-            <a:normAutofit fontScale="92500"/>
+            <a:normAutofit fontScale="85000" lnSpcReduction="10000"/>
           </a:bodyPr>
           <a:lstStyle/>
           <a:p>
             <a:r>
               <a:rPr lang="en-US" dirty="0" smtClean="0"/>
-              <a:t>Collection Grouping ID (“CGID”)</a:t>
+              <a:t>Collection Grouping ID (“CGID</a:t>
+            </a:r>
+            <a:r>
+              <a:rPr lang="en-US" dirty="0" smtClean="0"/>
+              <a:t>”)</a:t>
             </a:r>
           </a:p>
           <a:p>
             <a:pPr lvl="1"/>
             <a:r>
               <a:rPr lang="en-US" dirty="0" smtClean="0"/>
-              <a:t>Shared by specimens of a given type taken from a patient in one encounter/surgery/etc. </a:t>
+              <a:t>Shared </a:t>
+            </a:r>
+            <a:r>
+              <a:rPr lang="en-US" dirty="0" smtClean="0"/>
+              <a:t>by specimens of a given type taken from a patient in one </a:t>
+            </a:r>
+            <a:r>
+              <a:rPr lang="en-US" dirty="0" smtClean="0"/>
+              <a:t>encounter/surgery/draw/etc.</a:t>
             </a:r>
           </a:p>
           <a:p>
             <a:pPr lvl="1"/>
             <a:r>
               <a:rPr lang="en-US" dirty="0" smtClean="0"/>
-              <a:t>Specimens sent to MATCHBOX will include the CGID</a:t>
+              <a:t>Same CGID means s</a:t>
+            </a:r>
+            <a:r>
+              <a:rPr lang="en-US" dirty="0" smtClean="0"/>
+              <a:t>pecimens are “equivalent” from a PED-MATCH standpoint</a:t>
             </a:r>
             <a:endParaRPr lang="en-US" dirty="0" smtClean="0"/>
           </a:p>
@@ -3249,8 +3284,24 @@
             <a:pPr lvl="1"/>
             <a:r>
               <a:rPr lang="en-US" dirty="0" smtClean="0"/>
-              <a:t>CGIDs will be “inherited” by the various aliquots/derivatives from the original specimens</a:t>
-            </a:r>
+              <a:t>Specimen messages </a:t>
+            </a:r>
+            <a:r>
+              <a:rPr lang="en-US" dirty="0" smtClean="0"/>
+              <a:t>sent to MATCHBOX will include the CGID</a:t>
+            </a:r>
+          </a:p>
+          <a:p>
+            <a:pPr lvl="1"/>
+            <a:r>
+              <a:rPr lang="en-US" dirty="0" smtClean="0"/>
+              <a:t>CGIDs will be “inherited” by the various aliquots/derivatives from the original </a:t>
+            </a:r>
+            <a:r>
+              <a:rPr lang="en-US" dirty="0" smtClean="0"/>
+              <a:t>specimens</a:t>
+            </a:r>
+            <a:endParaRPr lang="en-US" dirty="0" smtClean="0"/>
           </a:p>
           <a:p>
             <a:pPr lvl="1"/>
@@ -3311,225 +3362,584 @@
         </p:nvSpPr>
         <p:spPr/>
         <p:txBody>
+          <a:bodyPr/>
+          <a:lstStyle/>
+          <a:p>
+            <a:r>
+              <a:rPr lang="en-US" dirty="0" smtClean="0"/>
+              <a:t>Collection Grouping Examples</a:t>
+            </a:r>
+            <a:endParaRPr lang="en-US" dirty="0"/>
+          </a:p>
+        </p:txBody>
+      </p:sp>
+      <p:sp>
+        <p:nvSpPr>
+          <p:cNvPr id="3" name="Content Placeholder 2"/>
+          <p:cNvSpPr>
+            <a:spLocks noGrp="1"/>
+          </p:cNvSpPr>
+          <p:nvPr>
+            <p:ph idx="1"/>
+          </p:nvPr>
+        </p:nvSpPr>
+        <p:spPr/>
+        <p:txBody>
           <a:bodyPr>
             <a:normAutofit/>
           </a:bodyPr>
           <a:lstStyle/>
           <a:p>
             <a:r>
-              <a:rPr lang="en-US" sz="3600" dirty="0" smtClean="0"/>
-              <a:t>“Specimen Received” </a:t>
-            </a:r>
-            <a:r>
-              <a:rPr lang="en-US" sz="3600" dirty="0" smtClean="0"/>
-              <a:t>Integration Message</a:t>
-            </a:r>
-            <a:endParaRPr lang="en-US" sz="3600" dirty="0"/>
-          </a:p>
-        </p:txBody>
-      </p:sp>
-      <p:sp>
-        <p:nvSpPr>
-          <p:cNvPr id="3" name="Content Placeholder 2"/>
-          <p:cNvSpPr>
-            <a:spLocks noGrp="1"/>
-          </p:cNvSpPr>
-          <p:nvPr>
-            <p:ph idx="1"/>
-          </p:nvPr>
-        </p:nvSpPr>
-        <p:spPr/>
-        <p:txBody>
-          <a:bodyPr>
-            <a:normAutofit fontScale="77500" lnSpcReduction="20000"/>
+              <a:rPr lang="en-US" sz="2800" dirty="0" smtClean="0"/>
+              <a:t>Scenario 1</a:t>
+            </a:r>
+          </a:p>
+          <a:p>
+            <a:pPr lvl="1"/>
+            <a:r>
+              <a:rPr lang="en-US" sz="2000" dirty="0" smtClean="0"/>
+              <a:t>First two specimens grouped together because attributes match (“equivalent” from PED-MATCH standpoint); New (shared) CGID</a:t>
+            </a:r>
+          </a:p>
+          <a:p>
+            <a:pPr lvl="1"/>
+            <a:r>
+              <a:rPr lang="en-US" sz="2000" dirty="0" smtClean="0"/>
+              <a:t>Third specimen was collected separately from first two; New CGID</a:t>
+            </a:r>
+          </a:p>
+          <a:p>
+            <a:pPr lvl="1"/>
+            <a:r>
+              <a:rPr lang="en-US" sz="2000" dirty="0" smtClean="0"/>
+              <a:t>Fourth specimen differs by type; New CGID</a:t>
+            </a:r>
+          </a:p>
+        </p:txBody>
+      </p:sp>
+      <p:sp>
+        <p:nvSpPr>
+          <p:cNvPr id="4" name="Oval 3"/>
+          <p:cNvSpPr/>
+          <p:nvPr/>
+        </p:nvSpPr>
+        <p:spPr>
+          <a:xfrm>
+            <a:off x="2430106" y="4337400"/>
+            <a:ext cx="1295400" cy="533400"/>
+          </a:xfrm>
+          <a:prstGeom prst="ellipse">
+            <a:avLst/>
+          </a:prstGeom>
+        </p:spPr>
+        <p:style>
+          <a:lnRef idx="2">
+            <a:schemeClr val="accent1">
+              <a:shade val="50000"/>
+            </a:schemeClr>
+          </a:lnRef>
+          <a:fillRef idx="1">
+            <a:schemeClr val="accent1"/>
+          </a:fillRef>
+          <a:effectRef idx="0">
+            <a:schemeClr val="accent1"/>
+          </a:effectRef>
+          <a:fontRef idx="minor">
+            <a:schemeClr val="lt1"/>
+          </a:fontRef>
+        </p:style>
+        <p:txBody>
+          <a:bodyPr rtlCol="0" anchor="ctr"/>
+          <a:lstStyle/>
+          <a:p>
+            <a:pPr algn="ctr"/>
+            <a:r>
+              <a:rPr lang="en-US" sz="800" dirty="0" err="1" smtClean="0"/>
+              <a:t>Pt</a:t>
+            </a:r>
+            <a:r>
+              <a:rPr lang="en-US" sz="800" dirty="0" smtClean="0"/>
+              <a:t># 123, Blood, </a:t>
+            </a:r>
+          </a:p>
+          <a:p>
+            <a:pPr algn="ctr"/>
+            <a:r>
+              <a:rPr lang="en-US" sz="800" dirty="0" smtClean="0"/>
+              <a:t>Collected  10/15/16</a:t>
+            </a:r>
+            <a:endParaRPr lang="en-US" sz="800" dirty="0"/>
+          </a:p>
+        </p:txBody>
+      </p:sp>
+      <p:sp>
+        <p:nvSpPr>
+          <p:cNvPr id="5" name="Oval 4"/>
+          <p:cNvSpPr/>
+          <p:nvPr/>
+        </p:nvSpPr>
+        <p:spPr>
+          <a:xfrm>
+            <a:off x="3801706" y="4337400"/>
+            <a:ext cx="1295400" cy="533400"/>
+          </a:xfrm>
+          <a:prstGeom prst="ellipse">
+            <a:avLst/>
+          </a:prstGeom>
+        </p:spPr>
+        <p:style>
+          <a:lnRef idx="2">
+            <a:schemeClr val="accent1">
+              <a:shade val="50000"/>
+            </a:schemeClr>
+          </a:lnRef>
+          <a:fillRef idx="1">
+            <a:schemeClr val="accent1"/>
+          </a:fillRef>
+          <a:effectRef idx="0">
+            <a:schemeClr val="accent1"/>
+          </a:effectRef>
+          <a:fontRef idx="minor">
+            <a:schemeClr val="lt1"/>
+          </a:fontRef>
+        </p:style>
+        <p:txBody>
+          <a:bodyPr rtlCol="0" anchor="ctr"/>
+          <a:lstStyle/>
+          <a:p>
+            <a:pPr algn="ctr"/>
+            <a:r>
+              <a:rPr lang="en-US" sz="800" dirty="0" err="1" smtClean="0"/>
+              <a:t>Pt</a:t>
+            </a:r>
+            <a:r>
+              <a:rPr lang="en-US" sz="800" dirty="0" smtClean="0"/>
+              <a:t># 123, Blood, </a:t>
+            </a:r>
+          </a:p>
+          <a:p>
+            <a:pPr algn="ctr"/>
+            <a:r>
+              <a:rPr lang="en-US" sz="800" dirty="0" smtClean="0"/>
+              <a:t>Collected  10/15/16</a:t>
+            </a:r>
+            <a:endParaRPr lang="en-US" sz="800" dirty="0"/>
+          </a:p>
+        </p:txBody>
+      </p:sp>
+      <p:sp>
+        <p:nvSpPr>
+          <p:cNvPr id="6" name="Oval 5"/>
+          <p:cNvSpPr/>
+          <p:nvPr/>
+        </p:nvSpPr>
+        <p:spPr>
+          <a:xfrm>
+            <a:off x="5173306" y="4343400"/>
+            <a:ext cx="1295400" cy="533400"/>
+          </a:xfrm>
+          <a:prstGeom prst="ellipse">
+            <a:avLst/>
+          </a:prstGeom>
+        </p:spPr>
+        <p:style>
+          <a:lnRef idx="2">
+            <a:schemeClr val="accent1">
+              <a:shade val="50000"/>
+            </a:schemeClr>
+          </a:lnRef>
+          <a:fillRef idx="1">
+            <a:schemeClr val="accent1"/>
+          </a:fillRef>
+          <a:effectRef idx="0">
+            <a:schemeClr val="accent1"/>
+          </a:effectRef>
+          <a:fontRef idx="minor">
+            <a:schemeClr val="lt1"/>
+          </a:fontRef>
+        </p:style>
+        <p:txBody>
+          <a:bodyPr rtlCol="0" anchor="ctr"/>
+          <a:lstStyle/>
+          <a:p>
+            <a:pPr algn="ctr"/>
+            <a:r>
+              <a:rPr lang="en-US" sz="800" dirty="0" err="1" smtClean="0"/>
+              <a:t>Pt</a:t>
+            </a:r>
+            <a:r>
+              <a:rPr lang="en-US" sz="800" dirty="0" smtClean="0"/>
+              <a:t># 123, Blood, </a:t>
+            </a:r>
+          </a:p>
+          <a:p>
+            <a:pPr algn="ctr"/>
+            <a:r>
+              <a:rPr lang="en-US" sz="800" dirty="0" smtClean="0"/>
+              <a:t>Collected  10/30/16</a:t>
+            </a:r>
+            <a:endParaRPr lang="en-US" sz="800" dirty="0"/>
+          </a:p>
+        </p:txBody>
+      </p:sp>
+      <p:sp>
+        <p:nvSpPr>
+          <p:cNvPr id="7" name="Right Brace 6"/>
+          <p:cNvSpPr/>
+          <p:nvPr/>
+        </p:nvSpPr>
+        <p:spPr>
+          <a:xfrm rot="16200000">
+            <a:off x="3573106" y="2889600"/>
+            <a:ext cx="381000" cy="2667000"/>
+          </a:xfrm>
+          <a:prstGeom prst="rightBrace">
+            <a:avLst/>
+          </a:prstGeom>
+        </p:spPr>
+        <p:style>
+          <a:lnRef idx="1">
+            <a:schemeClr val="accent1"/>
+          </a:lnRef>
+          <a:fillRef idx="0">
+            <a:schemeClr val="accent1"/>
+          </a:fillRef>
+          <a:effectRef idx="0">
+            <a:schemeClr val="accent1"/>
+          </a:effectRef>
+          <a:fontRef idx="minor">
+            <a:schemeClr val="tx1"/>
+          </a:fontRef>
+        </p:style>
+        <p:txBody>
+          <a:bodyPr rtlCol="0" anchor="ctr"/>
+          <a:lstStyle/>
+          <a:p>
+            <a:pPr algn="ctr"/>
+            <a:endParaRPr lang="en-US"/>
+          </a:p>
+        </p:txBody>
+      </p:sp>
+      <p:sp>
+        <p:nvSpPr>
+          <p:cNvPr id="8" name="TextBox 7"/>
+          <p:cNvSpPr txBox="1"/>
+          <p:nvPr/>
+        </p:nvSpPr>
+        <p:spPr>
+          <a:xfrm>
+            <a:off x="3145712" y="3656066"/>
+            <a:ext cx="1235788" cy="369332"/>
+          </a:xfrm>
+          <a:prstGeom prst="rect">
+            <a:avLst/>
+          </a:prstGeom>
+          <a:noFill/>
+        </p:spPr>
+        <p:txBody>
+          <a:bodyPr wrap="none" rtlCol="0">
+            <a:spAutoFit/>
           </a:bodyPr>
           <a:lstStyle/>
           <a:p>
             <a:r>
-              <a:rPr lang="en-US" b="1" u="sng" dirty="0" smtClean="0"/>
-              <a:t>DIRECTION</a:t>
-            </a:r>
-            <a:r>
-              <a:rPr lang="en-US" dirty="0" smtClean="0"/>
-              <a:t>: Outbound from BPC to MATCHBOX</a:t>
-            </a:r>
-          </a:p>
-          <a:p>
-            <a:r>
-              <a:rPr lang="en-US" b="1" u="sng" dirty="0" smtClean="0"/>
-              <a:t>TIMING</a:t>
-            </a:r>
-            <a:r>
-              <a:rPr lang="en-US" dirty="0" smtClean="0"/>
-              <a:t>: Sent when new specimens of interest are detected in STARS</a:t>
-            </a:r>
-          </a:p>
-          <a:p>
-            <a:pPr lvl="1"/>
-            <a:r>
-              <a:rPr lang="en-US" dirty="0" smtClean="0"/>
-              <a:t>Specimen is accessioned under APEC1621</a:t>
-            </a:r>
-          </a:p>
-          <a:p>
-            <a:pPr lvl="1"/>
-            <a:r>
-              <a:rPr lang="en-US" dirty="0" smtClean="0"/>
-              <a:t>Patient is enrolled in APEC1621</a:t>
-            </a:r>
-          </a:p>
-          <a:p>
-            <a:pPr lvl="1"/>
-            <a:r>
-              <a:rPr lang="en-US" dirty="0" smtClean="0"/>
-              <a:t>Specimen type of Blood or Tumor Tissue</a:t>
-            </a:r>
-          </a:p>
-          <a:p>
-            <a:pPr lvl="1"/>
-            <a:r>
-              <a:rPr lang="en-US" dirty="0" smtClean="0"/>
-              <a:t>Accessioning paperwork QC is successful</a:t>
-            </a:r>
-          </a:p>
-          <a:p>
-            <a:r>
-              <a:rPr lang="en-US" b="1" u="sng" dirty="0" smtClean="0"/>
-              <a:t>CONTENT</a:t>
-            </a:r>
-            <a:r>
-              <a:rPr lang="en-US" dirty="0" smtClean="0"/>
-              <a:t>:</a:t>
-            </a:r>
-          </a:p>
-          <a:p>
-            <a:pPr lvl="1"/>
-            <a:r>
-              <a:rPr lang="en-US" dirty="0" smtClean="0"/>
-              <a:t>Technical Message Headers (</a:t>
-            </a:r>
-            <a:r>
-              <a:rPr lang="en-US" i="1" dirty="0" err="1" smtClean="0"/>
-              <a:t>msg_guid</a:t>
-            </a:r>
-            <a:r>
-              <a:rPr lang="en-US" dirty="0" smtClean="0"/>
-              <a:t>, </a:t>
-            </a:r>
-            <a:r>
-              <a:rPr lang="en-US" i="1" dirty="0" err="1" smtClean="0"/>
-              <a:t>msg_dttm</a:t>
-            </a:r>
-            <a:r>
-              <a:rPr lang="en-US" dirty="0" smtClean="0"/>
-              <a:t>)</a:t>
-            </a:r>
-          </a:p>
-          <a:p>
-            <a:pPr lvl="1"/>
-            <a:r>
-              <a:rPr lang="en-US" dirty="0" smtClean="0"/>
-              <a:t>List of specimens</a:t>
-            </a:r>
-          </a:p>
-          <a:p>
-            <a:pPr lvl="2"/>
-            <a:r>
-              <a:rPr lang="en-US" dirty="0" smtClean="0"/>
-              <a:t>PED-MATCH attributes (</a:t>
-            </a:r>
-            <a:r>
-              <a:rPr lang="en-US" i="1" dirty="0" err="1" smtClean="0"/>
-              <a:t>patient_id</a:t>
-            </a:r>
-            <a:r>
-              <a:rPr lang="en-US" dirty="0" smtClean="0"/>
-              <a:t>, </a:t>
-            </a:r>
-            <a:r>
-              <a:rPr lang="en-US" i="1" dirty="0" err="1" smtClean="0"/>
-              <a:t>collection_grouping_id</a:t>
-            </a:r>
-            <a:r>
-              <a:rPr lang="en-US" dirty="0" smtClean="0"/>
-              <a:t>, </a:t>
-            </a:r>
-            <a:r>
-              <a:rPr lang="en-US" i="1" dirty="0" smtClean="0"/>
-              <a:t>type</a:t>
-            </a:r>
-            <a:r>
-              <a:rPr lang="en-US" dirty="0" smtClean="0"/>
-              <a:t>)</a:t>
-            </a:r>
-          </a:p>
-          <a:p>
-            <a:pPr lvl="2"/>
-            <a:r>
-              <a:rPr lang="en-US" dirty="0" smtClean="0"/>
-              <a:t>Additional (troubleshooting) attributes (</a:t>
-            </a:r>
-            <a:r>
-              <a:rPr lang="en-US" i="1" dirty="0" err="1" smtClean="0"/>
-              <a:t>stars_patient_id</a:t>
-            </a:r>
-            <a:r>
-              <a:rPr lang="en-US" dirty="0" smtClean="0"/>
-              <a:t>, </a:t>
-            </a:r>
-            <a:r>
-              <a:rPr lang="en-US" i="1" dirty="0" err="1" smtClean="0"/>
-              <a:t>stars_specimen_id</a:t>
-            </a:r>
-            <a:r>
-              <a:rPr lang="en-US" dirty="0" smtClean="0"/>
-              <a:t>, </a:t>
-            </a:r>
-            <a:r>
-              <a:rPr lang="en-US" i="1" dirty="0" err="1" smtClean="0"/>
-              <a:t>stars_specimen_type</a:t>
-            </a:r>
-            <a:r>
-              <a:rPr lang="en-US" dirty="0" smtClean="0"/>
-              <a:t>, </a:t>
-            </a:r>
-            <a:r>
-              <a:rPr lang="en-US" i="1" dirty="0" err="1" smtClean="0"/>
-              <a:t>received_ts</a:t>
-            </a:r>
-            <a:r>
-              <a:rPr lang="en-US" dirty="0" smtClean="0"/>
-              <a:t>, </a:t>
-            </a:r>
-            <a:r>
-              <a:rPr lang="en-US" i="1" dirty="0" err="1" smtClean="0"/>
-              <a:t>qc_ts</a:t>
-            </a:r>
-            <a:r>
-              <a:rPr lang="en-US" dirty="0" smtClean="0"/>
-              <a:t>)</a:t>
-            </a:r>
-            <a:endParaRPr lang="en-US" dirty="0" smtClean="0"/>
+              <a:rPr lang="en-US" dirty="0" smtClean="0">
+                <a:solidFill>
+                  <a:schemeClr val="accent1"/>
+                </a:solidFill>
+              </a:rPr>
+              <a:t>CGID=1234</a:t>
+            </a:r>
+            <a:endParaRPr lang="en-US" dirty="0">
+              <a:solidFill>
+                <a:schemeClr val="accent1"/>
+              </a:solidFill>
+            </a:endParaRPr>
+          </a:p>
+        </p:txBody>
+      </p:sp>
+      <p:sp>
+        <p:nvSpPr>
+          <p:cNvPr id="9" name="Right Brace 8"/>
+          <p:cNvSpPr/>
+          <p:nvPr/>
+        </p:nvSpPr>
+        <p:spPr>
+          <a:xfrm rot="16200000">
+            <a:off x="5649556" y="3556350"/>
+            <a:ext cx="381000" cy="1333500"/>
+          </a:xfrm>
+          <a:prstGeom prst="rightBrace">
+            <a:avLst/>
+          </a:prstGeom>
+        </p:spPr>
+        <p:style>
+          <a:lnRef idx="1">
+            <a:schemeClr val="accent1"/>
+          </a:lnRef>
+          <a:fillRef idx="0">
+            <a:schemeClr val="accent1"/>
+          </a:fillRef>
+          <a:effectRef idx="0">
+            <a:schemeClr val="accent1"/>
+          </a:effectRef>
+          <a:fontRef idx="minor">
+            <a:schemeClr val="tx1"/>
+          </a:fontRef>
+        </p:style>
+        <p:txBody>
+          <a:bodyPr rtlCol="0" anchor="ctr"/>
+          <a:lstStyle/>
+          <a:p>
+            <a:pPr algn="ctr"/>
+            <a:endParaRPr lang="en-US"/>
+          </a:p>
+        </p:txBody>
+      </p:sp>
+      <p:sp>
+        <p:nvSpPr>
+          <p:cNvPr id="10" name="TextBox 9"/>
+          <p:cNvSpPr txBox="1"/>
+          <p:nvPr/>
+        </p:nvSpPr>
+        <p:spPr>
+          <a:xfrm>
+            <a:off x="5222162" y="3656066"/>
+            <a:ext cx="1235788" cy="369332"/>
+          </a:xfrm>
+          <a:prstGeom prst="rect">
+            <a:avLst/>
+          </a:prstGeom>
+          <a:noFill/>
+        </p:spPr>
+        <p:txBody>
+          <a:bodyPr wrap="none" rtlCol="0">
+            <a:spAutoFit/>
+          </a:bodyPr>
+          <a:lstStyle/>
+          <a:p>
+            <a:r>
+              <a:rPr lang="en-US" dirty="0" smtClean="0">
+                <a:solidFill>
+                  <a:schemeClr val="accent1"/>
+                </a:solidFill>
+              </a:rPr>
+              <a:t>CGID=1235</a:t>
+            </a:r>
+            <a:endParaRPr lang="en-US" dirty="0">
+              <a:solidFill>
+                <a:schemeClr val="accent1"/>
+              </a:solidFill>
+            </a:endParaRPr>
+          </a:p>
+        </p:txBody>
+      </p:sp>
+      <p:sp>
+        <p:nvSpPr>
+          <p:cNvPr id="19" name="Oval 18"/>
+          <p:cNvSpPr/>
+          <p:nvPr/>
+        </p:nvSpPr>
+        <p:spPr>
+          <a:xfrm>
+            <a:off x="6610350" y="4337400"/>
+            <a:ext cx="1295400" cy="533400"/>
+          </a:xfrm>
+          <a:prstGeom prst="ellipse">
+            <a:avLst/>
+          </a:prstGeom>
+        </p:spPr>
+        <p:style>
+          <a:lnRef idx="2">
+            <a:schemeClr val="accent1">
+              <a:shade val="50000"/>
+            </a:schemeClr>
+          </a:lnRef>
+          <a:fillRef idx="1">
+            <a:schemeClr val="accent1"/>
+          </a:fillRef>
+          <a:effectRef idx="0">
+            <a:schemeClr val="accent1"/>
+          </a:effectRef>
+          <a:fontRef idx="minor">
+            <a:schemeClr val="lt1"/>
+          </a:fontRef>
+        </p:style>
+        <p:txBody>
+          <a:bodyPr rtlCol="0" anchor="ctr"/>
+          <a:lstStyle/>
+          <a:p>
+            <a:pPr algn="ctr"/>
+            <a:r>
+              <a:rPr lang="en-US" sz="800" dirty="0" err="1" smtClean="0"/>
+              <a:t>Pt</a:t>
+            </a:r>
+            <a:r>
+              <a:rPr lang="en-US" sz="800" dirty="0" smtClean="0"/>
+              <a:t># 123, Tumor Tissue, Collected  10/15/16</a:t>
+            </a:r>
+            <a:endParaRPr lang="en-US" sz="800" dirty="0"/>
+          </a:p>
+        </p:txBody>
+      </p:sp>
+      <p:sp>
+        <p:nvSpPr>
+          <p:cNvPr id="20" name="Right Brace 19"/>
+          <p:cNvSpPr/>
+          <p:nvPr/>
+        </p:nvSpPr>
+        <p:spPr>
+          <a:xfrm rot="16200000">
+            <a:off x="7086600" y="3550350"/>
+            <a:ext cx="381000" cy="1333500"/>
+          </a:xfrm>
+          <a:prstGeom prst="rightBrace">
+            <a:avLst/>
+          </a:prstGeom>
+        </p:spPr>
+        <p:style>
+          <a:lnRef idx="1">
+            <a:schemeClr val="accent1"/>
+          </a:lnRef>
+          <a:fillRef idx="0">
+            <a:schemeClr val="accent1"/>
+          </a:fillRef>
+          <a:effectRef idx="0">
+            <a:schemeClr val="accent1"/>
+          </a:effectRef>
+          <a:fontRef idx="minor">
+            <a:schemeClr val="tx1"/>
+          </a:fontRef>
+        </p:style>
+        <p:txBody>
+          <a:bodyPr rtlCol="0" anchor="ctr"/>
+          <a:lstStyle/>
+          <a:p>
+            <a:pPr algn="ctr"/>
+            <a:endParaRPr lang="en-US"/>
+          </a:p>
+        </p:txBody>
+      </p:sp>
+      <p:sp>
+        <p:nvSpPr>
+          <p:cNvPr id="21" name="TextBox 20"/>
+          <p:cNvSpPr txBox="1"/>
+          <p:nvPr/>
+        </p:nvSpPr>
+        <p:spPr>
+          <a:xfrm>
+            <a:off x="6659206" y="3650066"/>
+            <a:ext cx="1235788" cy="369332"/>
+          </a:xfrm>
+          <a:prstGeom prst="rect">
+            <a:avLst/>
+          </a:prstGeom>
+          <a:noFill/>
+        </p:spPr>
+        <p:txBody>
+          <a:bodyPr wrap="none" rtlCol="0">
+            <a:spAutoFit/>
+          </a:bodyPr>
+          <a:lstStyle/>
+          <a:p>
+            <a:r>
+              <a:rPr lang="en-US" dirty="0" smtClean="0">
+                <a:solidFill>
+                  <a:schemeClr val="accent1"/>
+                </a:solidFill>
+              </a:rPr>
+              <a:t>CGID=1236</a:t>
+            </a:r>
+            <a:endParaRPr lang="en-US" dirty="0">
+              <a:solidFill>
+                <a:schemeClr val="accent1"/>
+              </a:solidFill>
+            </a:endParaRPr>
+          </a:p>
+        </p:txBody>
+      </p:sp>
+      <p:cxnSp>
+        <p:nvCxnSpPr>
+          <p:cNvPr id="23" name="Straight Arrow Connector 22"/>
+          <p:cNvCxnSpPr/>
+          <p:nvPr/>
+        </p:nvCxnSpPr>
+        <p:spPr>
+          <a:xfrm>
+            <a:off x="3801706" y="6324600"/>
+            <a:ext cx="3056294" cy="0"/>
+          </a:xfrm>
+          <a:prstGeom prst="straightConnector1">
+            <a:avLst/>
+          </a:prstGeom>
+          <a:ln>
+            <a:tailEnd type="arrow"/>
+          </a:ln>
+        </p:spPr>
+        <p:style>
+          <a:lnRef idx="1">
+            <a:schemeClr val="accent1"/>
+          </a:lnRef>
+          <a:fillRef idx="0">
+            <a:schemeClr val="accent1"/>
+          </a:fillRef>
+          <a:effectRef idx="0">
+            <a:schemeClr val="accent1"/>
+          </a:effectRef>
+          <a:fontRef idx="minor">
+            <a:schemeClr val="tx1"/>
+          </a:fontRef>
+        </p:style>
+      </p:cxnSp>
+      <p:sp>
+        <p:nvSpPr>
+          <p:cNvPr id="24" name="TextBox 23"/>
+          <p:cNvSpPr txBox="1"/>
+          <p:nvPr/>
+        </p:nvSpPr>
+        <p:spPr>
+          <a:xfrm>
+            <a:off x="5097106" y="6019800"/>
+            <a:ext cx="519694" cy="307777"/>
+          </a:xfrm>
+          <a:prstGeom prst="rect">
+            <a:avLst/>
+          </a:prstGeom>
+          <a:noFill/>
+        </p:spPr>
+        <p:txBody>
+          <a:bodyPr wrap="none" rtlCol="0">
+            <a:spAutoFit/>
+          </a:bodyPr>
+          <a:lstStyle/>
+          <a:p>
+            <a:r>
+              <a:rPr lang="en-US" sz="1400" dirty="0" smtClean="0">
+                <a:solidFill>
+                  <a:schemeClr val="accent1"/>
+                </a:solidFill>
+              </a:rPr>
+              <a:t>time</a:t>
+            </a:r>
+            <a:endParaRPr lang="en-US" sz="1400" dirty="0">
+              <a:solidFill>
+                <a:schemeClr val="accent1"/>
+              </a:solidFill>
+            </a:endParaRPr>
           </a:p>
         </p:txBody>
       </p:sp>
     </p:spTree>
     <p:extLst>
       <p:ext uri="{BB962C8B-B14F-4D97-AF65-F5344CB8AC3E}">
-        <p14:creationId xmlns:p14="http://schemas.microsoft.com/office/powerpoint/2010/main" val="197810909"/>
+        <p14:creationId xmlns:p14="http://schemas.microsoft.com/office/powerpoint/2010/main" val="1787973091"/>
       </p:ext>
     </p:extLst>
   </p:cSld>
   <p:clrMapOvr>
     <a:masterClrMapping/>
   </p:clrMapOvr>
-  <p:timing>
-    <p:tnLst>
-      <p:par>
-        <p:cTn id="1" dur="indefinite" restart="never" nodeType="tmRoot"/>
-      </p:par>
-    </p:tnLst>
-  </p:timing>
 </p:sld>
 </file>
 
@@ -3560,73 +3970,622 @@
             <p:ph type="title"/>
           </p:nvPr>
         </p:nvSpPr>
+        <p:spPr/>
+        <p:txBody>
+          <a:bodyPr/>
+          <a:lstStyle/>
+          <a:p>
+            <a:r>
+              <a:rPr lang="en-US" dirty="0" smtClean="0"/>
+              <a:t>Collection Grouping Examples</a:t>
+            </a:r>
+            <a:endParaRPr lang="en-US" dirty="0"/>
+          </a:p>
+        </p:txBody>
+      </p:sp>
+      <p:sp>
+        <p:nvSpPr>
+          <p:cNvPr id="3" name="Content Placeholder 2"/>
+          <p:cNvSpPr>
+            <a:spLocks noGrp="1"/>
+          </p:cNvSpPr>
+          <p:nvPr>
+            <p:ph idx="1"/>
+          </p:nvPr>
+        </p:nvSpPr>
+        <p:spPr/>
+        <p:txBody>
+          <a:bodyPr>
+            <a:normAutofit/>
+          </a:bodyPr>
+          <a:lstStyle/>
+          <a:p>
+            <a:r>
+              <a:rPr lang="en-US" sz="2000" dirty="0" smtClean="0"/>
+              <a:t>Scenario 2</a:t>
+            </a:r>
+          </a:p>
+          <a:p>
+            <a:pPr lvl="1"/>
+            <a:r>
+              <a:rPr lang="en-US" sz="1600" dirty="0" smtClean="0"/>
+              <a:t>First two specimens differ in collection date; Each receives a unique CGID</a:t>
+            </a:r>
+          </a:p>
+          <a:p>
+            <a:pPr lvl="1"/>
+            <a:r>
+              <a:rPr lang="en-US" sz="1600" dirty="0" smtClean="0"/>
+              <a:t>Third specimen—though arriving at the BPC days later—reuses the first specimen’s CGID since they are “equivalent” from a PED-MATCH standpoint</a:t>
+            </a:r>
+          </a:p>
+          <a:p>
+            <a:pPr lvl="2"/>
+            <a:r>
+              <a:rPr lang="en-US" sz="1400" dirty="0" smtClean="0"/>
+              <a:t>Late-arriving specimens (e.g., delays in shipping/accessioning)</a:t>
+            </a:r>
+          </a:p>
+          <a:p>
+            <a:pPr lvl="2"/>
+            <a:r>
+              <a:rPr lang="en-US" sz="1400" dirty="0" smtClean="0"/>
+              <a:t>Cases where BPC requests additional portion of existing specimen (e.g., inadequacy) and site is able to indeed provide more from that original specimen</a:t>
+            </a:r>
+          </a:p>
+        </p:txBody>
+      </p:sp>
+      <p:sp>
+        <p:nvSpPr>
+          <p:cNvPr id="4" name="Oval 3"/>
+          <p:cNvSpPr/>
+          <p:nvPr/>
+        </p:nvSpPr>
         <p:spPr>
           <a:xfrm>
-            <a:off x="457200" y="0"/>
-            <a:ext cx="8229600" cy="1143000"/>
-          </a:xfrm>
-        </p:spPr>
-        <p:txBody>
-          <a:bodyPr>
-            <a:noAutofit/>
-          </a:bodyPr>
-          <a:lstStyle/>
-          <a:p>
-            <a:r>
-              <a:rPr lang="en-US" sz="3200" dirty="0" smtClean="0"/>
-              <a:t>Scenario 1 – Successfully Received Specimens</a:t>
-            </a:r>
-            <a:endParaRPr lang="en-US" sz="3200" dirty="0"/>
-          </a:p>
-        </p:txBody>
-      </p:sp>
-      <p:pic>
-        <p:nvPicPr>
-          <p:cNvPr id="4" name="Picture 3"/>
-          <p:cNvPicPr>
-            <a:picLocks noChangeAspect="1"/>
-          </p:cNvPicPr>
+            <a:off x="1736956" y="4573534"/>
+            <a:ext cx="1295400" cy="533400"/>
+          </a:xfrm>
+          <a:prstGeom prst="ellipse">
+            <a:avLst/>
+          </a:prstGeom>
+        </p:spPr>
+        <p:style>
+          <a:lnRef idx="2">
+            <a:schemeClr val="accent1">
+              <a:shade val="50000"/>
+            </a:schemeClr>
+          </a:lnRef>
+          <a:fillRef idx="1">
+            <a:schemeClr val="accent1"/>
+          </a:fillRef>
+          <a:effectRef idx="0">
+            <a:schemeClr val="accent1"/>
+          </a:effectRef>
+          <a:fontRef idx="minor">
+            <a:schemeClr val="lt1"/>
+          </a:fontRef>
+        </p:style>
+        <p:txBody>
+          <a:bodyPr rtlCol="0" anchor="ctr"/>
+          <a:lstStyle/>
+          <a:p>
+            <a:pPr algn="ctr"/>
+            <a:r>
+              <a:rPr lang="en-US" sz="800" dirty="0" err="1" smtClean="0"/>
+              <a:t>Pt</a:t>
+            </a:r>
+            <a:r>
+              <a:rPr lang="en-US" sz="800" dirty="0" smtClean="0"/>
+              <a:t># 123, Blood, </a:t>
+            </a:r>
+          </a:p>
+          <a:p>
+            <a:pPr algn="ctr"/>
+            <a:r>
+              <a:rPr lang="en-US" sz="800" dirty="0" smtClean="0"/>
+              <a:t>Collected  10/15/16</a:t>
+            </a:r>
+            <a:endParaRPr lang="en-US" sz="800" dirty="0"/>
+          </a:p>
+        </p:txBody>
+      </p:sp>
+      <p:sp>
+        <p:nvSpPr>
+          <p:cNvPr id="6" name="Oval 5"/>
+          <p:cNvSpPr/>
           <p:nvPr/>
-        </p:nvPicPr>
-        <p:blipFill>
-          <a:blip r:embed="rId2">
-            <a:extLst>
-              <a:ext uri="{28A0092B-C50C-407E-A947-70E740481C1C}">
-                <a14:useLocalDpi xmlns:a14="http://schemas.microsoft.com/office/drawing/2010/main" val="0"/>
-              </a:ext>
-            </a:extLst>
-          </a:blip>
-          <a:stretch>
-            <a:fillRect/>
-          </a:stretch>
-        </p:blipFill>
+        </p:nvSpPr>
         <p:spPr>
           <a:xfrm>
-            <a:off x="1066800" y="990600"/>
-            <a:ext cx="6952171" cy="5791200"/>
+            <a:off x="3233612" y="4573534"/>
+            <a:ext cx="1295400" cy="533400"/>
+          </a:xfrm>
+          <a:prstGeom prst="ellipse">
+            <a:avLst/>
+          </a:prstGeom>
+        </p:spPr>
+        <p:style>
+          <a:lnRef idx="2">
+            <a:schemeClr val="accent1">
+              <a:shade val="50000"/>
+            </a:schemeClr>
+          </a:lnRef>
+          <a:fillRef idx="1">
+            <a:schemeClr val="accent1"/>
+          </a:fillRef>
+          <a:effectRef idx="0">
+            <a:schemeClr val="accent1"/>
+          </a:effectRef>
+          <a:fontRef idx="minor">
+            <a:schemeClr val="lt1"/>
+          </a:fontRef>
+        </p:style>
+        <p:txBody>
+          <a:bodyPr rtlCol="0" anchor="ctr"/>
+          <a:lstStyle/>
+          <a:p>
+            <a:pPr algn="ctr"/>
+            <a:r>
+              <a:rPr lang="en-US" sz="800" dirty="0" err="1" smtClean="0"/>
+              <a:t>Pt</a:t>
+            </a:r>
+            <a:r>
+              <a:rPr lang="en-US" sz="800" dirty="0" smtClean="0"/>
+              <a:t># 123, Blood, </a:t>
+            </a:r>
+          </a:p>
+          <a:p>
+            <a:pPr algn="ctr"/>
+            <a:r>
+              <a:rPr lang="en-US" sz="800" dirty="0" smtClean="0"/>
+              <a:t>Collected  10/30/16</a:t>
+            </a:r>
+            <a:endParaRPr lang="en-US" sz="800" dirty="0"/>
+          </a:p>
+        </p:txBody>
+      </p:sp>
+      <p:sp>
+        <p:nvSpPr>
+          <p:cNvPr id="7" name="Right Brace 6"/>
+          <p:cNvSpPr/>
+          <p:nvPr/>
+        </p:nvSpPr>
+        <p:spPr>
+          <a:xfrm rot="16200000">
+            <a:off x="2194156" y="3811534"/>
+            <a:ext cx="381000" cy="1295400"/>
+          </a:xfrm>
+          <a:prstGeom prst="rightBrace">
+            <a:avLst/>
+          </a:prstGeom>
+        </p:spPr>
+        <p:style>
+          <a:lnRef idx="1">
+            <a:schemeClr val="accent1"/>
+          </a:lnRef>
+          <a:fillRef idx="0">
+            <a:schemeClr val="accent1"/>
+          </a:fillRef>
+          <a:effectRef idx="0">
+            <a:schemeClr val="accent1"/>
+          </a:effectRef>
+          <a:fontRef idx="minor">
+            <a:schemeClr val="tx1"/>
+          </a:fontRef>
+        </p:style>
+        <p:txBody>
+          <a:bodyPr rtlCol="0" anchor="ctr"/>
+          <a:lstStyle/>
+          <a:p>
+            <a:pPr algn="ctr"/>
+            <a:endParaRPr lang="en-US"/>
+          </a:p>
+        </p:txBody>
+      </p:sp>
+      <p:sp>
+        <p:nvSpPr>
+          <p:cNvPr id="8" name="TextBox 7"/>
+          <p:cNvSpPr txBox="1"/>
+          <p:nvPr/>
+        </p:nvSpPr>
+        <p:spPr>
+          <a:xfrm>
+            <a:off x="1766762" y="3899401"/>
+            <a:ext cx="1235788" cy="369332"/>
           </a:xfrm>
           <a:prstGeom prst="rect">
             <a:avLst/>
           </a:prstGeom>
-        </p:spPr>
-      </p:pic>
+          <a:noFill/>
+        </p:spPr>
+        <p:txBody>
+          <a:bodyPr wrap="none" rtlCol="0">
+            <a:spAutoFit/>
+          </a:bodyPr>
+          <a:lstStyle/>
+          <a:p>
+            <a:r>
+              <a:rPr lang="en-US" dirty="0" smtClean="0">
+                <a:solidFill>
+                  <a:schemeClr val="accent1"/>
+                </a:solidFill>
+              </a:rPr>
+              <a:t>CGID=1234</a:t>
+            </a:r>
+            <a:endParaRPr lang="en-US" dirty="0">
+              <a:solidFill>
+                <a:schemeClr val="accent1"/>
+              </a:solidFill>
+            </a:endParaRPr>
+          </a:p>
+        </p:txBody>
+      </p:sp>
+      <p:sp>
+        <p:nvSpPr>
+          <p:cNvPr id="9" name="Right Brace 8"/>
+          <p:cNvSpPr/>
+          <p:nvPr/>
+        </p:nvSpPr>
+        <p:spPr>
+          <a:xfrm rot="16200000">
+            <a:off x="3709862" y="3786484"/>
+            <a:ext cx="381000" cy="1333500"/>
+          </a:xfrm>
+          <a:prstGeom prst="rightBrace">
+            <a:avLst/>
+          </a:prstGeom>
+        </p:spPr>
+        <p:style>
+          <a:lnRef idx="1">
+            <a:schemeClr val="accent1"/>
+          </a:lnRef>
+          <a:fillRef idx="0">
+            <a:schemeClr val="accent1"/>
+          </a:fillRef>
+          <a:effectRef idx="0">
+            <a:schemeClr val="accent1"/>
+          </a:effectRef>
+          <a:fontRef idx="minor">
+            <a:schemeClr val="tx1"/>
+          </a:fontRef>
+        </p:style>
+        <p:txBody>
+          <a:bodyPr rtlCol="0" anchor="ctr"/>
+          <a:lstStyle/>
+          <a:p>
+            <a:pPr algn="ctr"/>
+            <a:endParaRPr lang="en-US"/>
+          </a:p>
+        </p:txBody>
+      </p:sp>
+      <p:sp>
+        <p:nvSpPr>
+          <p:cNvPr id="10" name="TextBox 9"/>
+          <p:cNvSpPr txBox="1"/>
+          <p:nvPr/>
+        </p:nvSpPr>
+        <p:spPr>
+          <a:xfrm>
+            <a:off x="3282468" y="3886200"/>
+            <a:ext cx="1235788" cy="369332"/>
+          </a:xfrm>
+          <a:prstGeom prst="rect">
+            <a:avLst/>
+          </a:prstGeom>
+          <a:noFill/>
+        </p:spPr>
+        <p:txBody>
+          <a:bodyPr wrap="none" rtlCol="0">
+            <a:spAutoFit/>
+          </a:bodyPr>
+          <a:lstStyle/>
+          <a:p>
+            <a:r>
+              <a:rPr lang="en-US" dirty="0" smtClean="0">
+                <a:solidFill>
+                  <a:schemeClr val="accent1"/>
+                </a:solidFill>
+              </a:rPr>
+              <a:t>CGID=1235</a:t>
+            </a:r>
+            <a:endParaRPr lang="en-US" dirty="0">
+              <a:solidFill>
+                <a:schemeClr val="accent1"/>
+              </a:solidFill>
+            </a:endParaRPr>
+          </a:p>
+        </p:txBody>
+      </p:sp>
+      <p:sp>
+        <p:nvSpPr>
+          <p:cNvPr id="11" name="TextBox 10"/>
+          <p:cNvSpPr txBox="1"/>
+          <p:nvPr/>
+        </p:nvSpPr>
+        <p:spPr>
+          <a:xfrm>
+            <a:off x="4800600" y="4661568"/>
+            <a:ext cx="1616148" cy="369332"/>
+          </a:xfrm>
+          <a:prstGeom prst="rect">
+            <a:avLst/>
+          </a:prstGeom>
+          <a:noFill/>
+        </p:spPr>
+        <p:txBody>
+          <a:bodyPr wrap="none" rtlCol="0">
+            <a:spAutoFit/>
+          </a:bodyPr>
+          <a:lstStyle/>
+          <a:p>
+            <a:r>
+              <a:rPr lang="en-US" dirty="0" smtClean="0"/>
+              <a:t>…time passes…</a:t>
+            </a:r>
+            <a:endParaRPr lang="en-US" dirty="0"/>
+          </a:p>
+        </p:txBody>
+      </p:sp>
+      <p:sp>
+        <p:nvSpPr>
+          <p:cNvPr id="12" name="Oval 11"/>
+          <p:cNvSpPr/>
+          <p:nvPr/>
+        </p:nvSpPr>
+        <p:spPr>
+          <a:xfrm>
+            <a:off x="6553200" y="4573534"/>
+            <a:ext cx="1295400" cy="533400"/>
+          </a:xfrm>
+          <a:prstGeom prst="ellipse">
+            <a:avLst/>
+          </a:prstGeom>
+        </p:spPr>
+        <p:style>
+          <a:lnRef idx="2">
+            <a:schemeClr val="accent1">
+              <a:shade val="50000"/>
+            </a:schemeClr>
+          </a:lnRef>
+          <a:fillRef idx="1">
+            <a:schemeClr val="accent1"/>
+          </a:fillRef>
+          <a:effectRef idx="0">
+            <a:schemeClr val="accent1"/>
+          </a:effectRef>
+          <a:fontRef idx="minor">
+            <a:schemeClr val="lt1"/>
+          </a:fontRef>
+        </p:style>
+        <p:txBody>
+          <a:bodyPr rtlCol="0" anchor="ctr"/>
+          <a:lstStyle/>
+          <a:p>
+            <a:pPr algn="ctr"/>
+            <a:r>
+              <a:rPr lang="en-US" sz="800" dirty="0" err="1" smtClean="0"/>
+              <a:t>Pt</a:t>
+            </a:r>
+            <a:r>
+              <a:rPr lang="en-US" sz="800" dirty="0" smtClean="0"/>
+              <a:t># 123, Blood, </a:t>
+            </a:r>
+          </a:p>
+          <a:p>
+            <a:pPr algn="ctr"/>
+            <a:r>
+              <a:rPr lang="en-US" sz="800" dirty="0" smtClean="0"/>
+              <a:t>Collected  10/15/16</a:t>
+            </a:r>
+            <a:endParaRPr lang="en-US" sz="800" dirty="0"/>
+          </a:p>
+        </p:txBody>
+      </p:sp>
+      <p:sp>
+        <p:nvSpPr>
+          <p:cNvPr id="13" name="Right Brace 12"/>
+          <p:cNvSpPr/>
+          <p:nvPr/>
+        </p:nvSpPr>
+        <p:spPr>
+          <a:xfrm rot="16200000">
+            <a:off x="7010400" y="3811534"/>
+            <a:ext cx="381000" cy="1295400"/>
+          </a:xfrm>
+          <a:prstGeom prst="rightBrace">
+            <a:avLst/>
+          </a:prstGeom>
+        </p:spPr>
+        <p:style>
+          <a:lnRef idx="1">
+            <a:schemeClr val="accent1"/>
+          </a:lnRef>
+          <a:fillRef idx="0">
+            <a:schemeClr val="accent1"/>
+          </a:fillRef>
+          <a:effectRef idx="0">
+            <a:schemeClr val="accent1"/>
+          </a:effectRef>
+          <a:fontRef idx="minor">
+            <a:schemeClr val="tx1"/>
+          </a:fontRef>
+        </p:style>
+        <p:txBody>
+          <a:bodyPr rtlCol="0" anchor="ctr"/>
+          <a:lstStyle/>
+          <a:p>
+            <a:pPr algn="ctr"/>
+            <a:endParaRPr lang="en-US"/>
+          </a:p>
+        </p:txBody>
+      </p:sp>
+      <p:sp>
+        <p:nvSpPr>
+          <p:cNvPr id="14" name="TextBox 13"/>
+          <p:cNvSpPr txBox="1"/>
+          <p:nvPr/>
+        </p:nvSpPr>
+        <p:spPr>
+          <a:xfrm>
+            <a:off x="6583006" y="3899401"/>
+            <a:ext cx="1235788" cy="369332"/>
+          </a:xfrm>
+          <a:prstGeom prst="rect">
+            <a:avLst/>
+          </a:prstGeom>
+          <a:noFill/>
+        </p:spPr>
+        <p:txBody>
+          <a:bodyPr wrap="none" rtlCol="0">
+            <a:spAutoFit/>
+          </a:bodyPr>
+          <a:lstStyle/>
+          <a:p>
+            <a:r>
+              <a:rPr lang="en-US" dirty="0" smtClean="0">
+                <a:solidFill>
+                  <a:schemeClr val="accent1"/>
+                </a:solidFill>
+              </a:rPr>
+              <a:t>CGID=1234</a:t>
+            </a:r>
+            <a:endParaRPr lang="en-US" dirty="0">
+              <a:solidFill>
+                <a:schemeClr val="accent1"/>
+              </a:solidFill>
+            </a:endParaRPr>
+          </a:p>
+        </p:txBody>
+      </p:sp>
+      <p:sp>
+        <p:nvSpPr>
+          <p:cNvPr id="15" name="Rectangle 14"/>
+          <p:cNvSpPr/>
+          <p:nvPr/>
+        </p:nvSpPr>
+        <p:spPr>
+          <a:xfrm>
+            <a:off x="3657600" y="4899765"/>
+            <a:ext cx="438150" cy="126208"/>
+          </a:xfrm>
+          <a:prstGeom prst="rect">
+            <a:avLst/>
+          </a:prstGeom>
+          <a:noFill/>
+          <a:ln w="9525">
+            <a:solidFill>
+              <a:schemeClr val="accent2"/>
+            </a:solidFill>
+            <a:prstDash val="dash"/>
+          </a:ln>
+        </p:spPr>
+        <p:style>
+          <a:lnRef idx="2">
+            <a:schemeClr val="accent1">
+              <a:shade val="50000"/>
+            </a:schemeClr>
+          </a:lnRef>
+          <a:fillRef idx="1">
+            <a:schemeClr val="accent1"/>
+          </a:fillRef>
+          <a:effectRef idx="0">
+            <a:schemeClr val="accent1"/>
+          </a:effectRef>
+          <a:fontRef idx="minor">
+            <a:schemeClr val="lt1"/>
+          </a:fontRef>
+        </p:style>
+        <p:txBody>
+          <a:bodyPr rtlCol="0" anchor="ctr"/>
+          <a:lstStyle/>
+          <a:p>
+            <a:pPr algn="ctr"/>
+            <a:endParaRPr lang="en-US"/>
+          </a:p>
+        </p:txBody>
+      </p:sp>
+      <p:cxnSp>
+        <p:nvCxnSpPr>
+          <p:cNvPr id="16" name="Straight Arrow Connector 15"/>
+          <p:cNvCxnSpPr/>
+          <p:nvPr/>
+        </p:nvCxnSpPr>
+        <p:spPr>
+          <a:xfrm>
+            <a:off x="3801706" y="6324600"/>
+            <a:ext cx="3056294" cy="0"/>
+          </a:xfrm>
+          <a:prstGeom prst="straightConnector1">
+            <a:avLst/>
+          </a:prstGeom>
+          <a:ln>
+            <a:tailEnd type="arrow"/>
+          </a:ln>
+        </p:spPr>
+        <p:style>
+          <a:lnRef idx="1">
+            <a:schemeClr val="accent1"/>
+          </a:lnRef>
+          <a:fillRef idx="0">
+            <a:schemeClr val="accent1"/>
+          </a:fillRef>
+          <a:effectRef idx="0">
+            <a:schemeClr val="accent1"/>
+          </a:effectRef>
+          <a:fontRef idx="minor">
+            <a:schemeClr val="tx1"/>
+          </a:fontRef>
+        </p:style>
+      </p:cxnSp>
+      <p:sp>
+        <p:nvSpPr>
+          <p:cNvPr id="17" name="TextBox 16"/>
+          <p:cNvSpPr txBox="1"/>
+          <p:nvPr/>
+        </p:nvSpPr>
+        <p:spPr>
+          <a:xfrm>
+            <a:off x="5097106" y="6019800"/>
+            <a:ext cx="519694" cy="307777"/>
+          </a:xfrm>
+          <a:prstGeom prst="rect">
+            <a:avLst/>
+          </a:prstGeom>
+          <a:noFill/>
+        </p:spPr>
+        <p:txBody>
+          <a:bodyPr wrap="none" rtlCol="0">
+            <a:spAutoFit/>
+          </a:bodyPr>
+          <a:lstStyle/>
+          <a:p>
+            <a:r>
+              <a:rPr lang="en-US" sz="1400" dirty="0" smtClean="0">
+                <a:solidFill>
+                  <a:schemeClr val="accent1"/>
+                </a:solidFill>
+              </a:rPr>
+              <a:t>time</a:t>
+            </a:r>
+            <a:endParaRPr lang="en-US" sz="1400" dirty="0">
+              <a:solidFill>
+                <a:schemeClr val="accent1"/>
+              </a:solidFill>
+            </a:endParaRPr>
+          </a:p>
+        </p:txBody>
+      </p:sp>
     </p:spTree>
     <p:extLst>
       <p:ext uri="{BB962C8B-B14F-4D97-AF65-F5344CB8AC3E}">
-        <p14:creationId xmlns:p14="http://schemas.microsoft.com/office/powerpoint/2010/main" val="1699135138"/>
+        <p14:creationId xmlns:p14="http://schemas.microsoft.com/office/powerpoint/2010/main" val="4151605567"/>
       </p:ext>
     </p:extLst>
   </p:cSld>
   <p:clrMapOvr>
     <a:masterClrMapping/>
   </p:clrMapOvr>
-  <p:timing>
-    <p:tnLst>
-      <p:par>
-        <p:cTn id="1" dur="indefinite" restart="never" nodeType="tmRoot"/>
-      </p:par>
-    </p:tnLst>
-  </p:timing>
 </p:sld>
 </file>
 
@@ -3647,23 +4606,625 @@
           <a:chExt cx="0" cy="0"/>
         </a:xfrm>
       </p:grpSpPr>
+      <p:sp>
+        <p:nvSpPr>
+          <p:cNvPr id="2" name="Title 1"/>
+          <p:cNvSpPr>
+            <a:spLocks noGrp="1"/>
+          </p:cNvSpPr>
+          <p:nvPr>
+            <p:ph type="title"/>
+          </p:nvPr>
+        </p:nvSpPr>
+        <p:spPr/>
+        <p:txBody>
+          <a:bodyPr/>
+          <a:lstStyle/>
+          <a:p>
+            <a:r>
+              <a:rPr lang="en-US" dirty="0" smtClean="0"/>
+              <a:t>Collection Grouping Examples</a:t>
+            </a:r>
+            <a:endParaRPr lang="en-US" dirty="0"/>
+          </a:p>
+        </p:txBody>
+      </p:sp>
+      <p:sp>
+        <p:nvSpPr>
+          <p:cNvPr id="3" name="Content Placeholder 2"/>
+          <p:cNvSpPr>
+            <a:spLocks noGrp="1"/>
+          </p:cNvSpPr>
+          <p:nvPr>
+            <p:ph idx="1"/>
+          </p:nvPr>
+        </p:nvSpPr>
+        <p:spPr/>
+        <p:txBody>
+          <a:bodyPr>
+            <a:normAutofit/>
+          </a:bodyPr>
+          <a:lstStyle/>
+          <a:p>
+            <a:r>
+              <a:rPr lang="en-US" sz="2000" dirty="0" smtClean="0"/>
+              <a:t>Scenario 3</a:t>
+            </a:r>
+          </a:p>
+          <a:p>
+            <a:pPr lvl="1"/>
+            <a:r>
+              <a:rPr lang="en-US" sz="1600" dirty="0" smtClean="0"/>
+              <a:t>First two specimens differ in collection date; Each receives a unique CGID</a:t>
+            </a:r>
+          </a:p>
+          <a:p>
+            <a:pPr lvl="1"/>
+            <a:r>
+              <a:rPr lang="en-US" sz="1600" dirty="0" smtClean="0"/>
+              <a:t>Third specimen arrives at the BPC days later but does NOT reuse the first specimen’s CGID since they are not from the same collection and thus not “equivalent” from a PED-MATCH standpoint</a:t>
+            </a:r>
+          </a:p>
+          <a:p>
+            <a:pPr lvl="2"/>
+            <a:r>
+              <a:rPr lang="en-US" sz="1400" dirty="0" smtClean="0"/>
+              <a:t>Cases where BPC requests additional portion of existing specimen (e.g., inadequacy) but site is unable to provide more of the original specimen, instead substituting from another specimen/draw/etc.</a:t>
+            </a:r>
+          </a:p>
+        </p:txBody>
+      </p:sp>
+      <p:sp>
+        <p:nvSpPr>
+          <p:cNvPr id="4" name="Oval 3"/>
+          <p:cNvSpPr/>
+          <p:nvPr/>
+        </p:nvSpPr>
+        <p:spPr>
+          <a:xfrm>
+            <a:off x="1736956" y="4573534"/>
+            <a:ext cx="1295400" cy="533400"/>
+          </a:xfrm>
+          <a:prstGeom prst="ellipse">
+            <a:avLst/>
+          </a:prstGeom>
+        </p:spPr>
+        <p:style>
+          <a:lnRef idx="2">
+            <a:schemeClr val="accent1">
+              <a:shade val="50000"/>
+            </a:schemeClr>
+          </a:lnRef>
+          <a:fillRef idx="1">
+            <a:schemeClr val="accent1"/>
+          </a:fillRef>
+          <a:effectRef idx="0">
+            <a:schemeClr val="accent1"/>
+          </a:effectRef>
+          <a:fontRef idx="minor">
+            <a:schemeClr val="lt1"/>
+          </a:fontRef>
+        </p:style>
+        <p:txBody>
+          <a:bodyPr rtlCol="0" anchor="ctr"/>
+          <a:lstStyle/>
+          <a:p>
+            <a:pPr algn="ctr"/>
+            <a:r>
+              <a:rPr lang="en-US" sz="800" dirty="0" err="1" smtClean="0"/>
+              <a:t>Pt</a:t>
+            </a:r>
+            <a:r>
+              <a:rPr lang="en-US" sz="800" dirty="0" smtClean="0"/>
+              <a:t># 123, Blood, </a:t>
+            </a:r>
+          </a:p>
+          <a:p>
+            <a:pPr algn="ctr"/>
+            <a:r>
+              <a:rPr lang="en-US" sz="800" dirty="0" smtClean="0"/>
+              <a:t>Collected  10/15/16</a:t>
+            </a:r>
+            <a:endParaRPr lang="en-US" sz="800" dirty="0"/>
+          </a:p>
+        </p:txBody>
+      </p:sp>
+      <p:sp>
+        <p:nvSpPr>
+          <p:cNvPr id="6" name="Oval 5"/>
+          <p:cNvSpPr/>
+          <p:nvPr/>
+        </p:nvSpPr>
+        <p:spPr>
+          <a:xfrm>
+            <a:off x="3233612" y="4573534"/>
+            <a:ext cx="1295400" cy="533400"/>
+          </a:xfrm>
+          <a:prstGeom prst="ellipse">
+            <a:avLst/>
+          </a:prstGeom>
+        </p:spPr>
+        <p:style>
+          <a:lnRef idx="2">
+            <a:schemeClr val="accent1">
+              <a:shade val="50000"/>
+            </a:schemeClr>
+          </a:lnRef>
+          <a:fillRef idx="1">
+            <a:schemeClr val="accent1"/>
+          </a:fillRef>
+          <a:effectRef idx="0">
+            <a:schemeClr val="accent1"/>
+          </a:effectRef>
+          <a:fontRef idx="minor">
+            <a:schemeClr val="lt1"/>
+          </a:fontRef>
+        </p:style>
+        <p:txBody>
+          <a:bodyPr rtlCol="0" anchor="ctr"/>
+          <a:lstStyle/>
+          <a:p>
+            <a:pPr algn="ctr"/>
+            <a:r>
+              <a:rPr lang="en-US" sz="800" dirty="0" err="1" smtClean="0"/>
+              <a:t>Pt</a:t>
+            </a:r>
+            <a:r>
+              <a:rPr lang="en-US" sz="800" dirty="0" smtClean="0"/>
+              <a:t># 123, Blood, </a:t>
+            </a:r>
+          </a:p>
+          <a:p>
+            <a:pPr algn="ctr"/>
+            <a:r>
+              <a:rPr lang="en-US" sz="800" dirty="0" smtClean="0"/>
+              <a:t>Collected  10/30/16</a:t>
+            </a:r>
+            <a:endParaRPr lang="en-US" sz="800" dirty="0"/>
+          </a:p>
+        </p:txBody>
+      </p:sp>
+      <p:sp>
+        <p:nvSpPr>
+          <p:cNvPr id="7" name="Right Brace 6"/>
+          <p:cNvSpPr/>
+          <p:nvPr/>
+        </p:nvSpPr>
+        <p:spPr>
+          <a:xfrm rot="16200000">
+            <a:off x="2194156" y="3811534"/>
+            <a:ext cx="381000" cy="1295400"/>
+          </a:xfrm>
+          <a:prstGeom prst="rightBrace">
+            <a:avLst/>
+          </a:prstGeom>
+        </p:spPr>
+        <p:style>
+          <a:lnRef idx="1">
+            <a:schemeClr val="accent1"/>
+          </a:lnRef>
+          <a:fillRef idx="0">
+            <a:schemeClr val="accent1"/>
+          </a:fillRef>
+          <a:effectRef idx="0">
+            <a:schemeClr val="accent1"/>
+          </a:effectRef>
+          <a:fontRef idx="minor">
+            <a:schemeClr val="tx1"/>
+          </a:fontRef>
+        </p:style>
+        <p:txBody>
+          <a:bodyPr rtlCol="0" anchor="ctr"/>
+          <a:lstStyle/>
+          <a:p>
+            <a:pPr algn="ctr"/>
+            <a:endParaRPr lang="en-US"/>
+          </a:p>
+        </p:txBody>
+      </p:sp>
+      <p:sp>
+        <p:nvSpPr>
+          <p:cNvPr id="8" name="TextBox 7"/>
+          <p:cNvSpPr txBox="1"/>
+          <p:nvPr/>
+        </p:nvSpPr>
+        <p:spPr>
+          <a:xfrm>
+            <a:off x="1766762" y="3899401"/>
+            <a:ext cx="1235788" cy="369332"/>
+          </a:xfrm>
+          <a:prstGeom prst="rect">
+            <a:avLst/>
+          </a:prstGeom>
+          <a:noFill/>
+        </p:spPr>
+        <p:txBody>
+          <a:bodyPr wrap="none" rtlCol="0">
+            <a:spAutoFit/>
+          </a:bodyPr>
+          <a:lstStyle/>
+          <a:p>
+            <a:r>
+              <a:rPr lang="en-US" dirty="0" smtClean="0">
+                <a:solidFill>
+                  <a:schemeClr val="accent1"/>
+                </a:solidFill>
+              </a:rPr>
+              <a:t>CGID=1234</a:t>
+            </a:r>
+            <a:endParaRPr lang="en-US" dirty="0">
+              <a:solidFill>
+                <a:schemeClr val="accent1"/>
+              </a:solidFill>
+            </a:endParaRPr>
+          </a:p>
+        </p:txBody>
+      </p:sp>
+      <p:sp>
+        <p:nvSpPr>
+          <p:cNvPr id="9" name="Right Brace 8"/>
+          <p:cNvSpPr/>
+          <p:nvPr/>
+        </p:nvSpPr>
+        <p:spPr>
+          <a:xfrm rot="16200000">
+            <a:off x="3709862" y="3786484"/>
+            <a:ext cx="381000" cy="1333500"/>
+          </a:xfrm>
+          <a:prstGeom prst="rightBrace">
+            <a:avLst/>
+          </a:prstGeom>
+        </p:spPr>
+        <p:style>
+          <a:lnRef idx="1">
+            <a:schemeClr val="accent1"/>
+          </a:lnRef>
+          <a:fillRef idx="0">
+            <a:schemeClr val="accent1"/>
+          </a:fillRef>
+          <a:effectRef idx="0">
+            <a:schemeClr val="accent1"/>
+          </a:effectRef>
+          <a:fontRef idx="minor">
+            <a:schemeClr val="tx1"/>
+          </a:fontRef>
+        </p:style>
+        <p:txBody>
+          <a:bodyPr rtlCol="0" anchor="ctr"/>
+          <a:lstStyle/>
+          <a:p>
+            <a:pPr algn="ctr"/>
+            <a:endParaRPr lang="en-US"/>
+          </a:p>
+        </p:txBody>
+      </p:sp>
+      <p:sp>
+        <p:nvSpPr>
+          <p:cNvPr id="10" name="TextBox 9"/>
+          <p:cNvSpPr txBox="1"/>
+          <p:nvPr/>
+        </p:nvSpPr>
+        <p:spPr>
+          <a:xfrm>
+            <a:off x="3282468" y="3886200"/>
+            <a:ext cx="1235788" cy="369332"/>
+          </a:xfrm>
+          <a:prstGeom prst="rect">
+            <a:avLst/>
+          </a:prstGeom>
+          <a:noFill/>
+        </p:spPr>
+        <p:txBody>
+          <a:bodyPr wrap="none" rtlCol="0">
+            <a:spAutoFit/>
+          </a:bodyPr>
+          <a:lstStyle/>
+          <a:p>
+            <a:r>
+              <a:rPr lang="en-US" dirty="0" smtClean="0">
+                <a:solidFill>
+                  <a:schemeClr val="accent1"/>
+                </a:solidFill>
+              </a:rPr>
+              <a:t>CGID=1235</a:t>
+            </a:r>
+            <a:endParaRPr lang="en-US" dirty="0">
+              <a:solidFill>
+                <a:schemeClr val="accent1"/>
+              </a:solidFill>
+            </a:endParaRPr>
+          </a:p>
+        </p:txBody>
+      </p:sp>
+      <p:sp>
+        <p:nvSpPr>
+          <p:cNvPr id="11" name="TextBox 10"/>
+          <p:cNvSpPr txBox="1"/>
+          <p:nvPr/>
+        </p:nvSpPr>
+        <p:spPr>
+          <a:xfrm>
+            <a:off x="4800600" y="4661568"/>
+            <a:ext cx="1616148" cy="369332"/>
+          </a:xfrm>
+          <a:prstGeom prst="rect">
+            <a:avLst/>
+          </a:prstGeom>
+          <a:noFill/>
+        </p:spPr>
+        <p:txBody>
+          <a:bodyPr wrap="none" rtlCol="0">
+            <a:spAutoFit/>
+          </a:bodyPr>
+          <a:lstStyle/>
+          <a:p>
+            <a:r>
+              <a:rPr lang="en-US" dirty="0" smtClean="0"/>
+              <a:t>…time passes…</a:t>
+            </a:r>
+            <a:endParaRPr lang="en-US" dirty="0"/>
+          </a:p>
+        </p:txBody>
+      </p:sp>
+      <p:sp>
+        <p:nvSpPr>
+          <p:cNvPr id="12" name="Oval 11"/>
+          <p:cNvSpPr/>
+          <p:nvPr/>
+        </p:nvSpPr>
+        <p:spPr>
+          <a:xfrm>
+            <a:off x="6553200" y="4573534"/>
+            <a:ext cx="1295400" cy="533400"/>
+          </a:xfrm>
+          <a:prstGeom prst="ellipse">
+            <a:avLst/>
+          </a:prstGeom>
+        </p:spPr>
+        <p:style>
+          <a:lnRef idx="2">
+            <a:schemeClr val="accent1">
+              <a:shade val="50000"/>
+            </a:schemeClr>
+          </a:lnRef>
+          <a:fillRef idx="1">
+            <a:schemeClr val="accent1"/>
+          </a:fillRef>
+          <a:effectRef idx="0">
+            <a:schemeClr val="accent1"/>
+          </a:effectRef>
+          <a:fontRef idx="minor">
+            <a:schemeClr val="lt1"/>
+          </a:fontRef>
+        </p:style>
+        <p:txBody>
+          <a:bodyPr rtlCol="0" anchor="ctr"/>
+          <a:lstStyle/>
+          <a:p>
+            <a:pPr algn="ctr"/>
+            <a:r>
+              <a:rPr lang="en-US" sz="800" dirty="0" err="1" smtClean="0"/>
+              <a:t>Pt</a:t>
+            </a:r>
+            <a:r>
+              <a:rPr lang="en-US" sz="800" dirty="0" smtClean="0"/>
+              <a:t># 123, Blood, </a:t>
+            </a:r>
+          </a:p>
+          <a:p>
+            <a:pPr algn="ctr"/>
+            <a:r>
+              <a:rPr lang="en-US" sz="800" dirty="0" smtClean="0"/>
+              <a:t>Collected  11/30/16</a:t>
+            </a:r>
+            <a:endParaRPr lang="en-US" sz="800" dirty="0"/>
+          </a:p>
+        </p:txBody>
+      </p:sp>
+      <p:sp>
+        <p:nvSpPr>
+          <p:cNvPr id="13" name="Right Brace 12"/>
+          <p:cNvSpPr/>
+          <p:nvPr/>
+        </p:nvSpPr>
+        <p:spPr>
+          <a:xfrm rot="16200000">
+            <a:off x="7010400" y="3811534"/>
+            <a:ext cx="381000" cy="1295400"/>
+          </a:xfrm>
+          <a:prstGeom prst="rightBrace">
+            <a:avLst/>
+          </a:prstGeom>
+        </p:spPr>
+        <p:style>
+          <a:lnRef idx="1">
+            <a:schemeClr val="accent1"/>
+          </a:lnRef>
+          <a:fillRef idx="0">
+            <a:schemeClr val="accent1"/>
+          </a:fillRef>
+          <a:effectRef idx="0">
+            <a:schemeClr val="accent1"/>
+          </a:effectRef>
+          <a:fontRef idx="minor">
+            <a:schemeClr val="tx1"/>
+          </a:fontRef>
+        </p:style>
+        <p:txBody>
+          <a:bodyPr rtlCol="0" anchor="ctr"/>
+          <a:lstStyle/>
+          <a:p>
+            <a:pPr algn="ctr"/>
+            <a:endParaRPr lang="en-US"/>
+          </a:p>
+        </p:txBody>
+      </p:sp>
+      <p:sp>
+        <p:nvSpPr>
+          <p:cNvPr id="14" name="TextBox 13"/>
+          <p:cNvSpPr txBox="1"/>
+          <p:nvPr/>
+        </p:nvSpPr>
+        <p:spPr>
+          <a:xfrm>
+            <a:off x="6583006" y="3899401"/>
+            <a:ext cx="1235788" cy="369332"/>
+          </a:xfrm>
+          <a:prstGeom prst="rect">
+            <a:avLst/>
+          </a:prstGeom>
+          <a:noFill/>
+        </p:spPr>
+        <p:txBody>
+          <a:bodyPr wrap="none" rtlCol="0">
+            <a:spAutoFit/>
+          </a:bodyPr>
+          <a:lstStyle/>
+          <a:p>
+            <a:r>
+              <a:rPr lang="en-US" dirty="0" smtClean="0">
+                <a:solidFill>
+                  <a:schemeClr val="accent1"/>
+                </a:solidFill>
+              </a:rPr>
+              <a:t>CGID=1236</a:t>
+            </a:r>
+            <a:endParaRPr lang="en-US" dirty="0">
+              <a:solidFill>
+                <a:schemeClr val="accent1"/>
+              </a:solidFill>
+            </a:endParaRPr>
+          </a:p>
+        </p:txBody>
+      </p:sp>
+      <p:sp>
+        <p:nvSpPr>
+          <p:cNvPr id="15" name="Rectangle 14"/>
+          <p:cNvSpPr/>
+          <p:nvPr/>
+        </p:nvSpPr>
+        <p:spPr>
+          <a:xfrm>
+            <a:off x="3657600" y="4899765"/>
+            <a:ext cx="438150" cy="126208"/>
+          </a:xfrm>
+          <a:prstGeom prst="rect">
+            <a:avLst/>
+          </a:prstGeom>
+          <a:noFill/>
+          <a:ln w="9525">
+            <a:solidFill>
+              <a:schemeClr val="accent2"/>
+            </a:solidFill>
+            <a:prstDash val="dash"/>
+          </a:ln>
+        </p:spPr>
+        <p:style>
+          <a:lnRef idx="2">
+            <a:schemeClr val="accent1">
+              <a:shade val="50000"/>
+            </a:schemeClr>
+          </a:lnRef>
+          <a:fillRef idx="1">
+            <a:schemeClr val="accent1"/>
+          </a:fillRef>
+          <a:effectRef idx="0">
+            <a:schemeClr val="accent1"/>
+          </a:effectRef>
+          <a:fontRef idx="minor">
+            <a:schemeClr val="lt1"/>
+          </a:fontRef>
+        </p:style>
+        <p:txBody>
+          <a:bodyPr rtlCol="0" anchor="ctr"/>
+          <a:lstStyle/>
+          <a:p>
+            <a:pPr algn="ctr"/>
+            <a:endParaRPr lang="en-US"/>
+          </a:p>
+        </p:txBody>
+      </p:sp>
+      <p:cxnSp>
+        <p:nvCxnSpPr>
+          <p:cNvPr id="16" name="Straight Arrow Connector 15"/>
+          <p:cNvCxnSpPr/>
+          <p:nvPr/>
+        </p:nvCxnSpPr>
+        <p:spPr>
+          <a:xfrm>
+            <a:off x="3801706" y="6324600"/>
+            <a:ext cx="3056294" cy="0"/>
+          </a:xfrm>
+          <a:prstGeom prst="straightConnector1">
+            <a:avLst/>
+          </a:prstGeom>
+          <a:ln>
+            <a:tailEnd type="arrow"/>
+          </a:ln>
+        </p:spPr>
+        <p:style>
+          <a:lnRef idx="1">
+            <a:schemeClr val="accent1"/>
+          </a:lnRef>
+          <a:fillRef idx="0">
+            <a:schemeClr val="accent1"/>
+          </a:fillRef>
+          <a:effectRef idx="0">
+            <a:schemeClr val="accent1"/>
+          </a:effectRef>
+          <a:fontRef idx="minor">
+            <a:schemeClr val="tx1"/>
+          </a:fontRef>
+        </p:style>
+      </p:cxnSp>
+      <p:sp>
+        <p:nvSpPr>
+          <p:cNvPr id="17" name="TextBox 16"/>
+          <p:cNvSpPr txBox="1"/>
+          <p:nvPr/>
+        </p:nvSpPr>
+        <p:spPr>
+          <a:xfrm>
+            <a:off x="5097106" y="6019800"/>
+            <a:ext cx="519694" cy="307777"/>
+          </a:xfrm>
+          <a:prstGeom prst="rect">
+            <a:avLst/>
+          </a:prstGeom>
+          <a:noFill/>
+        </p:spPr>
+        <p:txBody>
+          <a:bodyPr wrap="none" rtlCol="0">
+            <a:spAutoFit/>
+          </a:bodyPr>
+          <a:lstStyle/>
+          <a:p>
+            <a:r>
+              <a:rPr lang="en-US" sz="1400" dirty="0" smtClean="0">
+                <a:solidFill>
+                  <a:schemeClr val="accent1"/>
+                </a:solidFill>
+              </a:rPr>
+              <a:t>time</a:t>
+            </a:r>
+            <a:endParaRPr lang="en-US" sz="1400" dirty="0">
+              <a:solidFill>
+                <a:schemeClr val="accent1"/>
+              </a:solidFill>
+            </a:endParaRPr>
+          </a:p>
+        </p:txBody>
+      </p:sp>
     </p:spTree>
     <p:extLst>
       <p:ext uri="{BB962C8B-B14F-4D97-AF65-F5344CB8AC3E}">
-        <p14:creationId xmlns:p14="http://schemas.microsoft.com/office/powerpoint/2010/main" val="3556314449"/>
+        <p14:creationId xmlns:p14="http://schemas.microsoft.com/office/powerpoint/2010/main" val="2943369028"/>
       </p:ext>
     </p:extLst>
   </p:cSld>
   <p:clrMapOvr>
     <a:masterClrMapping/>
   </p:clrMapOvr>
-  <p:timing>
-    <p:tnLst>
-      <p:par>
-        <p:cTn id="1" dur="indefinite" restart="never" nodeType="tmRoot"/>
-      </p:par>
-    </p:tnLst>
-  </p:timing>
 </p:sld>
 </file>
 
@@ -3684,40 +5245,224 @@
           <a:chExt cx="0" cy="0"/>
         </a:xfrm>
       </p:grpSpPr>
-      <p:pic>
-        <p:nvPicPr>
-          <p:cNvPr id="5" name="Picture 4"/>
-          <p:cNvPicPr>
-            <a:picLocks noChangeAspect="1"/>
-          </p:cNvPicPr>
-          <p:nvPr/>
-        </p:nvPicPr>
-        <p:blipFill>
-          <a:blip r:embed="rId2">
-            <a:extLst>
-              <a:ext uri="{28A0092B-C50C-407E-A947-70E740481C1C}">
-                <a14:useLocalDpi xmlns:a14="http://schemas.microsoft.com/office/drawing/2010/main" val="0"/>
-              </a:ext>
-            </a:extLst>
-          </a:blip>
-          <a:stretch>
-            <a:fillRect/>
-          </a:stretch>
-        </p:blipFill>
-        <p:spPr>
-          <a:xfrm>
-            <a:off x="838200" y="762000"/>
-            <a:ext cx="7164417" cy="5968002"/>
-          </a:xfrm>
-          <a:prstGeom prst="rect">
-            <a:avLst/>
-          </a:prstGeom>
-        </p:spPr>
-      </p:pic>
+      <p:sp>
+        <p:nvSpPr>
+          <p:cNvPr id="2" name="Title 1"/>
+          <p:cNvSpPr>
+            <a:spLocks noGrp="1"/>
+          </p:cNvSpPr>
+          <p:nvPr>
+            <p:ph type="title"/>
+          </p:nvPr>
+        </p:nvSpPr>
+        <p:spPr/>
+        <p:txBody>
+          <a:bodyPr>
+            <a:normAutofit/>
+          </a:bodyPr>
+          <a:lstStyle/>
+          <a:p>
+            <a:r>
+              <a:rPr lang="en-US" sz="3600" dirty="0" smtClean="0"/>
+              <a:t>“Specimen Received” Integration Message</a:t>
+            </a:r>
+            <a:endParaRPr lang="en-US" sz="3600" dirty="0"/>
+          </a:p>
+        </p:txBody>
+      </p:sp>
+      <p:sp>
+        <p:nvSpPr>
+          <p:cNvPr id="3" name="Content Placeholder 2"/>
+          <p:cNvSpPr>
+            <a:spLocks noGrp="1"/>
+          </p:cNvSpPr>
+          <p:nvPr>
+            <p:ph idx="1"/>
+          </p:nvPr>
+        </p:nvSpPr>
+        <p:spPr/>
+        <p:txBody>
+          <a:bodyPr>
+            <a:normAutofit fontScale="77500" lnSpcReduction="20000"/>
+          </a:bodyPr>
+          <a:lstStyle/>
+          <a:p>
+            <a:r>
+              <a:rPr lang="en-US" b="1" u="sng" dirty="0" smtClean="0"/>
+              <a:t>DIRECTION</a:t>
+            </a:r>
+            <a:r>
+              <a:rPr lang="en-US" dirty="0" smtClean="0"/>
+              <a:t>: Outbound from BPC to MATCHBOX</a:t>
+            </a:r>
+          </a:p>
+          <a:p>
+            <a:r>
+              <a:rPr lang="en-US" b="1" u="sng" dirty="0" smtClean="0"/>
+              <a:t>TIMING</a:t>
+            </a:r>
+            <a:r>
+              <a:rPr lang="en-US" dirty="0" smtClean="0"/>
+              <a:t>: Sent when new specimens of interest are detected in STARS</a:t>
+            </a:r>
+          </a:p>
+          <a:p>
+            <a:pPr lvl="1"/>
+            <a:r>
+              <a:rPr lang="en-US" dirty="0" smtClean="0"/>
+              <a:t>Specimen is accessioned under APEC1621</a:t>
+            </a:r>
+          </a:p>
+          <a:p>
+            <a:pPr lvl="1"/>
+            <a:r>
+              <a:rPr lang="en-US" dirty="0" smtClean="0"/>
+              <a:t>Patient is enrolled in APEC1621</a:t>
+            </a:r>
+          </a:p>
+          <a:p>
+            <a:pPr lvl="1"/>
+            <a:r>
+              <a:rPr lang="en-US" dirty="0" smtClean="0"/>
+              <a:t>Specimen type of Blood or Tumor Tissue</a:t>
+            </a:r>
+          </a:p>
+          <a:p>
+            <a:pPr lvl="1"/>
+            <a:r>
+              <a:rPr lang="en-US" dirty="0" smtClean="0"/>
+              <a:t>Accessioning paperwork QC is successful</a:t>
+            </a:r>
+          </a:p>
+          <a:p>
+            <a:r>
+              <a:rPr lang="en-US" b="1" u="sng" dirty="0" smtClean="0"/>
+              <a:t>CONTENT</a:t>
+            </a:r>
+            <a:r>
+              <a:rPr lang="en-US" dirty="0" smtClean="0"/>
+              <a:t>:</a:t>
+            </a:r>
+          </a:p>
+          <a:p>
+            <a:pPr lvl="1"/>
+            <a:r>
+              <a:rPr lang="en-US" dirty="0" smtClean="0"/>
+              <a:t>Technical Message Headers (</a:t>
+            </a:r>
+            <a:r>
+              <a:rPr lang="en-US" i="1" dirty="0" err="1" smtClean="0"/>
+              <a:t>msg_guid</a:t>
+            </a:r>
+            <a:r>
+              <a:rPr lang="en-US" dirty="0" smtClean="0"/>
+              <a:t>, </a:t>
+            </a:r>
+            <a:r>
+              <a:rPr lang="en-US" i="1" dirty="0" err="1" smtClean="0"/>
+              <a:t>msg_dttm</a:t>
+            </a:r>
+            <a:r>
+              <a:rPr lang="en-US" dirty="0" smtClean="0"/>
+              <a:t>)</a:t>
+            </a:r>
+          </a:p>
+          <a:p>
+            <a:pPr lvl="1"/>
+            <a:r>
+              <a:rPr lang="en-US" dirty="0" smtClean="0"/>
+              <a:t>List of specimens</a:t>
+            </a:r>
+          </a:p>
+          <a:p>
+            <a:pPr lvl="2"/>
+            <a:r>
+              <a:rPr lang="en-US" dirty="0" smtClean="0"/>
+              <a:t>PED-MATCH attributes (</a:t>
+            </a:r>
+            <a:r>
+              <a:rPr lang="en-US" i="1" dirty="0" err="1" smtClean="0"/>
+              <a:t>patient_id</a:t>
+            </a:r>
+            <a:r>
+              <a:rPr lang="en-US" dirty="0" smtClean="0"/>
+              <a:t>, </a:t>
+            </a:r>
+            <a:r>
+              <a:rPr lang="en-US" i="1" dirty="0" err="1" smtClean="0"/>
+              <a:t>collection_grouping_id</a:t>
+            </a:r>
+            <a:r>
+              <a:rPr lang="en-US" dirty="0" smtClean="0"/>
+              <a:t>, </a:t>
+            </a:r>
+            <a:r>
+              <a:rPr lang="en-US" i="1" dirty="0" smtClean="0"/>
+              <a:t>type, </a:t>
+            </a:r>
+            <a:r>
+              <a:rPr lang="en-US" i="1" dirty="0" err="1" smtClean="0"/>
+              <a:t>disease_status</a:t>
+            </a:r>
+            <a:r>
+              <a:rPr lang="en-US" dirty="0" smtClean="0"/>
+              <a:t>)</a:t>
+            </a:r>
+            <a:endParaRPr lang="en-US" dirty="0" smtClean="0"/>
+          </a:p>
+          <a:p>
+            <a:pPr lvl="2"/>
+            <a:r>
+              <a:rPr lang="en-US" dirty="0" smtClean="0"/>
+              <a:t>Additional (troubleshooting) attributes (</a:t>
+            </a:r>
+            <a:r>
+              <a:rPr lang="en-US" i="1" dirty="0" err="1" smtClean="0"/>
+              <a:t>stars_patient_id</a:t>
+            </a:r>
+            <a:r>
+              <a:rPr lang="en-US" dirty="0" smtClean="0"/>
+              <a:t>, </a:t>
+            </a:r>
+            <a:r>
+              <a:rPr lang="en-US" i="1" dirty="0" err="1" smtClean="0"/>
+              <a:t>stars_specimen_id</a:t>
+            </a:r>
+            <a:r>
+              <a:rPr lang="en-US" dirty="0" smtClean="0"/>
+              <a:t>, </a:t>
+            </a:r>
+            <a:r>
+              <a:rPr lang="en-US" i="1" dirty="0" err="1" smtClean="0"/>
+              <a:t>stars_specimen_type</a:t>
+            </a:r>
+            <a:r>
+              <a:rPr lang="en-US" dirty="0" smtClean="0"/>
+              <a:t>, </a:t>
+            </a:r>
+            <a:r>
+              <a:rPr lang="en-US" i="1" dirty="0" err="1" smtClean="0"/>
+              <a:t>received_ts</a:t>
+            </a:r>
+            <a:r>
+              <a:rPr lang="en-US" dirty="0" smtClean="0"/>
+              <a:t>, </a:t>
+            </a:r>
+            <a:r>
+              <a:rPr lang="en-US" i="1" dirty="0" err="1" smtClean="0"/>
+              <a:t>qc_ts</a:t>
+            </a:r>
+            <a:r>
+              <a:rPr lang="en-US" dirty="0" smtClean="0"/>
+              <a:t>)</a:t>
+            </a:r>
+          </a:p>
+        </p:txBody>
+      </p:sp>
     </p:spTree>
     <p:extLst>
       <p:ext uri="{BB962C8B-B14F-4D97-AF65-F5344CB8AC3E}">
-        <p14:creationId xmlns:p14="http://schemas.microsoft.com/office/powerpoint/2010/main" val="2876414312"/>
+        <p14:creationId xmlns:p14="http://schemas.microsoft.com/office/powerpoint/2010/main" val="197810909"/>
       </p:ext>
     </p:extLst>
   </p:cSld>
@@ -3751,43 +5496,11 @@
           <a:chExt cx="0" cy="0"/>
         </a:xfrm>
       </p:grpSpPr>
-      <p:sp>
-        <p:nvSpPr>
-          <p:cNvPr id="2" name="Title 1"/>
-          <p:cNvSpPr>
-            <a:spLocks noGrp="1"/>
-          </p:cNvSpPr>
-          <p:nvPr>
-            <p:ph type="title"/>
-          </p:nvPr>
-        </p:nvSpPr>
-        <p:spPr/>
-        <p:txBody>
-          <a:bodyPr>
-            <a:normAutofit fontScale="90000"/>
-          </a:bodyPr>
-          <a:lstStyle/>
-          <a:p>
-            <a:r>
-              <a:rPr lang="en-US" dirty="0" smtClean="0"/>
-              <a:t>Sample REST Message</a:t>
-            </a:r>
-            <a:br>
-              <a:rPr lang="en-US" dirty="0" smtClean="0"/>
-            </a:br>
-            <a:r>
-              <a:rPr lang="en-US" dirty="0" smtClean="0"/>
-              <a:t>BPC Specimen(s) Received</a:t>
-            </a:r>
-            <a:endParaRPr lang="en-US" dirty="0"/>
-          </a:p>
-        </p:txBody>
-      </p:sp>
       <p:pic>
         <p:nvPicPr>
-          <p:cNvPr id="2050" name="Picture 2"/>
+          <p:cNvPr id="7" name="Picture 6"/>
           <p:cNvPicPr>
-            <a:picLocks noChangeAspect="1" noChangeArrowheads="1"/>
+            <a:picLocks noChangeAspect="1"/>
           </p:cNvPicPr>
           <p:nvPr/>
         </p:nvPicPr>
@@ -3799,86 +5512,24 @@
               </a:ext>
             </a:extLst>
           </a:blip>
-          <a:srcRect/>
           <a:stretch>
             <a:fillRect/>
           </a:stretch>
         </p:blipFill>
-        <p:spPr bwMode="auto">
+        <p:spPr>
           <a:xfrm>
-            <a:off x="685800" y="1734864"/>
-            <a:ext cx="7848600" cy="5046936"/>
+            <a:off x="474908" y="0"/>
+            <a:ext cx="8194183" cy="6858000"/>
           </a:xfrm>
           <a:prstGeom prst="rect">
             <a:avLst/>
           </a:prstGeom>
-          <a:noFill/>
-          <a:ln>
-            <a:noFill/>
-          </a:ln>
-          <a:extLst>
-            <a:ext uri="{909E8E84-426E-40DD-AFC4-6F175D3DCCD1}">
-              <a14:hiddenFill xmlns:a14="http://schemas.microsoft.com/office/drawing/2010/main">
-                <a:solidFill>
-                  <a:schemeClr val="accent1"/>
-                </a:solidFill>
-              </a14:hiddenFill>
-            </a:ext>
-            <a:ext uri="{91240B29-F687-4F45-9708-019B960494DF}">
-              <a14:hiddenLine xmlns:a14="http://schemas.microsoft.com/office/drawing/2010/main" w="9525">
-                <a:solidFill>
-                  <a:schemeClr val="tx1"/>
-                </a:solidFill>
-                <a:miter lim="800000"/>
-                <a:headEnd/>
-                <a:tailEnd/>
-              </a14:hiddenLine>
-            </a:ext>
-          </a:extLst>
         </p:spPr>
       </p:pic>
-      <p:sp>
-        <p:nvSpPr>
-          <p:cNvPr id="4" name="TextBox 3"/>
-          <p:cNvSpPr txBox="1"/>
-          <p:nvPr/>
-        </p:nvSpPr>
-        <p:spPr>
-          <a:xfrm>
-            <a:off x="762000" y="1447800"/>
-            <a:ext cx="8094395" cy="369332"/>
-          </a:xfrm>
-          <a:prstGeom prst="rect">
-            <a:avLst/>
-          </a:prstGeom>
-          <a:noFill/>
-        </p:spPr>
-        <p:txBody>
-          <a:bodyPr wrap="none" rtlCol="0">
-            <a:spAutoFit/>
-          </a:bodyPr>
-          <a:lstStyle/>
-          <a:p>
-            <a:r>
-              <a:rPr lang="en-US" i="1" dirty="0" smtClean="0"/>
-              <a:t>POST to Matchbox /</a:t>
-            </a:r>
-            <a:r>
-              <a:rPr lang="en-US" i="1" dirty="0" err="1" smtClean="0"/>
-              <a:t>specimens_received</a:t>
-            </a:r>
-            <a:r>
-              <a:rPr lang="en-US" i="1" dirty="0" smtClean="0"/>
-              <a:t>   (conformant to a pre-defined JSON schema)</a:t>
-            </a:r>
-            <a:endParaRPr lang="en-US" i="1" dirty="0"/>
-          </a:p>
-        </p:txBody>
-      </p:sp>
     </p:spTree>
     <p:extLst>
       <p:ext uri="{BB962C8B-B14F-4D97-AF65-F5344CB8AC3E}">
-        <p14:creationId xmlns:p14="http://schemas.microsoft.com/office/powerpoint/2010/main" val="2678191442"/>
+        <p14:creationId xmlns:p14="http://schemas.microsoft.com/office/powerpoint/2010/main" val="1699135138"/>
       </p:ext>
     </p:extLst>
   </p:cSld>
@@ -3914,1083 +5565,92 @@
       </p:grpSpPr>
       <p:sp>
         <p:nvSpPr>
-          <p:cNvPr id="4" name="TextBox 3"/>
-          <p:cNvSpPr txBox="1"/>
+          <p:cNvPr id="3" name="Title 1"/>
+          <p:cNvSpPr>
+            <a:spLocks noGrp="1"/>
+          </p:cNvSpPr>
+          <p:nvPr>
+            <p:ph type="title"/>
+          </p:nvPr>
+        </p:nvSpPr>
+        <p:spPr>
+          <a:xfrm>
+            <a:off x="457200" y="0"/>
+            <a:ext cx="8229600" cy="914400"/>
+          </a:xfrm>
+        </p:spPr>
+        <p:txBody>
+          <a:bodyPr>
+            <a:normAutofit/>
+          </a:bodyPr>
+          <a:lstStyle/>
+          <a:p>
+            <a:r>
+              <a:rPr lang="en-US" sz="3600" dirty="0" smtClean="0"/>
+              <a:t>“Specimen Received” Integration Message</a:t>
+            </a:r>
+            <a:endParaRPr lang="en-US" sz="3600" dirty="0"/>
+          </a:p>
+        </p:txBody>
+      </p:sp>
+      <p:pic>
+        <p:nvPicPr>
+          <p:cNvPr id="1027" name="Picture 3"/>
+          <p:cNvPicPr>
+            <a:picLocks noChangeAspect="1" noChangeArrowheads="1"/>
+          </p:cNvPicPr>
           <p:nvPr/>
-        </p:nvSpPr>
-        <p:spPr>
+        </p:nvPicPr>
+        <p:blipFill>
+          <a:blip r:embed="rId2">
+            <a:extLst>
+              <a:ext uri="{28A0092B-C50C-407E-A947-70E740481C1C}">
+                <a14:useLocalDpi xmlns:a14="http://schemas.microsoft.com/office/drawing/2010/main" val="0"/>
+              </a:ext>
+            </a:extLst>
+          </a:blip>
+          <a:srcRect/>
+          <a:stretch>
+            <a:fillRect/>
+          </a:stretch>
+        </p:blipFill>
+        <p:spPr bwMode="auto">
           <a:xfrm>
-            <a:off x="381000" y="533400"/>
-            <a:ext cx="2741456" cy="5262979"/>
+            <a:off x="838200" y="845745"/>
+            <a:ext cx="7696200" cy="5936055"/>
           </a:xfrm>
           <a:prstGeom prst="rect">
             <a:avLst/>
           </a:prstGeom>
           <a:noFill/>
-        </p:spPr>
-        <p:txBody>
-          <a:bodyPr wrap="none" rtlCol="0">
-            <a:spAutoFit/>
-          </a:bodyPr>
-          <a:lstStyle/>
-          <a:p>
-            <a:r>
-              <a:rPr lang="en-US" sz="600" dirty="0">
-                <a:latin typeface="Courier New" panose="02070309020205020404" pitchFamily="49" charset="0"/>
-                <a:cs typeface="Courier New" panose="02070309020205020404" pitchFamily="49" charset="0"/>
-              </a:rPr>
-              <a:t>{</a:t>
-            </a:r>
-          </a:p>
-          <a:p>
-            <a:r>
-              <a:rPr lang="en-US" sz="600" dirty="0">
-                <a:latin typeface="Courier New" panose="02070309020205020404" pitchFamily="49" charset="0"/>
-                <a:cs typeface="Courier New" panose="02070309020205020404" pitchFamily="49" charset="0"/>
-              </a:rPr>
-              <a:t>  "header": {</a:t>
-            </a:r>
-          </a:p>
-          <a:p>
-            <a:r>
-              <a:rPr lang="en-US" sz="600" dirty="0">
-                <a:latin typeface="Courier New" panose="02070309020205020404" pitchFamily="49" charset="0"/>
-                <a:cs typeface="Courier New" panose="02070309020205020404" pitchFamily="49" charset="0"/>
-              </a:rPr>
-              <a:t>    "</a:t>
-            </a:r>
-            <a:r>
-              <a:rPr lang="en-US" sz="600" dirty="0" err="1">
-                <a:latin typeface="Courier New" panose="02070309020205020404" pitchFamily="49" charset="0"/>
-                <a:cs typeface="Courier New" panose="02070309020205020404" pitchFamily="49" charset="0"/>
-              </a:rPr>
-              <a:t>msg_guid</a:t>
-            </a:r>
-            <a:r>
-              <a:rPr lang="en-US" sz="600" dirty="0">
-                <a:latin typeface="Courier New" panose="02070309020205020404" pitchFamily="49" charset="0"/>
-                <a:cs typeface="Courier New" panose="02070309020205020404" pitchFamily="49" charset="0"/>
-              </a:rPr>
-              <a:t>": "5c64192f-8a25-4874-9db6-fd55c398822d",</a:t>
-            </a:r>
-          </a:p>
-          <a:p>
-            <a:r>
-              <a:rPr lang="en-US" sz="600" dirty="0">
-                <a:latin typeface="Courier New" panose="02070309020205020404" pitchFamily="49" charset="0"/>
-                <a:cs typeface="Courier New" panose="02070309020205020404" pitchFamily="49" charset="0"/>
-              </a:rPr>
-              <a:t>    "</a:t>
-            </a:r>
-            <a:r>
-              <a:rPr lang="en-US" sz="600" dirty="0" err="1">
-                <a:latin typeface="Courier New" panose="02070309020205020404" pitchFamily="49" charset="0"/>
-                <a:cs typeface="Courier New" panose="02070309020205020404" pitchFamily="49" charset="0"/>
-              </a:rPr>
-              <a:t>msg_dttm</a:t>
-            </a:r>
-            <a:r>
-              <a:rPr lang="en-US" sz="600" dirty="0">
-                <a:latin typeface="Courier New" panose="02070309020205020404" pitchFamily="49" charset="0"/>
-                <a:cs typeface="Courier New" panose="02070309020205020404" pitchFamily="49" charset="0"/>
-              </a:rPr>
-              <a:t>": "2016-04-25T18:42:13+00:00"</a:t>
-            </a:r>
-          </a:p>
-          <a:p>
-            <a:r>
-              <a:rPr lang="en-US" sz="600" dirty="0">
-                <a:latin typeface="Courier New" panose="02070309020205020404" pitchFamily="49" charset="0"/>
-                <a:cs typeface="Courier New" panose="02070309020205020404" pitchFamily="49" charset="0"/>
-              </a:rPr>
-              <a:t>  },</a:t>
-            </a:r>
-          </a:p>
-          <a:p>
-            <a:r>
-              <a:rPr lang="en-US" sz="600" dirty="0">
-                <a:latin typeface="Courier New" panose="02070309020205020404" pitchFamily="49" charset="0"/>
-                <a:cs typeface="Courier New" panose="02070309020205020404" pitchFamily="49" charset="0"/>
-              </a:rPr>
-              <a:t>  "</a:t>
-            </a:r>
-            <a:r>
-              <a:rPr lang="en-US" sz="600" dirty="0" err="1">
-                <a:latin typeface="Courier New" panose="02070309020205020404" pitchFamily="49" charset="0"/>
-                <a:cs typeface="Courier New" panose="02070309020205020404" pitchFamily="49" charset="0"/>
-              </a:rPr>
-              <a:t>specimens_received</a:t>
-            </a:r>
-            <a:r>
-              <a:rPr lang="en-US" sz="600" dirty="0">
-                <a:latin typeface="Courier New" panose="02070309020205020404" pitchFamily="49" charset="0"/>
-                <a:cs typeface="Courier New" panose="02070309020205020404" pitchFamily="49" charset="0"/>
-              </a:rPr>
-              <a:t>": [</a:t>
-            </a:r>
-          </a:p>
-          <a:p>
-            <a:r>
-              <a:rPr lang="en-US" sz="600" dirty="0">
-                <a:latin typeface="Courier New" panose="02070309020205020404" pitchFamily="49" charset="0"/>
-                <a:cs typeface="Courier New" panose="02070309020205020404" pitchFamily="49" charset="0"/>
-              </a:rPr>
-              <a:t>    {</a:t>
-            </a:r>
-          </a:p>
-          <a:p>
-            <a:r>
-              <a:rPr lang="en-US" sz="600" dirty="0">
-                <a:latin typeface="Courier New" panose="02070309020205020404" pitchFamily="49" charset="0"/>
-                <a:cs typeface="Courier New" panose="02070309020205020404" pitchFamily="49" charset="0"/>
-              </a:rPr>
-              <a:t>      "</a:t>
-            </a:r>
-            <a:r>
-              <a:rPr lang="en-US" sz="600" dirty="0" err="1">
-                <a:latin typeface="Courier New" panose="02070309020205020404" pitchFamily="49" charset="0"/>
-                <a:cs typeface="Courier New" panose="02070309020205020404" pitchFamily="49" charset="0"/>
-              </a:rPr>
-              <a:t>patient_id</a:t>
-            </a:r>
-            <a:r>
-              <a:rPr lang="en-US" sz="600" dirty="0">
-                <a:latin typeface="Courier New" panose="02070309020205020404" pitchFamily="49" charset="0"/>
-                <a:cs typeface="Courier New" panose="02070309020205020404" pitchFamily="49" charset="0"/>
-              </a:rPr>
-              <a:t>": "17364",</a:t>
-            </a:r>
-          </a:p>
-          <a:p>
-            <a:r>
-              <a:rPr lang="en-US" sz="600" dirty="0">
-                <a:latin typeface="Courier New" panose="02070309020205020404" pitchFamily="49" charset="0"/>
-                <a:cs typeface="Courier New" panose="02070309020205020404" pitchFamily="49" charset="0"/>
-              </a:rPr>
-              <a:t>      "</a:t>
-            </a:r>
-            <a:r>
-              <a:rPr lang="en-US" sz="600" dirty="0" err="1">
-                <a:latin typeface="Courier New" panose="02070309020205020404" pitchFamily="49" charset="0"/>
-                <a:cs typeface="Courier New" panose="02070309020205020404" pitchFamily="49" charset="0"/>
-              </a:rPr>
-              <a:t>specimen_correlation_id</a:t>
-            </a:r>
-            <a:r>
-              <a:rPr lang="en-US" sz="600" dirty="0">
-                <a:latin typeface="Courier New" panose="02070309020205020404" pitchFamily="49" charset="0"/>
-                <a:cs typeface="Courier New" panose="02070309020205020404" pitchFamily="49" charset="0"/>
-              </a:rPr>
-              <a:t>": "SCI-123456",</a:t>
-            </a:r>
-          </a:p>
-          <a:p>
-            <a:r>
-              <a:rPr lang="en-US" sz="600" dirty="0">
-                <a:latin typeface="Courier New" panose="02070309020205020404" pitchFamily="49" charset="0"/>
-                <a:cs typeface="Courier New" panose="02070309020205020404" pitchFamily="49" charset="0"/>
-              </a:rPr>
-              <a:t>      "type": "Blood",</a:t>
-            </a:r>
-          </a:p>
-          <a:p>
-            <a:r>
-              <a:rPr lang="en-US" sz="600" dirty="0">
-                <a:latin typeface="Courier New" panose="02070309020205020404" pitchFamily="49" charset="0"/>
-                <a:cs typeface="Courier New" panose="02070309020205020404" pitchFamily="49" charset="0"/>
-              </a:rPr>
-              <a:t>      "</a:t>
-            </a:r>
-            <a:r>
-              <a:rPr lang="en-US" sz="600" dirty="0" err="1">
-                <a:latin typeface="Courier New" panose="02070309020205020404" pitchFamily="49" charset="0"/>
-                <a:cs typeface="Courier New" panose="02070309020205020404" pitchFamily="49" charset="0"/>
-              </a:rPr>
-              <a:t>received_ts</a:t>
-            </a:r>
-            <a:r>
-              <a:rPr lang="en-US" sz="600" dirty="0">
-                <a:latin typeface="Courier New" panose="02070309020205020404" pitchFamily="49" charset="0"/>
-                <a:cs typeface="Courier New" panose="02070309020205020404" pitchFamily="49" charset="0"/>
-              </a:rPr>
-              <a:t>": "2016-04-25T15:17:11+00:00",</a:t>
-            </a:r>
-          </a:p>
-          <a:p>
-            <a:r>
-              <a:rPr lang="en-US" sz="600" dirty="0">
-                <a:latin typeface="Courier New" panose="02070309020205020404" pitchFamily="49" charset="0"/>
-                <a:cs typeface="Courier New" panose="02070309020205020404" pitchFamily="49" charset="0"/>
-              </a:rPr>
-              <a:t>      "</a:t>
-            </a:r>
-            <a:r>
-              <a:rPr lang="en-US" sz="600" dirty="0" err="1">
-                <a:latin typeface="Courier New" panose="02070309020205020404" pitchFamily="49" charset="0"/>
-                <a:cs typeface="Courier New" panose="02070309020205020404" pitchFamily="49" charset="0"/>
-              </a:rPr>
-              <a:t>qc_ts</a:t>
-            </a:r>
-            <a:r>
-              <a:rPr lang="en-US" sz="600" dirty="0">
-                <a:latin typeface="Courier New" panose="02070309020205020404" pitchFamily="49" charset="0"/>
-                <a:cs typeface="Courier New" panose="02070309020205020404" pitchFamily="49" charset="0"/>
-              </a:rPr>
-              <a:t>": "2016-04-25T16:21:34+00:00",</a:t>
-            </a:r>
-          </a:p>
-          <a:p>
-            <a:r>
-              <a:rPr lang="en-US" sz="600" dirty="0">
-                <a:latin typeface="Courier New" panose="02070309020205020404" pitchFamily="49" charset="0"/>
-                <a:cs typeface="Courier New" panose="02070309020205020404" pitchFamily="49" charset="0"/>
-              </a:rPr>
-              <a:t>      "</a:t>
-            </a:r>
-            <a:r>
-              <a:rPr lang="en-US" sz="600" dirty="0" err="1">
-                <a:latin typeface="Courier New" panose="02070309020205020404" pitchFamily="49" charset="0"/>
-                <a:cs typeface="Courier New" panose="02070309020205020404" pitchFamily="49" charset="0"/>
-              </a:rPr>
-              <a:t>internal_use_only</a:t>
-            </a:r>
-            <a:r>
-              <a:rPr lang="en-US" sz="600" dirty="0">
-                <a:latin typeface="Courier New" panose="02070309020205020404" pitchFamily="49" charset="0"/>
-                <a:cs typeface="Courier New" panose="02070309020205020404" pitchFamily="49" charset="0"/>
-              </a:rPr>
-              <a:t>": {</a:t>
-            </a:r>
-          </a:p>
-          <a:p>
-            <a:r>
-              <a:rPr lang="en-US" sz="600" dirty="0">
-                <a:latin typeface="Courier New" panose="02070309020205020404" pitchFamily="49" charset="0"/>
-                <a:cs typeface="Courier New" panose="02070309020205020404" pitchFamily="49" charset="0"/>
-              </a:rPr>
-              <a:t>        "</a:t>
-            </a:r>
-            <a:r>
-              <a:rPr lang="en-US" sz="600" dirty="0" err="1">
-                <a:latin typeface="Courier New" panose="02070309020205020404" pitchFamily="49" charset="0"/>
-                <a:cs typeface="Courier New" panose="02070309020205020404" pitchFamily="49" charset="0"/>
-              </a:rPr>
-              <a:t>stars_patient_id</a:t>
-            </a:r>
-            <a:r>
-              <a:rPr lang="en-US" sz="600" dirty="0">
-                <a:latin typeface="Courier New" panose="02070309020205020404" pitchFamily="49" charset="0"/>
-                <a:cs typeface="Courier New" panose="02070309020205020404" pitchFamily="49" charset="0"/>
-              </a:rPr>
-              <a:t>": "ABCXYZ",</a:t>
-            </a:r>
-          </a:p>
-          <a:p>
-            <a:r>
-              <a:rPr lang="en-US" sz="600" dirty="0">
-                <a:latin typeface="Courier New" panose="02070309020205020404" pitchFamily="49" charset="0"/>
-                <a:cs typeface="Courier New" panose="02070309020205020404" pitchFamily="49" charset="0"/>
-              </a:rPr>
-              <a:t>        "</a:t>
-            </a:r>
-            <a:r>
-              <a:rPr lang="en-US" sz="600" dirty="0" err="1">
-                <a:latin typeface="Courier New" panose="02070309020205020404" pitchFamily="49" charset="0"/>
-                <a:cs typeface="Courier New" panose="02070309020205020404" pitchFamily="49" charset="0"/>
-              </a:rPr>
-              <a:t>stars_specimen_id</a:t>
-            </a:r>
-            <a:r>
-              <a:rPr lang="en-US" sz="600" dirty="0">
-                <a:latin typeface="Courier New" panose="02070309020205020404" pitchFamily="49" charset="0"/>
-                <a:cs typeface="Courier New" panose="02070309020205020404" pitchFamily="49" charset="0"/>
-              </a:rPr>
-              <a:t>": "ABCXYZ-ABC123",</a:t>
-            </a:r>
-          </a:p>
-          <a:p>
-            <a:r>
-              <a:rPr lang="en-US" sz="600" dirty="0">
-                <a:latin typeface="Courier New" panose="02070309020205020404" pitchFamily="49" charset="0"/>
-                <a:cs typeface="Courier New" panose="02070309020205020404" pitchFamily="49" charset="0"/>
-              </a:rPr>
-              <a:t>        "</a:t>
-            </a:r>
-            <a:r>
-              <a:rPr lang="en-US" sz="600" dirty="0" err="1">
-                <a:latin typeface="Courier New" panose="02070309020205020404" pitchFamily="49" charset="0"/>
-                <a:cs typeface="Courier New" panose="02070309020205020404" pitchFamily="49" charset="0"/>
-              </a:rPr>
-              <a:t>stars_specimen_type</a:t>
-            </a:r>
-            <a:r>
-              <a:rPr lang="en-US" sz="600" dirty="0">
-                <a:latin typeface="Courier New" panose="02070309020205020404" pitchFamily="49" charset="0"/>
-                <a:cs typeface="Courier New" panose="02070309020205020404" pitchFamily="49" charset="0"/>
-              </a:rPr>
-              <a:t>": "Fresh Blood"</a:t>
-            </a:r>
-          </a:p>
-          <a:p>
-            <a:r>
-              <a:rPr lang="en-US" sz="600" dirty="0">
-                <a:latin typeface="Courier New" panose="02070309020205020404" pitchFamily="49" charset="0"/>
-                <a:cs typeface="Courier New" panose="02070309020205020404" pitchFamily="49" charset="0"/>
-              </a:rPr>
-              <a:t>      }</a:t>
-            </a:r>
-          </a:p>
-          <a:p>
-            <a:r>
-              <a:rPr lang="en-US" sz="600" dirty="0">
-                <a:latin typeface="Courier New" panose="02070309020205020404" pitchFamily="49" charset="0"/>
-                <a:cs typeface="Courier New" panose="02070309020205020404" pitchFamily="49" charset="0"/>
-              </a:rPr>
-              <a:t>    },</a:t>
-            </a:r>
-          </a:p>
-          <a:p>
-            <a:r>
-              <a:rPr lang="en-US" sz="600" dirty="0">
-                <a:latin typeface="Courier New" panose="02070309020205020404" pitchFamily="49" charset="0"/>
-                <a:cs typeface="Courier New" panose="02070309020205020404" pitchFamily="49" charset="0"/>
-              </a:rPr>
-              <a:t>    {</a:t>
-            </a:r>
-          </a:p>
-          <a:p>
-            <a:r>
-              <a:rPr lang="en-US" sz="600" dirty="0">
-                <a:latin typeface="Courier New" panose="02070309020205020404" pitchFamily="49" charset="0"/>
-                <a:cs typeface="Courier New" panose="02070309020205020404" pitchFamily="49" charset="0"/>
-              </a:rPr>
-              <a:t>      "</a:t>
-            </a:r>
-            <a:r>
-              <a:rPr lang="en-US" sz="600" dirty="0" err="1">
-                <a:latin typeface="Courier New" panose="02070309020205020404" pitchFamily="49" charset="0"/>
-                <a:cs typeface="Courier New" panose="02070309020205020404" pitchFamily="49" charset="0"/>
-              </a:rPr>
-              <a:t>patient_id</a:t>
-            </a:r>
-            <a:r>
-              <a:rPr lang="en-US" sz="600" dirty="0">
-                <a:latin typeface="Courier New" panose="02070309020205020404" pitchFamily="49" charset="0"/>
-                <a:cs typeface="Courier New" panose="02070309020205020404" pitchFamily="49" charset="0"/>
-              </a:rPr>
-              <a:t>": "23123",</a:t>
-            </a:r>
-          </a:p>
-          <a:p>
-            <a:r>
-              <a:rPr lang="en-US" sz="600" dirty="0">
-                <a:latin typeface="Courier New" panose="02070309020205020404" pitchFamily="49" charset="0"/>
-                <a:cs typeface="Courier New" panose="02070309020205020404" pitchFamily="49" charset="0"/>
-              </a:rPr>
-              <a:t>      "</a:t>
-            </a:r>
-            <a:r>
-              <a:rPr lang="en-US" sz="600" dirty="0" err="1">
-                <a:latin typeface="Courier New" panose="02070309020205020404" pitchFamily="49" charset="0"/>
-                <a:cs typeface="Courier New" panose="02070309020205020404" pitchFamily="49" charset="0"/>
-              </a:rPr>
-              <a:t>specimen_correlation_id</a:t>
-            </a:r>
-            <a:r>
-              <a:rPr lang="en-US" sz="600" dirty="0">
-                <a:latin typeface="Courier New" panose="02070309020205020404" pitchFamily="49" charset="0"/>
-                <a:cs typeface="Courier New" panose="02070309020205020404" pitchFamily="49" charset="0"/>
-              </a:rPr>
-              <a:t>": "SCI-77864",</a:t>
-            </a:r>
-          </a:p>
-          <a:p>
-            <a:r>
-              <a:rPr lang="en-US" sz="600" dirty="0">
-                <a:latin typeface="Courier New" panose="02070309020205020404" pitchFamily="49" charset="0"/>
-                <a:cs typeface="Courier New" panose="02070309020205020404" pitchFamily="49" charset="0"/>
-              </a:rPr>
-              <a:t>      "type": "Tumor Tissue",</a:t>
-            </a:r>
-          </a:p>
-          <a:p>
-            <a:r>
-              <a:rPr lang="en-US" sz="600" dirty="0">
-                <a:latin typeface="Courier New" panose="02070309020205020404" pitchFamily="49" charset="0"/>
-                <a:cs typeface="Courier New" panose="02070309020205020404" pitchFamily="49" charset="0"/>
-              </a:rPr>
-              <a:t>      "</a:t>
-            </a:r>
-            <a:r>
-              <a:rPr lang="en-US" sz="600" dirty="0" err="1">
-                <a:latin typeface="Courier New" panose="02070309020205020404" pitchFamily="49" charset="0"/>
-                <a:cs typeface="Courier New" panose="02070309020205020404" pitchFamily="49" charset="0"/>
-              </a:rPr>
-              <a:t>received_ts</a:t>
-            </a:r>
-            <a:r>
-              <a:rPr lang="en-US" sz="600" dirty="0">
-                <a:latin typeface="Courier New" panose="02070309020205020404" pitchFamily="49" charset="0"/>
-                <a:cs typeface="Courier New" panose="02070309020205020404" pitchFamily="49" charset="0"/>
-              </a:rPr>
-              <a:t>": "2016-04-25T16:17:11+00:00",</a:t>
-            </a:r>
-          </a:p>
-          <a:p>
-            <a:r>
-              <a:rPr lang="en-US" sz="600" dirty="0">
-                <a:latin typeface="Courier New" panose="02070309020205020404" pitchFamily="49" charset="0"/>
-                <a:cs typeface="Courier New" panose="02070309020205020404" pitchFamily="49" charset="0"/>
-              </a:rPr>
-              <a:t>      "</a:t>
-            </a:r>
-            <a:r>
-              <a:rPr lang="en-US" sz="600" dirty="0" err="1">
-                <a:latin typeface="Courier New" panose="02070309020205020404" pitchFamily="49" charset="0"/>
-                <a:cs typeface="Courier New" panose="02070309020205020404" pitchFamily="49" charset="0"/>
-              </a:rPr>
-              <a:t>qc_ts</a:t>
-            </a:r>
-            <a:r>
-              <a:rPr lang="en-US" sz="600" dirty="0">
-                <a:latin typeface="Courier New" panose="02070309020205020404" pitchFamily="49" charset="0"/>
-                <a:cs typeface="Courier New" panose="02070309020205020404" pitchFamily="49" charset="0"/>
-              </a:rPr>
-              <a:t>": "2016-04-25T17:21:34+00:00",</a:t>
-            </a:r>
-          </a:p>
-          <a:p>
-            <a:r>
-              <a:rPr lang="en-US" sz="600" dirty="0">
-                <a:latin typeface="Courier New" panose="02070309020205020404" pitchFamily="49" charset="0"/>
-                <a:cs typeface="Courier New" panose="02070309020205020404" pitchFamily="49" charset="0"/>
-              </a:rPr>
-              <a:t>      "</a:t>
-            </a:r>
-            <a:r>
-              <a:rPr lang="en-US" sz="600" dirty="0" err="1">
-                <a:latin typeface="Courier New" panose="02070309020205020404" pitchFamily="49" charset="0"/>
-                <a:cs typeface="Courier New" panose="02070309020205020404" pitchFamily="49" charset="0"/>
-              </a:rPr>
-              <a:t>internal_use_only</a:t>
-            </a:r>
-            <a:r>
-              <a:rPr lang="en-US" sz="600" dirty="0">
-                <a:latin typeface="Courier New" panose="02070309020205020404" pitchFamily="49" charset="0"/>
-                <a:cs typeface="Courier New" panose="02070309020205020404" pitchFamily="49" charset="0"/>
-              </a:rPr>
-              <a:t>": {</a:t>
-            </a:r>
-          </a:p>
-          <a:p>
-            <a:r>
-              <a:rPr lang="en-US" sz="600" dirty="0">
-                <a:latin typeface="Courier New" panose="02070309020205020404" pitchFamily="49" charset="0"/>
-                <a:cs typeface="Courier New" panose="02070309020205020404" pitchFamily="49" charset="0"/>
-              </a:rPr>
-              <a:t>        "</a:t>
-            </a:r>
-            <a:r>
-              <a:rPr lang="en-US" sz="600" dirty="0" err="1">
-                <a:latin typeface="Courier New" panose="02070309020205020404" pitchFamily="49" charset="0"/>
-                <a:cs typeface="Courier New" panose="02070309020205020404" pitchFamily="49" charset="0"/>
-              </a:rPr>
-              <a:t>stars_patient_id</a:t>
-            </a:r>
-            <a:r>
-              <a:rPr lang="en-US" sz="600" dirty="0">
-                <a:latin typeface="Courier New" panose="02070309020205020404" pitchFamily="49" charset="0"/>
-                <a:cs typeface="Courier New" panose="02070309020205020404" pitchFamily="49" charset="0"/>
-              </a:rPr>
-              <a:t>": "QWERTY",</a:t>
-            </a:r>
-          </a:p>
-          <a:p>
-            <a:r>
-              <a:rPr lang="en-US" sz="600" dirty="0">
-                <a:latin typeface="Courier New" panose="02070309020205020404" pitchFamily="49" charset="0"/>
-                <a:cs typeface="Courier New" panose="02070309020205020404" pitchFamily="49" charset="0"/>
-              </a:rPr>
-              <a:t>        "</a:t>
-            </a:r>
-            <a:r>
-              <a:rPr lang="en-US" sz="600" dirty="0" err="1">
-                <a:latin typeface="Courier New" panose="02070309020205020404" pitchFamily="49" charset="0"/>
-                <a:cs typeface="Courier New" panose="02070309020205020404" pitchFamily="49" charset="0"/>
-              </a:rPr>
-              <a:t>stars_specimen_id</a:t>
-            </a:r>
-            <a:r>
-              <a:rPr lang="en-US" sz="600" dirty="0">
-                <a:latin typeface="Courier New" panose="02070309020205020404" pitchFamily="49" charset="0"/>
-                <a:cs typeface="Courier New" panose="02070309020205020404" pitchFamily="49" charset="0"/>
-              </a:rPr>
-              <a:t>": "QWERTY-XYZ222",</a:t>
-            </a:r>
-          </a:p>
-          <a:p>
-            <a:r>
-              <a:rPr lang="en-US" sz="600" dirty="0">
-                <a:latin typeface="Courier New" panose="02070309020205020404" pitchFamily="49" charset="0"/>
-                <a:cs typeface="Courier New" panose="02070309020205020404" pitchFamily="49" charset="0"/>
-              </a:rPr>
-              <a:t>        "</a:t>
-            </a:r>
-            <a:r>
-              <a:rPr lang="en-US" sz="600" dirty="0" err="1">
-                <a:latin typeface="Courier New" panose="02070309020205020404" pitchFamily="49" charset="0"/>
-                <a:cs typeface="Courier New" panose="02070309020205020404" pitchFamily="49" charset="0"/>
-              </a:rPr>
-              <a:t>stars_specimen_type</a:t>
-            </a:r>
-            <a:r>
-              <a:rPr lang="en-US" sz="600" dirty="0">
-                <a:latin typeface="Courier New" panose="02070309020205020404" pitchFamily="49" charset="0"/>
-                <a:cs typeface="Courier New" panose="02070309020205020404" pitchFamily="49" charset="0"/>
-              </a:rPr>
-              <a:t>": "Fresh Tissue Primary"</a:t>
-            </a:r>
-          </a:p>
-          <a:p>
-            <a:r>
-              <a:rPr lang="en-US" sz="600" dirty="0">
-                <a:latin typeface="Courier New" panose="02070309020205020404" pitchFamily="49" charset="0"/>
-                <a:cs typeface="Courier New" panose="02070309020205020404" pitchFamily="49" charset="0"/>
-              </a:rPr>
-              <a:t>      }</a:t>
-            </a:r>
-          </a:p>
-          <a:p>
-            <a:r>
-              <a:rPr lang="en-US" sz="600" dirty="0">
-                <a:latin typeface="Courier New" panose="02070309020205020404" pitchFamily="49" charset="0"/>
-                <a:cs typeface="Courier New" panose="02070309020205020404" pitchFamily="49" charset="0"/>
-              </a:rPr>
-              <a:t>    },</a:t>
-            </a:r>
-          </a:p>
-          <a:p>
-            <a:r>
-              <a:rPr lang="en-US" sz="600" dirty="0">
-                <a:latin typeface="Courier New" panose="02070309020205020404" pitchFamily="49" charset="0"/>
-                <a:cs typeface="Courier New" panose="02070309020205020404" pitchFamily="49" charset="0"/>
-              </a:rPr>
-              <a:t>    {</a:t>
-            </a:r>
-          </a:p>
-          <a:p>
-            <a:r>
-              <a:rPr lang="en-US" sz="600" dirty="0">
-                <a:latin typeface="Courier New" panose="02070309020205020404" pitchFamily="49" charset="0"/>
-                <a:cs typeface="Courier New" panose="02070309020205020404" pitchFamily="49" charset="0"/>
-              </a:rPr>
-              <a:t>      "</a:t>
-            </a:r>
-            <a:r>
-              <a:rPr lang="en-US" sz="600" dirty="0" err="1">
-                <a:latin typeface="Courier New" panose="02070309020205020404" pitchFamily="49" charset="0"/>
-                <a:cs typeface="Courier New" panose="02070309020205020404" pitchFamily="49" charset="0"/>
-              </a:rPr>
-              <a:t>patient_id</a:t>
-            </a:r>
-            <a:r>
-              <a:rPr lang="en-US" sz="600" dirty="0">
-                <a:latin typeface="Courier New" panose="02070309020205020404" pitchFamily="49" charset="0"/>
-                <a:cs typeface="Courier New" panose="02070309020205020404" pitchFamily="49" charset="0"/>
-              </a:rPr>
-              <a:t>": "23123",</a:t>
-            </a:r>
-          </a:p>
-          <a:p>
-            <a:r>
-              <a:rPr lang="en-US" sz="600" dirty="0">
-                <a:latin typeface="Courier New" panose="02070309020205020404" pitchFamily="49" charset="0"/>
-                <a:cs typeface="Courier New" panose="02070309020205020404" pitchFamily="49" charset="0"/>
-              </a:rPr>
-              <a:t>      "</a:t>
-            </a:r>
-            <a:r>
-              <a:rPr lang="en-US" sz="600" dirty="0" err="1">
-                <a:latin typeface="Courier New" panose="02070309020205020404" pitchFamily="49" charset="0"/>
-                <a:cs typeface="Courier New" panose="02070309020205020404" pitchFamily="49" charset="0"/>
-              </a:rPr>
-              <a:t>specimen_correlation_id</a:t>
-            </a:r>
-            <a:r>
-              <a:rPr lang="en-US" sz="600" dirty="0">
-                <a:latin typeface="Courier New" panose="02070309020205020404" pitchFamily="49" charset="0"/>
-                <a:cs typeface="Courier New" panose="02070309020205020404" pitchFamily="49" charset="0"/>
-              </a:rPr>
-              <a:t>": "SCI-77864",</a:t>
-            </a:r>
-          </a:p>
-          <a:p>
-            <a:r>
-              <a:rPr lang="en-US" sz="600" dirty="0">
-                <a:latin typeface="Courier New" panose="02070309020205020404" pitchFamily="49" charset="0"/>
-                <a:cs typeface="Courier New" panose="02070309020205020404" pitchFamily="49" charset="0"/>
-              </a:rPr>
-              <a:t>      "type": "Tumor Tissue",</a:t>
-            </a:r>
-          </a:p>
-          <a:p>
-            <a:r>
-              <a:rPr lang="en-US" sz="600" dirty="0">
-                <a:latin typeface="Courier New" panose="02070309020205020404" pitchFamily="49" charset="0"/>
-                <a:cs typeface="Courier New" panose="02070309020205020404" pitchFamily="49" charset="0"/>
-              </a:rPr>
-              <a:t>      "</a:t>
-            </a:r>
-            <a:r>
-              <a:rPr lang="en-US" sz="600" dirty="0" err="1">
-                <a:latin typeface="Courier New" panose="02070309020205020404" pitchFamily="49" charset="0"/>
-                <a:cs typeface="Courier New" panose="02070309020205020404" pitchFamily="49" charset="0"/>
-              </a:rPr>
-              <a:t>received_ts</a:t>
-            </a:r>
-            <a:r>
-              <a:rPr lang="en-US" sz="600" dirty="0">
-                <a:latin typeface="Courier New" panose="02070309020205020404" pitchFamily="49" charset="0"/>
-                <a:cs typeface="Courier New" panose="02070309020205020404" pitchFamily="49" charset="0"/>
-              </a:rPr>
-              <a:t>": "2016-04-25T16:17:11+00:00",</a:t>
-            </a:r>
-          </a:p>
-          <a:p>
-            <a:r>
-              <a:rPr lang="en-US" sz="600" dirty="0">
-                <a:latin typeface="Courier New" panose="02070309020205020404" pitchFamily="49" charset="0"/>
-                <a:cs typeface="Courier New" panose="02070309020205020404" pitchFamily="49" charset="0"/>
-              </a:rPr>
-              <a:t>      "</a:t>
-            </a:r>
-            <a:r>
-              <a:rPr lang="en-US" sz="600" dirty="0" err="1">
-                <a:latin typeface="Courier New" panose="02070309020205020404" pitchFamily="49" charset="0"/>
-                <a:cs typeface="Courier New" panose="02070309020205020404" pitchFamily="49" charset="0"/>
-              </a:rPr>
-              <a:t>qc_ts</a:t>
-            </a:r>
-            <a:r>
-              <a:rPr lang="en-US" sz="600" dirty="0">
-                <a:latin typeface="Courier New" panose="02070309020205020404" pitchFamily="49" charset="0"/>
-                <a:cs typeface="Courier New" panose="02070309020205020404" pitchFamily="49" charset="0"/>
-              </a:rPr>
-              <a:t>": "2016-04-25T17:21:35+00:00",</a:t>
-            </a:r>
-          </a:p>
-          <a:p>
-            <a:r>
-              <a:rPr lang="en-US" sz="600" dirty="0">
-                <a:latin typeface="Courier New" panose="02070309020205020404" pitchFamily="49" charset="0"/>
-                <a:cs typeface="Courier New" panose="02070309020205020404" pitchFamily="49" charset="0"/>
-              </a:rPr>
-              <a:t>      "</a:t>
-            </a:r>
-            <a:r>
-              <a:rPr lang="en-US" sz="600" dirty="0" err="1">
-                <a:latin typeface="Courier New" panose="02070309020205020404" pitchFamily="49" charset="0"/>
-                <a:cs typeface="Courier New" panose="02070309020205020404" pitchFamily="49" charset="0"/>
-              </a:rPr>
-              <a:t>internal_use_only</a:t>
-            </a:r>
-            <a:r>
-              <a:rPr lang="en-US" sz="600" dirty="0">
-                <a:latin typeface="Courier New" panose="02070309020205020404" pitchFamily="49" charset="0"/>
-                <a:cs typeface="Courier New" panose="02070309020205020404" pitchFamily="49" charset="0"/>
-              </a:rPr>
-              <a:t>": {</a:t>
-            </a:r>
-          </a:p>
-          <a:p>
-            <a:r>
-              <a:rPr lang="en-US" sz="600" dirty="0">
-                <a:latin typeface="Courier New" panose="02070309020205020404" pitchFamily="49" charset="0"/>
-                <a:cs typeface="Courier New" panose="02070309020205020404" pitchFamily="49" charset="0"/>
-              </a:rPr>
-              <a:t>        "</a:t>
-            </a:r>
-            <a:r>
-              <a:rPr lang="en-US" sz="600" dirty="0" err="1">
-                <a:latin typeface="Courier New" panose="02070309020205020404" pitchFamily="49" charset="0"/>
-                <a:cs typeface="Courier New" panose="02070309020205020404" pitchFamily="49" charset="0"/>
-              </a:rPr>
-              <a:t>stars_patient_id</a:t>
-            </a:r>
-            <a:r>
-              <a:rPr lang="en-US" sz="600" dirty="0">
-                <a:latin typeface="Courier New" panose="02070309020205020404" pitchFamily="49" charset="0"/>
-                <a:cs typeface="Courier New" panose="02070309020205020404" pitchFamily="49" charset="0"/>
-              </a:rPr>
-              <a:t>": "QWERTY",</a:t>
-            </a:r>
-          </a:p>
-          <a:p>
-            <a:r>
-              <a:rPr lang="en-US" sz="600" dirty="0">
-                <a:latin typeface="Courier New" panose="02070309020205020404" pitchFamily="49" charset="0"/>
-                <a:cs typeface="Courier New" panose="02070309020205020404" pitchFamily="49" charset="0"/>
-              </a:rPr>
-              <a:t>        "</a:t>
-            </a:r>
-            <a:r>
-              <a:rPr lang="en-US" sz="600" dirty="0" err="1">
-                <a:latin typeface="Courier New" panose="02070309020205020404" pitchFamily="49" charset="0"/>
-                <a:cs typeface="Courier New" panose="02070309020205020404" pitchFamily="49" charset="0"/>
-              </a:rPr>
-              <a:t>stars_specimen_id</a:t>
-            </a:r>
-            <a:r>
-              <a:rPr lang="en-US" sz="600" dirty="0">
-                <a:latin typeface="Courier New" panose="02070309020205020404" pitchFamily="49" charset="0"/>
-                <a:cs typeface="Courier New" panose="02070309020205020404" pitchFamily="49" charset="0"/>
-              </a:rPr>
-              <a:t>": "QWERTY-XYZ223",</a:t>
-            </a:r>
-          </a:p>
-          <a:p>
-            <a:r>
-              <a:rPr lang="en-US" sz="600" dirty="0">
-                <a:latin typeface="Courier New" panose="02070309020205020404" pitchFamily="49" charset="0"/>
-                <a:cs typeface="Courier New" panose="02070309020205020404" pitchFamily="49" charset="0"/>
-              </a:rPr>
-              <a:t>        "</a:t>
-            </a:r>
-            <a:r>
-              <a:rPr lang="en-US" sz="600" dirty="0" err="1">
-                <a:latin typeface="Courier New" panose="02070309020205020404" pitchFamily="49" charset="0"/>
-                <a:cs typeface="Courier New" panose="02070309020205020404" pitchFamily="49" charset="0"/>
-              </a:rPr>
-              <a:t>stars_specimen_type</a:t>
-            </a:r>
-            <a:r>
-              <a:rPr lang="en-US" sz="600" dirty="0">
-                <a:latin typeface="Courier New" panose="02070309020205020404" pitchFamily="49" charset="0"/>
-                <a:cs typeface="Courier New" panose="02070309020205020404" pitchFamily="49" charset="0"/>
-              </a:rPr>
-              <a:t>": "Fresh Tissue Primary"</a:t>
-            </a:r>
-          </a:p>
-          <a:p>
-            <a:r>
-              <a:rPr lang="en-US" sz="600" dirty="0">
-                <a:latin typeface="Courier New" panose="02070309020205020404" pitchFamily="49" charset="0"/>
-                <a:cs typeface="Courier New" panose="02070309020205020404" pitchFamily="49" charset="0"/>
-              </a:rPr>
-              <a:t>      }</a:t>
-            </a:r>
-          </a:p>
-          <a:p>
-            <a:r>
-              <a:rPr lang="en-US" sz="600" dirty="0">
-                <a:latin typeface="Courier New" panose="02070309020205020404" pitchFamily="49" charset="0"/>
-                <a:cs typeface="Courier New" panose="02070309020205020404" pitchFamily="49" charset="0"/>
-              </a:rPr>
-              <a:t>    },</a:t>
-            </a:r>
-          </a:p>
-          <a:p>
-            <a:r>
-              <a:rPr lang="en-US" sz="600" dirty="0">
-                <a:latin typeface="Courier New" panose="02070309020205020404" pitchFamily="49" charset="0"/>
-                <a:cs typeface="Courier New" panose="02070309020205020404" pitchFamily="49" charset="0"/>
-              </a:rPr>
-              <a:t>    {</a:t>
-            </a:r>
-          </a:p>
-          <a:p>
-            <a:r>
-              <a:rPr lang="en-US" sz="600" dirty="0">
-                <a:latin typeface="Courier New" panose="02070309020205020404" pitchFamily="49" charset="0"/>
-                <a:cs typeface="Courier New" panose="02070309020205020404" pitchFamily="49" charset="0"/>
-              </a:rPr>
-              <a:t>      "</a:t>
-            </a:r>
-            <a:r>
-              <a:rPr lang="en-US" sz="600" dirty="0" err="1">
-                <a:latin typeface="Courier New" panose="02070309020205020404" pitchFamily="49" charset="0"/>
-                <a:cs typeface="Courier New" panose="02070309020205020404" pitchFamily="49" charset="0"/>
-              </a:rPr>
-              <a:t>patient_id</a:t>
-            </a:r>
-            <a:r>
-              <a:rPr lang="en-US" sz="600" dirty="0">
-                <a:latin typeface="Courier New" panose="02070309020205020404" pitchFamily="49" charset="0"/>
-                <a:cs typeface="Courier New" panose="02070309020205020404" pitchFamily="49" charset="0"/>
-              </a:rPr>
-              <a:t>": "23123",</a:t>
-            </a:r>
-          </a:p>
-          <a:p>
-            <a:r>
-              <a:rPr lang="en-US" sz="600" dirty="0">
-                <a:latin typeface="Courier New" panose="02070309020205020404" pitchFamily="49" charset="0"/>
-                <a:cs typeface="Courier New" panose="02070309020205020404" pitchFamily="49" charset="0"/>
-              </a:rPr>
-              <a:t>      "</a:t>
-            </a:r>
-            <a:r>
-              <a:rPr lang="en-US" sz="600" dirty="0" err="1">
-                <a:latin typeface="Courier New" panose="02070309020205020404" pitchFamily="49" charset="0"/>
-                <a:cs typeface="Courier New" panose="02070309020205020404" pitchFamily="49" charset="0"/>
-              </a:rPr>
-              <a:t>specimen_correlation_id</a:t>
-            </a:r>
-            <a:r>
-              <a:rPr lang="en-US" sz="600" dirty="0">
-                <a:latin typeface="Courier New" panose="02070309020205020404" pitchFamily="49" charset="0"/>
-                <a:cs typeface="Courier New" panose="02070309020205020404" pitchFamily="49" charset="0"/>
-              </a:rPr>
-              <a:t>": "SCI-77865",</a:t>
-            </a:r>
-          </a:p>
-          <a:p>
-            <a:r>
-              <a:rPr lang="en-US" sz="600" dirty="0">
-                <a:latin typeface="Courier New" panose="02070309020205020404" pitchFamily="49" charset="0"/>
-                <a:cs typeface="Courier New" panose="02070309020205020404" pitchFamily="49" charset="0"/>
-              </a:rPr>
-              <a:t>      "type": "Blood",</a:t>
-            </a:r>
-          </a:p>
-          <a:p>
-            <a:r>
-              <a:rPr lang="en-US" sz="600" dirty="0">
-                <a:latin typeface="Courier New" panose="02070309020205020404" pitchFamily="49" charset="0"/>
-                <a:cs typeface="Courier New" panose="02070309020205020404" pitchFamily="49" charset="0"/>
-              </a:rPr>
-              <a:t>      "</a:t>
-            </a:r>
-            <a:r>
-              <a:rPr lang="en-US" sz="600" dirty="0" err="1">
-                <a:latin typeface="Courier New" panose="02070309020205020404" pitchFamily="49" charset="0"/>
-                <a:cs typeface="Courier New" panose="02070309020205020404" pitchFamily="49" charset="0"/>
-              </a:rPr>
-              <a:t>received_ts</a:t>
-            </a:r>
-            <a:r>
-              <a:rPr lang="en-US" sz="600" dirty="0">
-                <a:latin typeface="Courier New" panose="02070309020205020404" pitchFamily="49" charset="0"/>
-                <a:cs typeface="Courier New" panose="02070309020205020404" pitchFamily="49" charset="0"/>
-              </a:rPr>
-              <a:t>": "2016-04-25T15:17:11+00:00",</a:t>
-            </a:r>
-          </a:p>
-          <a:p>
-            <a:r>
-              <a:rPr lang="en-US" sz="600" dirty="0">
-                <a:latin typeface="Courier New" panose="02070309020205020404" pitchFamily="49" charset="0"/>
-                <a:cs typeface="Courier New" panose="02070309020205020404" pitchFamily="49" charset="0"/>
-              </a:rPr>
-              <a:t>      "</a:t>
-            </a:r>
-            <a:r>
-              <a:rPr lang="en-US" sz="600" dirty="0" err="1">
-                <a:latin typeface="Courier New" panose="02070309020205020404" pitchFamily="49" charset="0"/>
-                <a:cs typeface="Courier New" panose="02070309020205020404" pitchFamily="49" charset="0"/>
-              </a:rPr>
-              <a:t>qc_ts</a:t>
-            </a:r>
-            <a:r>
-              <a:rPr lang="en-US" sz="600" dirty="0">
-                <a:latin typeface="Courier New" panose="02070309020205020404" pitchFamily="49" charset="0"/>
-                <a:cs typeface="Courier New" panose="02070309020205020404" pitchFamily="49" charset="0"/>
-              </a:rPr>
-              <a:t>": "2016-04-25T16:21:34+00:00",</a:t>
-            </a:r>
-          </a:p>
-          <a:p>
-            <a:r>
-              <a:rPr lang="en-US" sz="600" dirty="0">
-                <a:latin typeface="Courier New" panose="02070309020205020404" pitchFamily="49" charset="0"/>
-                <a:cs typeface="Courier New" panose="02070309020205020404" pitchFamily="49" charset="0"/>
-              </a:rPr>
-              <a:t>      "</a:t>
-            </a:r>
-            <a:r>
-              <a:rPr lang="en-US" sz="600" dirty="0" err="1">
-                <a:latin typeface="Courier New" panose="02070309020205020404" pitchFamily="49" charset="0"/>
-                <a:cs typeface="Courier New" panose="02070309020205020404" pitchFamily="49" charset="0"/>
-              </a:rPr>
-              <a:t>internal_use_only</a:t>
-            </a:r>
-            <a:r>
-              <a:rPr lang="en-US" sz="600" dirty="0">
-                <a:latin typeface="Courier New" panose="02070309020205020404" pitchFamily="49" charset="0"/>
-                <a:cs typeface="Courier New" panose="02070309020205020404" pitchFamily="49" charset="0"/>
-              </a:rPr>
-              <a:t>": {</a:t>
-            </a:r>
-          </a:p>
-          <a:p>
-            <a:r>
-              <a:rPr lang="en-US" sz="600" dirty="0">
-                <a:latin typeface="Courier New" panose="02070309020205020404" pitchFamily="49" charset="0"/>
-                <a:cs typeface="Courier New" panose="02070309020205020404" pitchFamily="49" charset="0"/>
-              </a:rPr>
-              <a:t>        "</a:t>
-            </a:r>
-            <a:r>
-              <a:rPr lang="en-US" sz="600" dirty="0" err="1">
-                <a:latin typeface="Courier New" panose="02070309020205020404" pitchFamily="49" charset="0"/>
-                <a:cs typeface="Courier New" panose="02070309020205020404" pitchFamily="49" charset="0"/>
-              </a:rPr>
-              <a:t>stars_patient_id</a:t>
-            </a:r>
-            <a:r>
-              <a:rPr lang="en-US" sz="600" dirty="0">
-                <a:latin typeface="Courier New" panose="02070309020205020404" pitchFamily="49" charset="0"/>
-                <a:cs typeface="Courier New" panose="02070309020205020404" pitchFamily="49" charset="0"/>
-              </a:rPr>
-              <a:t>": "QWERTY",</a:t>
-            </a:r>
-          </a:p>
-          <a:p>
-            <a:r>
-              <a:rPr lang="en-US" sz="600" dirty="0">
-                <a:latin typeface="Courier New" panose="02070309020205020404" pitchFamily="49" charset="0"/>
-                <a:cs typeface="Courier New" panose="02070309020205020404" pitchFamily="49" charset="0"/>
-              </a:rPr>
-              <a:t>        "</a:t>
-            </a:r>
-            <a:r>
-              <a:rPr lang="en-US" sz="600" dirty="0" err="1">
-                <a:latin typeface="Courier New" panose="02070309020205020404" pitchFamily="49" charset="0"/>
-                <a:cs typeface="Courier New" panose="02070309020205020404" pitchFamily="49" charset="0"/>
-              </a:rPr>
-              <a:t>stars_specimen_id</a:t>
-            </a:r>
-            <a:r>
-              <a:rPr lang="en-US" sz="600" dirty="0">
-                <a:latin typeface="Courier New" panose="02070309020205020404" pitchFamily="49" charset="0"/>
-                <a:cs typeface="Courier New" panose="02070309020205020404" pitchFamily="49" charset="0"/>
-              </a:rPr>
-              <a:t>": "QWERTY-XYZ333",</a:t>
-            </a:r>
-          </a:p>
-          <a:p>
-            <a:r>
-              <a:rPr lang="en-US" sz="600" dirty="0">
-                <a:latin typeface="Courier New" panose="02070309020205020404" pitchFamily="49" charset="0"/>
-                <a:cs typeface="Courier New" panose="02070309020205020404" pitchFamily="49" charset="0"/>
-              </a:rPr>
-              <a:t>        "</a:t>
-            </a:r>
-            <a:r>
-              <a:rPr lang="en-US" sz="600" dirty="0" err="1">
-                <a:latin typeface="Courier New" panose="02070309020205020404" pitchFamily="49" charset="0"/>
-                <a:cs typeface="Courier New" panose="02070309020205020404" pitchFamily="49" charset="0"/>
-              </a:rPr>
-              <a:t>stars_specimen_type</a:t>
-            </a:r>
-            <a:r>
-              <a:rPr lang="en-US" sz="600" dirty="0">
-                <a:latin typeface="Courier New" panose="02070309020205020404" pitchFamily="49" charset="0"/>
-                <a:cs typeface="Courier New" panose="02070309020205020404" pitchFamily="49" charset="0"/>
-              </a:rPr>
-              <a:t>": "Fresh Blood"</a:t>
-            </a:r>
-          </a:p>
-          <a:p>
-            <a:r>
-              <a:rPr lang="en-US" sz="600" dirty="0">
-                <a:latin typeface="Courier New" panose="02070309020205020404" pitchFamily="49" charset="0"/>
-                <a:cs typeface="Courier New" panose="02070309020205020404" pitchFamily="49" charset="0"/>
-              </a:rPr>
-              <a:t>      }</a:t>
-            </a:r>
-          </a:p>
-          <a:p>
-            <a:r>
-              <a:rPr lang="en-US" sz="600" dirty="0">
-                <a:latin typeface="Courier New" panose="02070309020205020404" pitchFamily="49" charset="0"/>
-                <a:cs typeface="Courier New" panose="02070309020205020404" pitchFamily="49" charset="0"/>
-              </a:rPr>
-              <a:t>    }</a:t>
-            </a:r>
-          </a:p>
-          <a:p>
-            <a:r>
-              <a:rPr lang="en-US" sz="600" dirty="0">
-                <a:latin typeface="Courier New" panose="02070309020205020404" pitchFamily="49" charset="0"/>
-                <a:cs typeface="Courier New" panose="02070309020205020404" pitchFamily="49" charset="0"/>
-              </a:rPr>
-              <a:t>  ]</a:t>
-            </a:r>
-          </a:p>
-          <a:p>
-            <a:r>
-              <a:rPr lang="en-US" sz="600" dirty="0">
-                <a:latin typeface="Courier New" panose="02070309020205020404" pitchFamily="49" charset="0"/>
-                <a:cs typeface="Courier New" panose="02070309020205020404" pitchFamily="49" charset="0"/>
-              </a:rPr>
-              <a:t>}</a:t>
-            </a:r>
-          </a:p>
-        </p:txBody>
-      </p:sp>
-      <p:sp>
-        <p:nvSpPr>
-          <p:cNvPr id="5" name="Rectangle 4"/>
-          <p:cNvSpPr/>
-          <p:nvPr/>
-        </p:nvSpPr>
-        <p:spPr>
-          <a:xfrm>
-            <a:off x="4876800" y="1905000"/>
-            <a:ext cx="2592184" cy="369332"/>
-          </a:xfrm>
-          <a:prstGeom prst="rect">
-            <a:avLst/>
-          </a:prstGeom>
-        </p:spPr>
-        <p:txBody>
-          <a:bodyPr wrap="none">
-            <a:spAutoFit/>
-          </a:bodyPr>
-          <a:lstStyle/>
-          <a:p>
-            <a:r>
-              <a:rPr lang="en-US" dirty="0" smtClean="0"/>
-              <a:t>http://jsonschema.net/#/</a:t>
-            </a:r>
-            <a:endParaRPr lang="en-US" dirty="0"/>
-          </a:p>
-        </p:txBody>
-      </p:sp>
-      <p:sp>
-        <p:nvSpPr>
-          <p:cNvPr id="6" name="Rectangle 5"/>
-          <p:cNvSpPr/>
-          <p:nvPr/>
-        </p:nvSpPr>
-        <p:spPr>
-          <a:xfrm>
-            <a:off x="3733800" y="4876800"/>
-            <a:ext cx="4572000" cy="646331"/>
-          </a:xfrm>
-          <a:prstGeom prst="rect">
-            <a:avLst/>
-          </a:prstGeom>
-        </p:spPr>
-        <p:txBody>
-          <a:bodyPr>
-            <a:spAutoFit/>
-          </a:bodyPr>
-          <a:lstStyle/>
-          <a:p>
-            <a:r>
-              <a:rPr lang="en-US" dirty="0" smtClean="0"/>
-              <a:t>http://www.jsoneditoronline.org/?id=9fb0089f64ae91d48b37ba62639dce07</a:t>
-            </a:r>
-            <a:endParaRPr lang="en-US" dirty="0"/>
-          </a:p>
-        </p:txBody>
-      </p:sp>
+          <a:ln>
+            <a:noFill/>
+          </a:ln>
+          <a:extLst>
+            <a:ext uri="{909E8E84-426E-40DD-AFC4-6F175D3DCCD1}">
+              <a14:hiddenFill xmlns:a14="http://schemas.microsoft.com/office/drawing/2010/main">
+                <a:solidFill>
+                  <a:schemeClr val="accent1"/>
+                </a:solidFill>
+              </a14:hiddenFill>
+            </a:ext>
+            <a:ext uri="{91240B29-F687-4F45-9708-019B960494DF}">
+              <a14:hiddenLine xmlns:a14="http://schemas.microsoft.com/office/drawing/2010/main" w="9525">
+                <a:solidFill>
+                  <a:schemeClr val="tx1"/>
+                </a:solidFill>
+                <a:miter lim="800000"/>
+                <a:headEnd/>
+                <a:tailEnd/>
+              </a14:hiddenLine>
+            </a:ext>
+          </a:extLst>
+        </p:spPr>
+      </p:pic>
     </p:spTree>
     <p:extLst>
       <p:ext uri="{BB962C8B-B14F-4D97-AF65-F5344CB8AC3E}">
-        <p14:creationId xmlns:p14="http://schemas.microsoft.com/office/powerpoint/2010/main" val="1571238907"/>
+        <p14:creationId xmlns:p14="http://schemas.microsoft.com/office/powerpoint/2010/main" val="3556314449"/>
       </p:ext>
     </p:extLst>
   </p:cSld>

</xml_diff>

<commit_message>
Modifications for 5/5/16 teleconf presentation
Added slide for GitHub repo
</commit_message>
<xml_diff>
--- a/NCH-PEDMATCH - Integration Walkthrough.pptx
+++ b/NCH-PEDMATCH - Integration Walkthrough.pptx
@@ -4,6 +4,9 @@
   <p:sldMasterIdLst>
     <p:sldMasterId id="2147483648" r:id="rId1"/>
   </p:sldMasterIdLst>
+  <p:handoutMasterIdLst>
+    <p:handoutMasterId r:id="rId12"/>
+  </p:handoutMasterIdLst>
   <p:sldIdLst>
     <p:sldId id="256" r:id="rId2"/>
     <p:sldId id="260" r:id="rId3"/>
@@ -14,9 +17,10 @@
     <p:sldId id="262" r:id="rId8"/>
     <p:sldId id="263" r:id="rId9"/>
     <p:sldId id="268" r:id="rId10"/>
+    <p:sldId id="269" r:id="rId11"/>
   </p:sldIdLst>
   <p:sldSz cx="9144000" cy="6858000" type="screen4x3"/>
-  <p:notesSz cx="6858000" cy="9144000"/>
+  <p:notesSz cx="6985000" cy="9283700"/>
   <p:defaultTextStyle>
     <a:defPPr>
       <a:defRPr lang="en-US"/>
@@ -126,12 +130,178 @@
             <p14:sldId id="262"/>
             <p14:sldId id="263"/>
             <p14:sldId id="268"/>
+            <p14:sldId id="269"/>
           </p14:sldIdLst>
         </p14:section>
       </p14:sectionLst>
     </p:ext>
   </p:extLst>
 </p:presentation>
+</file>
+
+<file path=ppt/handoutMasters/handoutMaster1.xml><?xml version="1.0" encoding="utf-8"?>
+<p:handoutMaster xmlns:a="http://schemas.openxmlformats.org/drawingml/2006/main" xmlns:r="http://schemas.openxmlformats.org/officeDocument/2006/relationships" xmlns:p="http://schemas.openxmlformats.org/presentationml/2006/main">
+  <p:cSld>
+    <p:bg>
+      <p:bgRef idx="1001">
+        <a:schemeClr val="bg1"/>
+      </p:bgRef>
+    </p:bg>
+    <p:spTree>
+      <p:nvGrpSpPr>
+        <p:cNvPr id="1" name=""/>
+        <p:cNvGrpSpPr/>
+        <p:nvPr/>
+      </p:nvGrpSpPr>
+      <p:grpSpPr>
+        <a:xfrm>
+          <a:off x="0" y="0"/>
+          <a:ext cx="0" cy="0"/>
+          <a:chOff x="0" y="0"/>
+          <a:chExt cx="0" cy="0"/>
+        </a:xfrm>
+      </p:grpSpPr>
+      <p:sp>
+        <p:nvSpPr>
+          <p:cNvPr id="2" name="Header Placeholder 1"/>
+          <p:cNvSpPr>
+            <a:spLocks noGrp="1"/>
+          </p:cNvSpPr>
+          <p:nvPr>
+            <p:ph type="hdr" sz="quarter"/>
+          </p:nvPr>
+        </p:nvSpPr>
+        <p:spPr>
+          <a:xfrm>
+            <a:off x="0" y="0"/>
+            <a:ext cx="3026833" cy="464185"/>
+          </a:xfrm>
+          <a:prstGeom prst="rect">
+            <a:avLst/>
+          </a:prstGeom>
+        </p:spPr>
+        <p:txBody>
+          <a:bodyPr vert="horz" lIns="92958" tIns="46479" rIns="92958" bIns="46479" rtlCol="0"/>
+          <a:lstStyle>
+            <a:lvl1pPr algn="l">
+              <a:defRPr sz="1200"/>
+            </a:lvl1pPr>
+          </a:lstStyle>
+          <a:p>
+            <a:endParaRPr lang="en-US"/>
+          </a:p>
+        </p:txBody>
+      </p:sp>
+      <p:sp>
+        <p:nvSpPr>
+          <p:cNvPr id="3" name="Date Placeholder 2"/>
+          <p:cNvSpPr>
+            <a:spLocks noGrp="1"/>
+          </p:cNvSpPr>
+          <p:nvPr>
+            <p:ph type="dt" sz="quarter" idx="1"/>
+          </p:nvPr>
+        </p:nvSpPr>
+        <p:spPr>
+          <a:xfrm>
+            <a:off x="3956550" y="0"/>
+            <a:ext cx="3026833" cy="464185"/>
+          </a:xfrm>
+          <a:prstGeom prst="rect">
+            <a:avLst/>
+          </a:prstGeom>
+        </p:spPr>
+        <p:txBody>
+          <a:bodyPr vert="horz" lIns="92958" tIns="46479" rIns="92958" bIns="46479" rtlCol="0"/>
+          <a:lstStyle>
+            <a:lvl1pPr algn="r">
+              <a:defRPr sz="1200"/>
+            </a:lvl1pPr>
+          </a:lstStyle>
+          <a:p>
+            <a:fld id="{3FF84A29-B2B8-41F0-A86E-DD7AE0E3C1FF}" type="datetimeFigureOut">
+              <a:rPr lang="en-US" smtClean="0"/>
+              <a:t>5/5/2016</a:t>
+            </a:fld>
+            <a:endParaRPr lang="en-US"/>
+          </a:p>
+        </p:txBody>
+      </p:sp>
+      <p:sp>
+        <p:nvSpPr>
+          <p:cNvPr id="4" name="Footer Placeholder 3"/>
+          <p:cNvSpPr>
+            <a:spLocks noGrp="1"/>
+          </p:cNvSpPr>
+          <p:nvPr>
+            <p:ph type="ftr" sz="quarter" idx="2"/>
+          </p:nvPr>
+        </p:nvSpPr>
+        <p:spPr>
+          <a:xfrm>
+            <a:off x="0" y="8817904"/>
+            <a:ext cx="3026833" cy="464185"/>
+          </a:xfrm>
+          <a:prstGeom prst="rect">
+            <a:avLst/>
+          </a:prstGeom>
+        </p:spPr>
+        <p:txBody>
+          <a:bodyPr vert="horz" lIns="92958" tIns="46479" rIns="92958" bIns="46479" rtlCol="0" anchor="b"/>
+          <a:lstStyle>
+            <a:lvl1pPr algn="l">
+              <a:defRPr sz="1200"/>
+            </a:lvl1pPr>
+          </a:lstStyle>
+          <a:p>
+            <a:endParaRPr lang="en-US"/>
+          </a:p>
+        </p:txBody>
+      </p:sp>
+      <p:sp>
+        <p:nvSpPr>
+          <p:cNvPr id="5" name="Slide Number Placeholder 4"/>
+          <p:cNvSpPr>
+            <a:spLocks noGrp="1"/>
+          </p:cNvSpPr>
+          <p:nvPr>
+            <p:ph type="sldNum" sz="quarter" idx="3"/>
+          </p:nvPr>
+        </p:nvSpPr>
+        <p:spPr>
+          <a:xfrm>
+            <a:off x="3956550" y="8817904"/>
+            <a:ext cx="3026833" cy="464185"/>
+          </a:xfrm>
+          <a:prstGeom prst="rect">
+            <a:avLst/>
+          </a:prstGeom>
+        </p:spPr>
+        <p:txBody>
+          <a:bodyPr vert="horz" lIns="92958" tIns="46479" rIns="92958" bIns="46479" rtlCol="0" anchor="b"/>
+          <a:lstStyle>
+            <a:lvl1pPr algn="r">
+              <a:defRPr sz="1200"/>
+            </a:lvl1pPr>
+          </a:lstStyle>
+          <a:p>
+            <a:fld id="{C1D23B2D-9A1A-4ED3-B14C-3B3CD402960F}" type="slidenum">
+              <a:rPr lang="en-US" smtClean="0"/>
+              <a:t>‹#›</a:t>
+            </a:fld>
+            <a:endParaRPr lang="en-US"/>
+          </a:p>
+        </p:txBody>
+      </p:sp>
+    </p:spTree>
+    <p:extLst>
+      <p:ext uri="{BB962C8B-B14F-4D97-AF65-F5344CB8AC3E}">
+        <p14:creationId xmlns:p14="http://schemas.microsoft.com/office/powerpoint/2010/main" val="1493464221"/>
+      </p:ext>
+    </p:extLst>
+  </p:cSld>
+  <p:clrMap bg1="lt1" tx1="dk1" bg2="lt2" tx2="dk2" accent1="accent1" accent2="accent2" accent3="accent3" accent4="accent4" accent5="accent5" accent6="accent6" hlink="hlink" folHlink="folHlink"/>
+</p:handoutMaster>
 </file>
 
 <file path=ppt/slideLayouts/slideLayout1.xml><?xml version="1.0" encoding="utf-8"?>
@@ -3202,6 +3372,186 @@
 </p:sld>
 </file>
 
+<file path=ppt/slides/slide10.xml><?xml version="1.0" encoding="utf-8"?>
+<p:sld xmlns:a="http://schemas.openxmlformats.org/drawingml/2006/main" xmlns:r="http://schemas.openxmlformats.org/officeDocument/2006/relationships" xmlns:p="http://schemas.openxmlformats.org/presentationml/2006/main">
+  <p:cSld>
+    <p:spTree>
+      <p:nvGrpSpPr>
+        <p:cNvPr id="1" name=""/>
+        <p:cNvGrpSpPr/>
+        <p:nvPr/>
+      </p:nvGrpSpPr>
+      <p:grpSpPr>
+        <a:xfrm>
+          <a:off x="0" y="0"/>
+          <a:ext cx="0" cy="0"/>
+          <a:chOff x="0" y="0"/>
+          <a:chExt cx="0" cy="0"/>
+        </a:xfrm>
+      </p:grpSpPr>
+      <p:sp>
+        <p:nvSpPr>
+          <p:cNvPr id="2" name="Title 1"/>
+          <p:cNvSpPr>
+            <a:spLocks noGrp="1"/>
+          </p:cNvSpPr>
+          <p:nvPr>
+            <p:ph type="title"/>
+          </p:nvPr>
+        </p:nvSpPr>
+        <p:spPr/>
+        <p:txBody>
+          <a:bodyPr/>
+          <a:lstStyle/>
+          <a:p>
+            <a:r>
+              <a:rPr lang="en-US" dirty="0" err="1" smtClean="0"/>
+              <a:t>GitHub</a:t>
+            </a:r>
+            <a:r>
+              <a:rPr lang="en-US" dirty="0" smtClean="0"/>
+              <a:t> Repo</a:t>
+            </a:r>
+            <a:endParaRPr lang="en-US" dirty="0"/>
+          </a:p>
+        </p:txBody>
+      </p:sp>
+      <p:sp>
+        <p:nvSpPr>
+          <p:cNvPr id="3" name="Content Placeholder 2"/>
+          <p:cNvSpPr>
+            <a:spLocks noGrp="1"/>
+          </p:cNvSpPr>
+          <p:nvPr>
+            <p:ph idx="1"/>
+          </p:nvPr>
+        </p:nvSpPr>
+        <p:spPr/>
+        <p:txBody>
+          <a:bodyPr>
+            <a:normAutofit/>
+          </a:bodyPr>
+          <a:lstStyle/>
+          <a:p>
+            <a:r>
+              <a:rPr lang="en-US" sz="2800" dirty="0" smtClean="0"/>
+              <a:t>Public repository</a:t>
+            </a:r>
+          </a:p>
+          <a:p>
+            <a:r>
+              <a:rPr lang="en-US" sz="2800" dirty="0" smtClean="0"/>
+              <a:t>Read-only</a:t>
+            </a:r>
+            <a:r>
+              <a:rPr lang="en-US" sz="2800" dirty="0"/>
+              <a:t> </a:t>
+            </a:r>
+            <a:r>
+              <a:rPr lang="en-US" sz="2800" dirty="0" smtClean="0"/>
+              <a:t>access to NCH design documents, sample messages, etc.</a:t>
+            </a:r>
+          </a:p>
+          <a:p>
+            <a:r>
+              <a:rPr lang="en-US" sz="2800" dirty="0" smtClean="0"/>
+              <a:t>Supports versions and branching</a:t>
+            </a:r>
+          </a:p>
+          <a:p>
+            <a:r>
+              <a:rPr lang="en-US" sz="2800" dirty="0">
+                <a:hlinkClick r:id="rId2"/>
+              </a:rPr>
+              <a:t>https://</a:t>
+            </a:r>
+            <a:r>
+              <a:rPr lang="en-US" sz="2800" dirty="0" smtClean="0">
+                <a:hlinkClick r:id="rId2"/>
+              </a:rPr>
+              <a:t>github.com/NCH-BPC-Informatics/pedmatch-arch-docs</a:t>
+            </a:r>
+            <a:endParaRPr lang="en-US" sz="2800" dirty="0" smtClean="0"/>
+          </a:p>
+          <a:p>
+            <a:endParaRPr lang="en-US" sz="2800" dirty="0" smtClean="0"/>
+          </a:p>
+        </p:txBody>
+      </p:sp>
+      <p:pic>
+        <p:nvPicPr>
+          <p:cNvPr id="2050" name="Picture 2"/>
+          <p:cNvPicPr>
+            <a:picLocks noChangeAspect="1" noChangeArrowheads="1"/>
+          </p:cNvPicPr>
+          <p:nvPr/>
+        </p:nvPicPr>
+        <p:blipFill>
+          <a:blip r:embed="rId3" cstate="print">
+            <a:extLst>
+              <a:ext uri="{28A0092B-C50C-407E-A947-70E740481C1C}">
+                <a14:useLocalDpi xmlns:a14="http://schemas.microsoft.com/office/drawing/2010/main" val="0"/>
+              </a:ext>
+            </a:extLst>
+          </a:blip>
+          <a:srcRect/>
+          <a:stretch>
+            <a:fillRect/>
+          </a:stretch>
+        </p:blipFill>
+        <p:spPr bwMode="auto">
+          <a:xfrm>
+            <a:off x="6096000" y="4642904"/>
+            <a:ext cx="2757589" cy="2047095"/>
+          </a:xfrm>
+          <a:prstGeom prst="rect">
+            <a:avLst/>
+          </a:prstGeom>
+          <a:noFill/>
+          <a:ln>
+            <a:noFill/>
+          </a:ln>
+          <a:extLst>
+            <a:ext uri="{909E8E84-426E-40DD-AFC4-6F175D3DCCD1}">
+              <a14:hiddenFill xmlns:a14="http://schemas.microsoft.com/office/drawing/2010/main">
+                <a:solidFill>
+                  <a:schemeClr val="accent1"/>
+                </a:solidFill>
+              </a14:hiddenFill>
+            </a:ext>
+            <a:ext uri="{91240B29-F687-4F45-9708-019B960494DF}">
+              <a14:hiddenLine xmlns:a14="http://schemas.microsoft.com/office/drawing/2010/main" w="9525">
+                <a:solidFill>
+                  <a:schemeClr val="tx1"/>
+                </a:solidFill>
+                <a:miter lim="800000"/>
+                <a:headEnd/>
+                <a:tailEnd/>
+              </a14:hiddenLine>
+            </a:ext>
+          </a:extLst>
+        </p:spPr>
+      </p:pic>
+    </p:spTree>
+    <p:extLst>
+      <p:ext uri="{BB962C8B-B14F-4D97-AF65-F5344CB8AC3E}">
+        <p14:creationId xmlns:p14="http://schemas.microsoft.com/office/powerpoint/2010/main" val="4184201867"/>
+      </p:ext>
+    </p:extLst>
+  </p:cSld>
+  <p:clrMapOvr>
+    <a:masterClrMapping/>
+  </p:clrMapOvr>
+  <p:timing>
+    <p:tnLst>
+      <p:par>
+        <p:cTn id="1" dur="indefinite" restart="never" nodeType="tmRoot"/>
+      </p:par>
+    </p:tnLst>
+  </p:timing>
+</p:sld>
+</file>
+
 <file path=ppt/slides/slide2.xml><?xml version="1.0" encoding="utf-8"?>
 <p:sld xmlns:a="http://schemas.openxmlformats.org/drawingml/2006/main" xmlns:r="http://schemas.openxmlformats.org/officeDocument/2006/relationships" xmlns:p="http://schemas.openxmlformats.org/presentationml/2006/main">
   <p:cSld>
@@ -3960,6 +4310,13 @@
   <p:clrMapOvr>
     <a:masterClrMapping/>
   </p:clrMapOvr>
+  <p:timing>
+    <p:tnLst>
+      <p:par>
+        <p:cTn id="1" dur="indefinite" restart="never" nodeType="tmRoot"/>
+      </p:par>
+    </p:tnLst>
+  </p:timing>
 </p:sld>
 </file>
 
@@ -4585,6 +4942,13 @@
   <p:clrMapOvr>
     <a:masterClrMapping/>
   </p:clrMapOvr>
+  <p:timing>
+    <p:tnLst>
+      <p:par>
+        <p:cTn id="1" dur="indefinite" restart="never" nodeType="tmRoot"/>
+      </p:par>
+    </p:tnLst>
+  </p:timing>
 </p:sld>
 </file>
 
@@ -5224,6 +5588,13 @@
   <p:clrMapOvr>
     <a:masterClrMapping/>
   </p:clrMapOvr>
+  <p:timing>
+    <p:tnLst>
+      <p:par>
+        <p:cTn id="1" dur="indefinite" restart="never" nodeType="tmRoot"/>
+      </p:par>
+    </p:tnLst>
+  </p:timing>
 </p:sld>
 </file>
 
@@ -5747,6 +6118,13 @@
   <p:clrMapOvr>
     <a:masterClrMapping/>
   </p:clrMapOvr>
+  <p:timing>
+    <p:tnLst>
+      <p:par>
+        <p:cTn id="1" dur="indefinite" restart="never" nodeType="tmRoot"/>
+      </p:par>
+    </p:tnLst>
+  </p:timing>
 </p:sld>
 </file>
 
@@ -6033,4 +6411,289 @@
   <a:objectDefaults/>
   <a:extraClrSchemeLst/>
 </a:theme>
+</file>
+
+<file path=ppt/theme/theme2.xml><?xml version="1.0" encoding="utf-8"?>
+<a:theme xmlns:a="http://schemas.openxmlformats.org/drawingml/2006/main" name="Office Theme">
+  <a:themeElements>
+    <a:clrScheme name="Office">
+      <a:dk1>
+        <a:sysClr val="windowText" lastClr="000000"/>
+      </a:dk1>
+      <a:lt1>
+        <a:sysClr val="window" lastClr="FFFFFF"/>
+      </a:lt1>
+      <a:dk2>
+        <a:srgbClr val="1F497D"/>
+      </a:dk2>
+      <a:lt2>
+        <a:srgbClr val="EEECE1"/>
+      </a:lt2>
+      <a:accent1>
+        <a:srgbClr val="4F81BD"/>
+      </a:accent1>
+      <a:accent2>
+        <a:srgbClr val="C0504D"/>
+      </a:accent2>
+      <a:accent3>
+        <a:srgbClr val="9BBB59"/>
+      </a:accent3>
+      <a:accent4>
+        <a:srgbClr val="8064A2"/>
+      </a:accent4>
+      <a:accent5>
+        <a:srgbClr val="4BACC6"/>
+      </a:accent5>
+      <a:accent6>
+        <a:srgbClr val="F79646"/>
+      </a:accent6>
+      <a:hlink>
+        <a:srgbClr val="0000FF"/>
+      </a:hlink>
+      <a:folHlink>
+        <a:srgbClr val="800080"/>
+      </a:folHlink>
+    </a:clrScheme>
+    <a:fontScheme name="Office">
+      <a:majorFont>
+        <a:latin typeface="Calibri"/>
+        <a:ea typeface=""/>
+        <a:cs typeface=""/>
+        <a:font script="Jpan" typeface="ＭＳ Ｐゴシック"/>
+        <a:font script="Hang" typeface="맑은 고딕"/>
+        <a:font script="Hans" typeface="宋体"/>
+        <a:font script="Hant" typeface="新細明體"/>
+        <a:font script="Arab" typeface="Times New Roman"/>
+        <a:font script="Hebr" typeface="Times New Roman"/>
+        <a:font script="Thai" typeface="Angsana New"/>
+        <a:font script="Ethi" typeface="Nyala"/>
+        <a:font script="Beng" typeface="Vrinda"/>
+        <a:font script="Gujr" typeface="Shruti"/>
+        <a:font script="Khmr" typeface="MoolBoran"/>
+        <a:font script="Knda" typeface="Tunga"/>
+        <a:font script="Guru" typeface="Raavi"/>
+        <a:font script="Cans" typeface="Euphemia"/>
+        <a:font script="Cher" typeface="Plantagenet Cherokee"/>
+        <a:font script="Yiii" typeface="Microsoft Yi Baiti"/>
+        <a:font script="Tibt" typeface="Microsoft Himalaya"/>
+        <a:font script="Thaa" typeface="MV Boli"/>
+        <a:font script="Deva" typeface="Mangal"/>
+        <a:font script="Telu" typeface="Gautami"/>
+        <a:font script="Taml" typeface="Latha"/>
+        <a:font script="Syrc" typeface="Estrangelo Edessa"/>
+        <a:font script="Orya" typeface="Kalinga"/>
+        <a:font script="Mlym" typeface="Kartika"/>
+        <a:font script="Laoo" typeface="DokChampa"/>
+        <a:font script="Sinh" typeface="Iskoola Pota"/>
+        <a:font script="Mong" typeface="Mongolian Baiti"/>
+        <a:font script="Viet" typeface="Times New Roman"/>
+        <a:font script="Uigh" typeface="Microsoft Uighur"/>
+        <a:font script="Geor" typeface="Sylfaen"/>
+      </a:majorFont>
+      <a:minorFont>
+        <a:latin typeface="Calibri"/>
+        <a:ea typeface=""/>
+        <a:cs typeface=""/>
+        <a:font script="Jpan" typeface="ＭＳ Ｐゴシック"/>
+        <a:font script="Hang" typeface="맑은 고딕"/>
+        <a:font script="Hans" typeface="宋体"/>
+        <a:font script="Hant" typeface="新細明體"/>
+        <a:font script="Arab" typeface="Arial"/>
+        <a:font script="Hebr" typeface="Arial"/>
+        <a:font script="Thai" typeface="Cordia New"/>
+        <a:font script="Ethi" typeface="Nyala"/>
+        <a:font script="Beng" typeface="Vrinda"/>
+        <a:font script="Gujr" typeface="Shruti"/>
+        <a:font script="Khmr" typeface="DaunPenh"/>
+        <a:font script="Knda" typeface="Tunga"/>
+        <a:font script="Guru" typeface="Raavi"/>
+        <a:font script="Cans" typeface="Euphemia"/>
+        <a:font script="Cher" typeface="Plantagenet Cherokee"/>
+        <a:font script="Yiii" typeface="Microsoft Yi Baiti"/>
+        <a:font script="Tibt" typeface="Microsoft Himalaya"/>
+        <a:font script="Thaa" typeface="MV Boli"/>
+        <a:font script="Deva" typeface="Mangal"/>
+        <a:font script="Telu" typeface="Gautami"/>
+        <a:font script="Taml" typeface="Latha"/>
+        <a:font script="Syrc" typeface="Estrangelo Edessa"/>
+        <a:font script="Orya" typeface="Kalinga"/>
+        <a:font script="Mlym" typeface="Kartika"/>
+        <a:font script="Laoo" typeface="DokChampa"/>
+        <a:font script="Sinh" typeface="Iskoola Pota"/>
+        <a:font script="Mong" typeface="Mongolian Baiti"/>
+        <a:font script="Viet" typeface="Arial"/>
+        <a:font script="Uigh" typeface="Microsoft Uighur"/>
+        <a:font script="Geor" typeface="Sylfaen"/>
+      </a:minorFont>
+    </a:fontScheme>
+    <a:fmtScheme name="Office">
+      <a:fillStyleLst>
+        <a:solidFill>
+          <a:schemeClr val="phClr"/>
+        </a:solidFill>
+        <a:gradFill rotWithShape="1">
+          <a:gsLst>
+            <a:gs pos="0">
+              <a:schemeClr val="phClr">
+                <a:tint val="50000"/>
+                <a:satMod val="300000"/>
+              </a:schemeClr>
+            </a:gs>
+            <a:gs pos="35000">
+              <a:schemeClr val="phClr">
+                <a:tint val="37000"/>
+                <a:satMod val="300000"/>
+              </a:schemeClr>
+            </a:gs>
+            <a:gs pos="100000">
+              <a:schemeClr val="phClr">
+                <a:tint val="15000"/>
+                <a:satMod val="350000"/>
+              </a:schemeClr>
+            </a:gs>
+          </a:gsLst>
+          <a:lin ang="16200000" scaled="1"/>
+        </a:gradFill>
+        <a:gradFill rotWithShape="1">
+          <a:gsLst>
+            <a:gs pos="0">
+              <a:schemeClr val="phClr">
+                <a:shade val="51000"/>
+                <a:satMod val="130000"/>
+              </a:schemeClr>
+            </a:gs>
+            <a:gs pos="80000">
+              <a:schemeClr val="phClr">
+                <a:shade val="93000"/>
+                <a:satMod val="130000"/>
+              </a:schemeClr>
+            </a:gs>
+            <a:gs pos="100000">
+              <a:schemeClr val="phClr">
+                <a:shade val="94000"/>
+                <a:satMod val="135000"/>
+              </a:schemeClr>
+            </a:gs>
+          </a:gsLst>
+          <a:lin ang="16200000" scaled="0"/>
+        </a:gradFill>
+      </a:fillStyleLst>
+      <a:lnStyleLst>
+        <a:ln w="9525" cap="flat" cmpd="sng" algn="ctr">
+          <a:solidFill>
+            <a:schemeClr val="phClr">
+              <a:shade val="95000"/>
+              <a:satMod val="105000"/>
+            </a:schemeClr>
+          </a:solidFill>
+          <a:prstDash val="solid"/>
+        </a:ln>
+        <a:ln w="25400" cap="flat" cmpd="sng" algn="ctr">
+          <a:solidFill>
+            <a:schemeClr val="phClr"/>
+          </a:solidFill>
+          <a:prstDash val="solid"/>
+        </a:ln>
+        <a:ln w="38100" cap="flat" cmpd="sng" algn="ctr">
+          <a:solidFill>
+            <a:schemeClr val="phClr"/>
+          </a:solidFill>
+          <a:prstDash val="solid"/>
+        </a:ln>
+      </a:lnStyleLst>
+      <a:effectStyleLst>
+        <a:effectStyle>
+          <a:effectLst>
+            <a:outerShdw blurRad="40000" dist="20000" dir="5400000" rotWithShape="0">
+              <a:srgbClr val="000000">
+                <a:alpha val="38000"/>
+              </a:srgbClr>
+            </a:outerShdw>
+          </a:effectLst>
+        </a:effectStyle>
+        <a:effectStyle>
+          <a:effectLst>
+            <a:outerShdw blurRad="40000" dist="23000" dir="5400000" rotWithShape="0">
+              <a:srgbClr val="000000">
+                <a:alpha val="35000"/>
+              </a:srgbClr>
+            </a:outerShdw>
+          </a:effectLst>
+        </a:effectStyle>
+        <a:effectStyle>
+          <a:effectLst>
+            <a:outerShdw blurRad="40000" dist="23000" dir="5400000" rotWithShape="0">
+              <a:srgbClr val="000000">
+                <a:alpha val="35000"/>
+              </a:srgbClr>
+            </a:outerShdw>
+          </a:effectLst>
+          <a:scene3d>
+            <a:camera prst="orthographicFront">
+              <a:rot lat="0" lon="0" rev="0"/>
+            </a:camera>
+            <a:lightRig rig="threePt" dir="t">
+              <a:rot lat="0" lon="0" rev="1200000"/>
+            </a:lightRig>
+          </a:scene3d>
+          <a:sp3d>
+            <a:bevelT w="63500" h="25400"/>
+          </a:sp3d>
+        </a:effectStyle>
+      </a:effectStyleLst>
+      <a:bgFillStyleLst>
+        <a:solidFill>
+          <a:schemeClr val="phClr"/>
+        </a:solidFill>
+        <a:gradFill rotWithShape="1">
+          <a:gsLst>
+            <a:gs pos="0">
+              <a:schemeClr val="phClr">
+                <a:tint val="40000"/>
+                <a:satMod val="350000"/>
+              </a:schemeClr>
+            </a:gs>
+            <a:gs pos="40000">
+              <a:schemeClr val="phClr">
+                <a:tint val="45000"/>
+                <a:shade val="99000"/>
+                <a:satMod val="350000"/>
+              </a:schemeClr>
+            </a:gs>
+            <a:gs pos="100000">
+              <a:schemeClr val="phClr">
+                <a:shade val="20000"/>
+                <a:satMod val="255000"/>
+              </a:schemeClr>
+            </a:gs>
+          </a:gsLst>
+          <a:path path="circle">
+            <a:fillToRect l="50000" t="-80000" r="50000" b="180000"/>
+          </a:path>
+        </a:gradFill>
+        <a:gradFill rotWithShape="1">
+          <a:gsLst>
+            <a:gs pos="0">
+              <a:schemeClr val="phClr">
+                <a:tint val="80000"/>
+                <a:satMod val="300000"/>
+              </a:schemeClr>
+            </a:gs>
+            <a:gs pos="100000">
+              <a:schemeClr val="phClr">
+                <a:shade val="30000"/>
+                <a:satMod val="200000"/>
+              </a:schemeClr>
+            </a:gs>
+          </a:gsLst>
+          <a:path path="circle">
+            <a:fillToRect l="50000" t="50000" r="50000" b="50000"/>
+          </a:path>
+        </a:gradFill>
+      </a:bgFillStyleLst>
+    </a:fmtScheme>
+  </a:themeElements>
+  <a:objectDefaults/>
+  <a:extraClrSchemeLst/>
+</a:theme>
 </file>
</xml_diff>

<commit_message>
Changes for 5/9/2016 presentation
1) Moved collection and received timestamps to top-level specimen section (from prior location beneath internal-use-only)
2) Added study_id
3) Added indication that timestamps would follow ISO-8601 but use GMT timezone
4) Revised JSON messages throughout presentation
</commit_message>
<xml_diff>
--- a/NCH-PEDMATCH - Integration Walkthrough.pptx
+++ b/NCH-PEDMATCH - Integration Walkthrough.pptx
@@ -221,7 +221,7 @@
           <a:p>
             <a:fld id="{3FF84A29-B2B8-41F0-A86E-DD7AE0E3C1FF}" type="datetimeFigureOut">
               <a:rPr lang="en-US" smtClean="0"/>
-              <a:t>5/5/2016</a:t>
+              <a:t>5/9/2016</a:t>
             </a:fld>
             <a:endParaRPr lang="en-US"/>
           </a:p>
@@ -485,7 +485,7 @@
           <a:p>
             <a:fld id="{10589FC0-A008-4DEA-8067-226D6B8CA3BC}" type="datetimeFigureOut">
               <a:rPr lang="en-US" smtClean="0"/>
-              <a:t>5/4/2016</a:t>
+              <a:t>5/9/2016</a:t>
             </a:fld>
             <a:endParaRPr lang="en-US"/>
           </a:p>
@@ -655,7 +655,7 @@
           <a:p>
             <a:fld id="{10589FC0-A008-4DEA-8067-226D6B8CA3BC}" type="datetimeFigureOut">
               <a:rPr lang="en-US" smtClean="0"/>
-              <a:t>5/4/2016</a:t>
+              <a:t>5/9/2016</a:t>
             </a:fld>
             <a:endParaRPr lang="en-US"/>
           </a:p>
@@ -835,7 +835,7 @@
           <a:p>
             <a:fld id="{10589FC0-A008-4DEA-8067-226D6B8CA3BC}" type="datetimeFigureOut">
               <a:rPr lang="en-US" smtClean="0"/>
-              <a:t>5/4/2016</a:t>
+              <a:t>5/9/2016</a:t>
             </a:fld>
             <a:endParaRPr lang="en-US"/>
           </a:p>
@@ -1005,7 +1005,7 @@
           <a:p>
             <a:fld id="{10589FC0-A008-4DEA-8067-226D6B8CA3BC}" type="datetimeFigureOut">
               <a:rPr lang="en-US" smtClean="0"/>
-              <a:t>5/4/2016</a:t>
+              <a:t>5/9/2016</a:t>
             </a:fld>
             <a:endParaRPr lang="en-US"/>
           </a:p>
@@ -1251,7 +1251,7 @@
           <a:p>
             <a:fld id="{10589FC0-A008-4DEA-8067-226D6B8CA3BC}" type="datetimeFigureOut">
               <a:rPr lang="en-US" smtClean="0"/>
-              <a:t>5/4/2016</a:t>
+              <a:t>5/9/2016</a:t>
             </a:fld>
             <a:endParaRPr lang="en-US"/>
           </a:p>
@@ -1539,7 +1539,7 @@
           <a:p>
             <a:fld id="{10589FC0-A008-4DEA-8067-226D6B8CA3BC}" type="datetimeFigureOut">
               <a:rPr lang="en-US" smtClean="0"/>
-              <a:t>5/4/2016</a:t>
+              <a:t>5/9/2016</a:t>
             </a:fld>
             <a:endParaRPr lang="en-US"/>
           </a:p>
@@ -1961,7 +1961,7 @@
           <a:p>
             <a:fld id="{10589FC0-A008-4DEA-8067-226D6B8CA3BC}" type="datetimeFigureOut">
               <a:rPr lang="en-US" smtClean="0"/>
-              <a:t>5/4/2016</a:t>
+              <a:t>5/9/2016</a:t>
             </a:fld>
             <a:endParaRPr lang="en-US"/>
           </a:p>
@@ -2079,7 +2079,7 @@
           <a:p>
             <a:fld id="{10589FC0-A008-4DEA-8067-226D6B8CA3BC}" type="datetimeFigureOut">
               <a:rPr lang="en-US" smtClean="0"/>
-              <a:t>5/4/2016</a:t>
+              <a:t>5/9/2016</a:t>
             </a:fld>
             <a:endParaRPr lang="en-US"/>
           </a:p>
@@ -2174,7 +2174,7 @@
           <a:p>
             <a:fld id="{10589FC0-A008-4DEA-8067-226D6B8CA3BC}" type="datetimeFigureOut">
               <a:rPr lang="en-US" smtClean="0"/>
-              <a:t>5/4/2016</a:t>
+              <a:t>5/9/2016</a:t>
             </a:fld>
             <a:endParaRPr lang="en-US"/>
           </a:p>
@@ -2451,7 +2451,7 @@
           <a:p>
             <a:fld id="{10589FC0-A008-4DEA-8067-226D6B8CA3BC}" type="datetimeFigureOut">
               <a:rPr lang="en-US" smtClean="0"/>
-              <a:t>5/4/2016</a:t>
+              <a:t>5/9/2016</a:t>
             </a:fld>
             <a:endParaRPr lang="en-US"/>
           </a:p>
@@ -2704,7 +2704,7 @@
           <a:p>
             <a:fld id="{10589FC0-A008-4DEA-8067-226D6B8CA3BC}" type="datetimeFigureOut">
               <a:rPr lang="en-US" smtClean="0"/>
-              <a:t>5/4/2016</a:t>
+              <a:t>5/9/2016</a:t>
             </a:fld>
             <a:endParaRPr lang="en-US"/>
           </a:p>
@@ -2917,7 +2917,7 @@
           <a:p>
             <a:fld id="{10589FC0-A008-4DEA-8067-226D6B8CA3BC}" type="datetimeFigureOut">
               <a:rPr lang="en-US" smtClean="0"/>
-              <a:t>5/4/2016</a:t>
+              <a:t>5/9/2016</a:t>
             </a:fld>
             <a:endParaRPr lang="en-US"/>
           </a:p>
@@ -3309,44 +3309,44 @@
           <a:p>
             <a:r>
               <a:rPr lang="en-US" dirty="0" smtClean="0"/>
-              <a:t>NCH - </a:t>
-            </a:r>
+              <a:t>NCH - PEDMATCH</a:t>
+            </a:r>
+            <a:endParaRPr lang="en-US" dirty="0"/>
+          </a:p>
+        </p:txBody>
+      </p:sp>
+      <p:sp>
+        <p:nvSpPr>
+          <p:cNvPr id="3" name="Subtitle 2"/>
+          <p:cNvSpPr>
+            <a:spLocks noGrp="1"/>
+          </p:cNvSpPr>
+          <p:nvPr>
+            <p:ph type="subTitle" idx="1"/>
+          </p:nvPr>
+        </p:nvSpPr>
+        <p:spPr/>
+        <p:txBody>
+          <a:bodyPr/>
+          <a:lstStyle/>
+          <a:p>
             <a:r>
               <a:rPr lang="en-US" dirty="0" smtClean="0"/>
-              <a:t>PEDMATCH</a:t>
-            </a:r>
-            <a:endParaRPr lang="en-US" dirty="0"/>
-          </a:p>
-        </p:txBody>
-      </p:sp>
-      <p:sp>
-        <p:nvSpPr>
-          <p:cNvPr id="3" name="Subtitle 2"/>
-          <p:cNvSpPr>
-            <a:spLocks noGrp="1"/>
-          </p:cNvSpPr>
-          <p:nvPr>
-            <p:ph type="subTitle" idx="1"/>
-          </p:nvPr>
-        </p:nvSpPr>
-        <p:spPr/>
-        <p:txBody>
-          <a:bodyPr/>
-          <a:lstStyle/>
-          <a:p>
-            <a:r>
-              <a:rPr lang="en-US" dirty="0" smtClean="0"/>
-              <a:t>Integration </a:t>
-            </a:r>
-            <a:r>
-              <a:rPr lang="en-US" dirty="0" smtClean="0"/>
-              <a:t>Overview, v1.0-draft</a:t>
+              <a:t>Integration Overview, v1.0-draft</a:t>
             </a:r>
           </a:p>
           <a:p>
             <a:r>
               <a:rPr lang="en-US" sz="2000" i="1" dirty="0" smtClean="0"/>
-              <a:t>Last revised, 5/4/2016, ESK</a:t>
+              <a:t>Last revised, </a:t>
+            </a:r>
+            <a:r>
+              <a:rPr lang="en-US" sz="2000" i="1" dirty="0" smtClean="0"/>
+              <a:t>5/9/2016</a:t>
+            </a:r>
+            <a:r>
+              <a:rPr lang="en-US" sz="2000" i="1" dirty="0" smtClean="0"/>
+              <a:t>, ESK</a:t>
             </a:r>
             <a:endParaRPr lang="en-US" sz="2000" i="1" dirty="0"/>
           </a:p>
@@ -3616,62 +3616,36 @@
           <a:p>
             <a:r>
               <a:rPr lang="en-US" dirty="0" smtClean="0"/>
-              <a:t>Collection Grouping ID (“CGID</a:t>
-            </a:r>
+              <a:t>Collection Grouping ID (“CGID”)</a:t>
+            </a:r>
+          </a:p>
+          <a:p>
+            <a:pPr lvl="1"/>
             <a:r>
               <a:rPr lang="en-US" dirty="0" smtClean="0"/>
-              <a:t>”)</a:t>
+              <a:t>Shared by specimens of a given type taken from a patient in one encounter/surgery/draw/etc.</a:t>
             </a:r>
           </a:p>
           <a:p>
             <a:pPr lvl="1"/>
             <a:r>
               <a:rPr lang="en-US" dirty="0" smtClean="0"/>
-              <a:t>Shared </a:t>
-            </a:r>
+              <a:t>Same CGID means specimens are “equivalent” from a PED-MATCH standpoint</a:t>
+            </a:r>
+          </a:p>
+          <a:p>
+            <a:pPr lvl="1"/>
             <a:r>
               <a:rPr lang="en-US" dirty="0" smtClean="0"/>
-              <a:t>by specimens of a given type taken from a patient in one </a:t>
-            </a:r>
+              <a:t>Specimen messages sent to MATCHBOX will include the CGID</a:t>
+            </a:r>
+          </a:p>
+          <a:p>
+            <a:pPr lvl="1"/>
             <a:r>
               <a:rPr lang="en-US" dirty="0" smtClean="0"/>
-              <a:t>encounter/surgery/draw/etc.</a:t>
-            </a:r>
-          </a:p>
-          <a:p>
-            <a:pPr lvl="1"/>
-            <a:r>
-              <a:rPr lang="en-US" dirty="0" smtClean="0"/>
-              <a:t>Same CGID means s</a:t>
-            </a:r>
-            <a:r>
-              <a:rPr lang="en-US" dirty="0" smtClean="0"/>
-              <a:t>pecimens are “equivalent” from a PED-MATCH standpoint</a:t>
-            </a:r>
-            <a:endParaRPr lang="en-US" dirty="0" smtClean="0"/>
-          </a:p>
-          <a:p>
-            <a:pPr lvl="1"/>
-            <a:r>
-              <a:rPr lang="en-US" dirty="0" smtClean="0"/>
-              <a:t>Specimen messages </a:t>
-            </a:r>
-            <a:r>
-              <a:rPr lang="en-US" dirty="0" smtClean="0"/>
-              <a:t>sent to MATCHBOX will include the CGID</a:t>
-            </a:r>
-          </a:p>
-          <a:p>
-            <a:pPr lvl="1"/>
-            <a:r>
-              <a:rPr lang="en-US" dirty="0" smtClean="0"/>
-              <a:t>CGIDs will be “inherited” by the various aliquots/derivatives from the original </a:t>
-            </a:r>
-            <a:r>
-              <a:rPr lang="en-US" dirty="0" smtClean="0"/>
-              <a:t>specimens</a:t>
-            </a:r>
-            <a:endParaRPr lang="en-US" dirty="0" smtClean="0"/>
+              <a:t>CGIDs will be “inherited” by the various aliquots/derivatives from the original specimens</a:t>
+            </a:r>
           </a:p>
           <a:p>
             <a:pPr lvl="1"/>
@@ -5653,7 +5627,7 @@
         <p:spPr/>
         <p:txBody>
           <a:bodyPr>
-            <a:normAutofit fontScale="77500" lnSpcReduction="20000"/>
+            <a:normAutofit fontScale="70000" lnSpcReduction="20000"/>
           </a:bodyPr>
           <a:lstStyle/>
           <a:p>
@@ -5775,6 +5749,30 @@
               <a:t>disease_status</a:t>
             </a:r>
             <a:r>
+              <a:rPr lang="en-US" i="1" dirty="0" smtClean="0"/>
+              <a:t>, </a:t>
+            </a:r>
+            <a:r>
+              <a:rPr lang="en-US" i="1" dirty="0" err="1" smtClean="0"/>
+              <a:t>study_id</a:t>
+            </a:r>
+            <a:r>
+              <a:rPr lang="en-US" i="1" dirty="0" smtClean="0"/>
+              <a:t>, </a:t>
+            </a:r>
+            <a:r>
+              <a:rPr lang="en-US" i="1" dirty="0" err="1" smtClean="0"/>
+              <a:t>received_ts</a:t>
+            </a:r>
+            <a:r>
+              <a:rPr lang="en-US" i="1" dirty="0" smtClean="0"/>
+              <a:t>, </a:t>
+            </a:r>
+            <a:r>
+              <a:rPr lang="en-US" i="1" dirty="0" err="1" smtClean="0"/>
+              <a:t>collection_ts</a:t>
+            </a:r>
+            <a:r>
               <a:rPr lang="en-US" dirty="0" smtClean="0"/>
               <a:t>)</a:t>
             </a:r>
@@ -5812,20 +5810,20 @@
             </a:r>
             <a:r>
               <a:rPr lang="en-US" i="1" dirty="0" err="1" smtClean="0"/>
-              <a:t>received_ts</a:t>
-            </a:r>
-            <a:r>
-              <a:rPr lang="en-US" dirty="0" smtClean="0"/>
-              <a:t>, </a:t>
-            </a:r>
-            <a:r>
-              <a:rPr lang="en-US" i="1" dirty="0" err="1" smtClean="0"/>
               <a:t>qc_ts</a:t>
             </a:r>
             <a:r>
               <a:rPr lang="en-US" dirty="0" smtClean="0"/>
               <a:t>)</a:t>
             </a:r>
+          </a:p>
+          <a:p>
+            <a:pPr lvl="1"/>
+            <a:r>
+              <a:rPr lang="en-US" dirty="0" smtClean="0"/>
+              <a:t>Timestamps conveyed in GMT/ISO-8601</a:t>
+            </a:r>
+            <a:endParaRPr lang="en-US" dirty="0" smtClean="0"/>
           </a:p>
         </p:txBody>
       </p:sp>
@@ -5868,7 +5866,7 @@
       </p:grpSpPr>
       <p:pic>
         <p:nvPicPr>
-          <p:cNvPr id="7" name="Picture 6"/>
+          <p:cNvPr id="2" name="Picture 1"/>
           <p:cNvPicPr>
             <a:picLocks noChangeAspect="1"/>
           </p:cNvPicPr>
@@ -5888,8 +5886,8 @@
         </p:blipFill>
         <p:spPr>
           <a:xfrm>
-            <a:off x="474908" y="0"/>
-            <a:ext cx="8194183" cy="6858000"/>
+            <a:off x="214044" y="0"/>
+            <a:ext cx="8715911" cy="6858000"/>
           </a:xfrm>
           <a:prstGeom prst="rect">
             <a:avLst/>
@@ -5965,7 +5963,7 @@
       </p:sp>
       <p:pic>
         <p:nvPicPr>
-          <p:cNvPr id="1027" name="Picture 3"/>
+          <p:cNvPr id="1026" name="Picture 2"/>
           <p:cNvPicPr>
             <a:picLocks noChangeAspect="1" noChangeArrowheads="1"/>
           </p:cNvPicPr>
@@ -5986,8 +5984,8 @@
         </p:blipFill>
         <p:spPr bwMode="auto">
           <a:xfrm>
-            <a:off x="838200" y="845745"/>
-            <a:ext cx="7696200" cy="5936055"/>
+            <a:off x="609600" y="685800"/>
+            <a:ext cx="7848600" cy="6047478"/>
           </a:xfrm>
           <a:prstGeom prst="rect">
             <a:avLst/>

</xml_diff>

<commit_message>
First stab at advisement (vs. failure) messaging
</commit_message>
<xml_diff>
--- a/NCH-PEDMATCH - Integration Walkthrough.pptx
+++ b/NCH-PEDMATCH - Integration Walkthrough.pptx
@@ -5,7 +5,7 @@
     <p:sldMasterId id="2147483648" r:id="rId1"/>
   </p:sldMasterIdLst>
   <p:handoutMasterIdLst>
-    <p:handoutMasterId r:id="rId12"/>
+    <p:handoutMasterId r:id="rId14"/>
   </p:handoutMasterIdLst>
   <p:sldIdLst>
     <p:sldId id="256" r:id="rId2"/>
@@ -17,7 +17,9 @@
     <p:sldId id="262" r:id="rId8"/>
     <p:sldId id="263" r:id="rId9"/>
     <p:sldId id="268" r:id="rId10"/>
-    <p:sldId id="269" r:id="rId11"/>
+    <p:sldId id="270" r:id="rId11"/>
+    <p:sldId id="271" r:id="rId12"/>
+    <p:sldId id="269" r:id="rId13"/>
   </p:sldIdLst>
   <p:sldSz cx="9144000" cy="6858000" type="screen4x3"/>
   <p:notesSz cx="6985000" cy="9283700"/>
@@ -130,6 +132,8 @@
             <p14:sldId id="262"/>
             <p14:sldId id="263"/>
             <p14:sldId id="268"/>
+            <p14:sldId id="270"/>
+            <p14:sldId id="271"/>
             <p14:sldId id="269"/>
           </p14:sldIdLst>
         </p14:section>
@@ -3338,15 +3342,7 @@
           <a:p>
             <a:r>
               <a:rPr lang="en-US" sz="2000" i="1" dirty="0" smtClean="0"/>
-              <a:t>Last revised, </a:t>
-            </a:r>
-            <a:r>
-              <a:rPr lang="en-US" sz="2000" i="1" dirty="0" smtClean="0"/>
-              <a:t>5/9/2016</a:t>
-            </a:r>
-            <a:r>
-              <a:rPr lang="en-US" sz="2000" i="1" dirty="0" smtClean="0"/>
-              <a:t>, ESK</a:t>
+              <a:t>Last revised, 5/9/2016, ESK</a:t>
             </a:r>
             <a:endParaRPr lang="en-US" sz="2000" i="1" dirty="0"/>
           </a:p>
@@ -3373,6 +3369,302 @@
 </file>
 
 <file path=ppt/slides/slide10.xml><?xml version="1.0" encoding="utf-8"?>
+<p:sld xmlns:a="http://schemas.openxmlformats.org/drawingml/2006/main" xmlns:r="http://schemas.openxmlformats.org/officeDocument/2006/relationships" xmlns:p="http://schemas.openxmlformats.org/presentationml/2006/main">
+  <p:cSld>
+    <p:spTree>
+      <p:nvGrpSpPr>
+        <p:cNvPr id="1" name=""/>
+        <p:cNvGrpSpPr/>
+        <p:nvPr/>
+      </p:nvGrpSpPr>
+      <p:grpSpPr>
+        <a:xfrm>
+          <a:off x="0" y="0"/>
+          <a:ext cx="0" cy="0"/>
+          <a:chOff x="0" y="0"/>
+          <a:chExt cx="0" cy="0"/>
+        </a:xfrm>
+      </p:grpSpPr>
+      <p:sp>
+        <p:nvSpPr>
+          <p:cNvPr id="2" name="Title 1"/>
+          <p:cNvSpPr>
+            <a:spLocks noGrp="1"/>
+          </p:cNvSpPr>
+          <p:nvPr>
+            <p:ph type="title"/>
+          </p:nvPr>
+        </p:nvSpPr>
+        <p:spPr/>
+        <p:txBody>
+          <a:bodyPr/>
+          <a:lstStyle/>
+          <a:p>
+            <a:r>
+              <a:rPr lang="en-US" dirty="0" smtClean="0"/>
+              <a:t>Workflow “Failure”</a:t>
+            </a:r>
+            <a:endParaRPr lang="en-US" dirty="0"/>
+          </a:p>
+        </p:txBody>
+      </p:sp>
+      <p:sp>
+        <p:nvSpPr>
+          <p:cNvPr id="3" name="Content Placeholder 2"/>
+          <p:cNvSpPr>
+            <a:spLocks noGrp="1"/>
+          </p:cNvSpPr>
+          <p:nvPr>
+            <p:ph idx="1"/>
+          </p:nvPr>
+        </p:nvSpPr>
+        <p:spPr/>
+        <p:txBody>
+          <a:bodyPr>
+            <a:normAutofit fontScale="85000" lnSpcReduction="20000"/>
+          </a:bodyPr>
+          <a:lstStyle/>
+          <a:p>
+            <a:r>
+              <a:rPr lang="en-US" dirty="0" smtClean="0"/>
+              <a:t>Terminology</a:t>
+            </a:r>
+          </a:p>
+          <a:p>
+            <a:pPr lvl="1"/>
+            <a:r>
+              <a:rPr lang="en-US" dirty="0" smtClean="0"/>
+              <a:t>Relating info about a correctable situation = “Advisement Message” </a:t>
+            </a:r>
+          </a:p>
+          <a:p>
+            <a:pPr lvl="1"/>
+            <a:r>
+              <a:rPr lang="en-US" dirty="0" smtClean="0"/>
+              <a:t>Declaring failure (i.e., non-correctable situation) = “Failure Message”</a:t>
+            </a:r>
+          </a:p>
+          <a:p>
+            <a:r>
+              <a:rPr lang="en-US" dirty="0" smtClean="0"/>
+              <a:t>NCH / BPC Will Send Advisement Messages only</a:t>
+            </a:r>
+          </a:p>
+          <a:p>
+            <a:pPr lvl="1"/>
+            <a:r>
+              <a:rPr lang="en-US" dirty="0" smtClean="0"/>
+              <a:t>The BPC is not in the position to declare that the overall case is at risk from a PED-MATCH workflow standpoint</a:t>
+            </a:r>
+          </a:p>
+          <a:p>
+            <a:pPr lvl="1"/>
+            <a:r>
+              <a:rPr lang="en-US" dirty="0" smtClean="0"/>
+              <a:t>We will notify MATCHBOX that something exceptional has happened via Advisement Messages</a:t>
+            </a:r>
+          </a:p>
+          <a:p>
+            <a:pPr lvl="1"/>
+            <a:r>
+              <a:rPr lang="en-US" dirty="0" smtClean="0"/>
+              <a:t>Advisement Messages will include discrete data about the patient/specimen(s) affected as well as the reason(s)</a:t>
+            </a:r>
+          </a:p>
+        </p:txBody>
+      </p:sp>
+    </p:spTree>
+    <p:extLst>
+      <p:ext uri="{BB962C8B-B14F-4D97-AF65-F5344CB8AC3E}">
+        <p14:creationId xmlns:p14="http://schemas.microsoft.com/office/powerpoint/2010/main" val="875289672"/>
+      </p:ext>
+    </p:extLst>
+  </p:cSld>
+  <p:clrMapOvr>
+    <a:masterClrMapping/>
+  </p:clrMapOvr>
+</p:sld>
+</file>
+
+<file path=ppt/slides/slide11.xml><?xml version="1.0" encoding="utf-8"?>
+<p:sld xmlns:a="http://schemas.openxmlformats.org/drawingml/2006/main" xmlns:r="http://schemas.openxmlformats.org/officeDocument/2006/relationships" xmlns:p="http://schemas.openxmlformats.org/presentationml/2006/main">
+  <p:cSld>
+    <p:spTree>
+      <p:nvGrpSpPr>
+        <p:cNvPr id="1" name=""/>
+        <p:cNvGrpSpPr/>
+        <p:nvPr/>
+      </p:nvGrpSpPr>
+      <p:grpSpPr>
+        <a:xfrm>
+          <a:off x="0" y="0"/>
+          <a:ext cx="0" cy="0"/>
+          <a:chOff x="0" y="0"/>
+          <a:chExt cx="0" cy="0"/>
+        </a:xfrm>
+      </p:grpSpPr>
+      <p:sp>
+        <p:nvSpPr>
+          <p:cNvPr id="2" name="Title 1"/>
+          <p:cNvSpPr>
+            <a:spLocks noGrp="1"/>
+          </p:cNvSpPr>
+          <p:nvPr>
+            <p:ph type="title"/>
+          </p:nvPr>
+        </p:nvSpPr>
+        <p:spPr/>
+        <p:txBody>
+          <a:bodyPr/>
+          <a:lstStyle/>
+          <a:p>
+            <a:r>
+              <a:rPr lang="en-US" dirty="0"/>
+              <a:t>Advisement Message scenarios</a:t>
+            </a:r>
+            <a:endParaRPr lang="en-US" dirty="0"/>
+          </a:p>
+        </p:txBody>
+      </p:sp>
+      <p:sp>
+        <p:nvSpPr>
+          <p:cNvPr id="3" name="Content Placeholder 2"/>
+          <p:cNvSpPr>
+            <a:spLocks noGrp="1"/>
+          </p:cNvSpPr>
+          <p:nvPr>
+            <p:ph idx="1"/>
+          </p:nvPr>
+        </p:nvSpPr>
+        <p:spPr>
+          <a:xfrm>
+            <a:off x="457200" y="1600200"/>
+            <a:ext cx="8229600" cy="4800600"/>
+          </a:xfrm>
+        </p:spPr>
+        <p:txBody>
+          <a:bodyPr>
+            <a:normAutofit fontScale="70000" lnSpcReduction="20000"/>
+          </a:bodyPr>
+          <a:lstStyle/>
+          <a:p>
+            <a:r>
+              <a:rPr lang="en-US" dirty="0" smtClean="0"/>
+              <a:t>Specimen Adequacy Advisements</a:t>
+            </a:r>
+          </a:p>
+          <a:p>
+            <a:pPr lvl="1"/>
+            <a:r>
+              <a:rPr lang="en-US" dirty="0" smtClean="0"/>
+              <a:t>Insufficient Material</a:t>
+            </a:r>
+          </a:p>
+          <a:p>
+            <a:pPr lvl="1"/>
+            <a:r>
+              <a:rPr lang="en-US" dirty="0" smtClean="0"/>
+              <a:t>Incorrect/Unexpected Material</a:t>
+            </a:r>
+          </a:p>
+          <a:p>
+            <a:pPr lvl="1"/>
+            <a:r>
+              <a:rPr lang="en-US" dirty="0" smtClean="0"/>
+              <a:t>Requesting additional material</a:t>
+            </a:r>
+          </a:p>
+          <a:p>
+            <a:pPr lvl="1"/>
+            <a:r>
+              <a:rPr lang="en-US" dirty="0" smtClean="0"/>
+              <a:t>No further material available</a:t>
+            </a:r>
+          </a:p>
+          <a:p>
+            <a:r>
+              <a:rPr lang="en-US" dirty="0" smtClean="0"/>
+              <a:t>Pathology Review Advisements</a:t>
+            </a:r>
+          </a:p>
+          <a:p>
+            <a:pPr lvl="1"/>
+            <a:r>
+              <a:rPr lang="en-US" dirty="0" smtClean="0"/>
+              <a:t>Pathology Not Concordant</a:t>
+            </a:r>
+          </a:p>
+          <a:p>
+            <a:pPr lvl="1"/>
+            <a:r>
+              <a:rPr lang="en-US" dirty="0" smtClean="0"/>
+              <a:t>Insufficient Tumor Present / High Necrosis</a:t>
+            </a:r>
+            <a:endParaRPr lang="en-US" dirty="0"/>
+          </a:p>
+          <a:p>
+            <a:r>
+              <a:rPr lang="en-US" dirty="0" smtClean="0"/>
+              <a:t>Extraction Advisements</a:t>
+            </a:r>
+          </a:p>
+          <a:p>
+            <a:pPr lvl="1"/>
+            <a:r>
+              <a:rPr lang="en-US" dirty="0" smtClean="0"/>
+              <a:t>Low Yield / QNS</a:t>
+            </a:r>
+          </a:p>
+          <a:p>
+            <a:pPr lvl="1"/>
+            <a:r>
+              <a:rPr lang="en-US" dirty="0" smtClean="0"/>
+              <a:t>Extraction QC Failure</a:t>
+            </a:r>
+          </a:p>
+          <a:p>
+            <a:pPr lvl="1"/>
+            <a:r>
+              <a:rPr lang="en-US" dirty="0" smtClean="0"/>
+              <a:t>General Laboratory Failure (catch all, e.g., contaminated specimen)</a:t>
+            </a:r>
+          </a:p>
+          <a:p>
+            <a:r>
+              <a:rPr lang="en-US" dirty="0" smtClean="0"/>
+              <a:t>Patient Advisements</a:t>
+            </a:r>
+          </a:p>
+          <a:p>
+            <a:pPr lvl="1"/>
+            <a:r>
+              <a:rPr lang="en-US" dirty="0"/>
+              <a:t>Patient Identity Mismatch</a:t>
+            </a:r>
+          </a:p>
+          <a:p>
+            <a:pPr lvl="1"/>
+            <a:r>
+              <a:rPr lang="en-US" dirty="0" smtClean="0"/>
+              <a:t>Patient Not Enrolled (based on enrollment data from COG data share)</a:t>
+            </a:r>
+          </a:p>
+        </p:txBody>
+      </p:sp>
+    </p:spTree>
+    <p:extLst>
+      <p:ext uri="{BB962C8B-B14F-4D97-AF65-F5344CB8AC3E}">
+        <p14:creationId xmlns:p14="http://schemas.microsoft.com/office/powerpoint/2010/main" val="1710069553"/>
+      </p:ext>
+    </p:extLst>
+  </p:cSld>
+  <p:clrMapOvr>
+    <a:masterClrMapping/>
+  </p:clrMapOvr>
+</p:sld>
+</file>
+
+<file path=ppt/slides/slide12.xml><?xml version="1.0" encoding="utf-8"?>
 <p:sld xmlns:a="http://schemas.openxmlformats.org/drawingml/2006/main" xmlns:r="http://schemas.openxmlformats.org/officeDocument/2006/relationships" xmlns:p="http://schemas.openxmlformats.org/presentationml/2006/main">
   <p:cSld>
     <p:spTree>
@@ -5776,7 +6068,6 @@
               <a:rPr lang="en-US" dirty="0" smtClean="0"/>
               <a:t>)</a:t>
             </a:r>
-            <a:endParaRPr lang="en-US" dirty="0" smtClean="0"/>
           </a:p>
           <a:p>
             <a:pPr lvl="2"/>
@@ -5823,7 +6114,6 @@
               <a:rPr lang="en-US" dirty="0" smtClean="0"/>
               <a:t>Timestamps conveyed in GMT/ISO-8601</a:t>
             </a:r>
-            <a:endParaRPr lang="en-US" dirty="0" smtClean="0"/>
           </a:p>
         </p:txBody>
       </p:sp>

</xml_diff>

<commit_message>
Workflow Exception draft content
Defines initial workflow exception JSON object model; Powerpoint slides for describing failure vs. advisement; Initial exception categories/reasons
</commit_message>
<xml_diff>
--- a/NCH-PEDMATCH - Integration Walkthrough.pptx
+++ b/NCH-PEDMATCH - Integration Walkthrough.pptx
@@ -5,7 +5,7 @@
     <p:sldMasterId id="2147483648" r:id="rId1"/>
   </p:sldMasterIdLst>
   <p:handoutMasterIdLst>
-    <p:handoutMasterId r:id="rId14"/>
+    <p:handoutMasterId r:id="rId16"/>
   </p:handoutMasterIdLst>
   <p:sldIdLst>
     <p:sldId id="256" r:id="rId2"/>
@@ -16,10 +16,12 @@
     <p:sldId id="257" r:id="rId7"/>
     <p:sldId id="262" r:id="rId8"/>
     <p:sldId id="263" r:id="rId9"/>
-    <p:sldId id="268" r:id="rId10"/>
-    <p:sldId id="270" r:id="rId11"/>
+    <p:sldId id="270" r:id="rId10"/>
+    <p:sldId id="273" r:id="rId11"/>
     <p:sldId id="271" r:id="rId12"/>
-    <p:sldId id="269" r:id="rId13"/>
+    <p:sldId id="268" r:id="rId13"/>
+    <p:sldId id="272" r:id="rId14"/>
+    <p:sldId id="269" r:id="rId15"/>
   </p:sldIdLst>
   <p:sldSz cx="9144000" cy="6858000" type="screen4x3"/>
   <p:notesSz cx="6985000" cy="9283700"/>
@@ -131,9 +133,11 @@
             <p14:sldId id="257"/>
             <p14:sldId id="262"/>
             <p14:sldId id="263"/>
+            <p14:sldId id="270"/>
+            <p14:sldId id="273"/>
+            <p14:sldId id="271"/>
             <p14:sldId id="268"/>
-            <p14:sldId id="270"/>
-            <p14:sldId id="271"/>
+            <p14:sldId id="272"/>
             <p14:sldId id="269"/>
           </p14:sldIdLst>
         </p14:section>
@@ -225,7 +229,7 @@
           <a:p>
             <a:fld id="{3FF84A29-B2B8-41F0-A86E-DD7AE0E3C1FF}" type="datetimeFigureOut">
               <a:rPr lang="en-US" smtClean="0"/>
-              <a:t>5/9/2016</a:t>
+              <a:t>5/12/2016</a:t>
             </a:fld>
             <a:endParaRPr lang="en-US"/>
           </a:p>
@@ -489,7 +493,7 @@
           <a:p>
             <a:fld id="{10589FC0-A008-4DEA-8067-226D6B8CA3BC}" type="datetimeFigureOut">
               <a:rPr lang="en-US" smtClean="0"/>
-              <a:t>5/9/2016</a:t>
+              <a:t>5/12/2016</a:t>
             </a:fld>
             <a:endParaRPr lang="en-US"/>
           </a:p>
@@ -659,7 +663,7 @@
           <a:p>
             <a:fld id="{10589FC0-A008-4DEA-8067-226D6B8CA3BC}" type="datetimeFigureOut">
               <a:rPr lang="en-US" smtClean="0"/>
-              <a:t>5/9/2016</a:t>
+              <a:t>5/12/2016</a:t>
             </a:fld>
             <a:endParaRPr lang="en-US"/>
           </a:p>
@@ -839,7 +843,7 @@
           <a:p>
             <a:fld id="{10589FC0-A008-4DEA-8067-226D6B8CA3BC}" type="datetimeFigureOut">
               <a:rPr lang="en-US" smtClean="0"/>
-              <a:t>5/9/2016</a:t>
+              <a:t>5/12/2016</a:t>
             </a:fld>
             <a:endParaRPr lang="en-US"/>
           </a:p>
@@ -1009,7 +1013,7 @@
           <a:p>
             <a:fld id="{10589FC0-A008-4DEA-8067-226D6B8CA3BC}" type="datetimeFigureOut">
               <a:rPr lang="en-US" smtClean="0"/>
-              <a:t>5/9/2016</a:t>
+              <a:t>5/12/2016</a:t>
             </a:fld>
             <a:endParaRPr lang="en-US"/>
           </a:p>
@@ -1255,7 +1259,7 @@
           <a:p>
             <a:fld id="{10589FC0-A008-4DEA-8067-226D6B8CA3BC}" type="datetimeFigureOut">
               <a:rPr lang="en-US" smtClean="0"/>
-              <a:t>5/9/2016</a:t>
+              <a:t>5/12/2016</a:t>
             </a:fld>
             <a:endParaRPr lang="en-US"/>
           </a:p>
@@ -1543,7 +1547,7 @@
           <a:p>
             <a:fld id="{10589FC0-A008-4DEA-8067-226D6B8CA3BC}" type="datetimeFigureOut">
               <a:rPr lang="en-US" smtClean="0"/>
-              <a:t>5/9/2016</a:t>
+              <a:t>5/12/2016</a:t>
             </a:fld>
             <a:endParaRPr lang="en-US"/>
           </a:p>
@@ -1965,7 +1969,7 @@
           <a:p>
             <a:fld id="{10589FC0-A008-4DEA-8067-226D6B8CA3BC}" type="datetimeFigureOut">
               <a:rPr lang="en-US" smtClean="0"/>
-              <a:t>5/9/2016</a:t>
+              <a:t>5/12/2016</a:t>
             </a:fld>
             <a:endParaRPr lang="en-US"/>
           </a:p>
@@ -2083,7 +2087,7 @@
           <a:p>
             <a:fld id="{10589FC0-A008-4DEA-8067-226D6B8CA3BC}" type="datetimeFigureOut">
               <a:rPr lang="en-US" smtClean="0"/>
-              <a:t>5/9/2016</a:t>
+              <a:t>5/12/2016</a:t>
             </a:fld>
             <a:endParaRPr lang="en-US"/>
           </a:p>
@@ -2178,7 +2182,7 @@
           <a:p>
             <a:fld id="{10589FC0-A008-4DEA-8067-226D6B8CA3BC}" type="datetimeFigureOut">
               <a:rPr lang="en-US" smtClean="0"/>
-              <a:t>5/9/2016</a:t>
+              <a:t>5/12/2016</a:t>
             </a:fld>
             <a:endParaRPr lang="en-US"/>
           </a:p>
@@ -2455,7 +2459,7 @@
           <a:p>
             <a:fld id="{10589FC0-A008-4DEA-8067-226D6B8CA3BC}" type="datetimeFigureOut">
               <a:rPr lang="en-US" smtClean="0"/>
-              <a:t>5/9/2016</a:t>
+              <a:t>5/12/2016</a:t>
             </a:fld>
             <a:endParaRPr lang="en-US"/>
           </a:p>
@@ -2708,7 +2712,7 @@
           <a:p>
             <a:fld id="{10589FC0-A008-4DEA-8067-226D6B8CA3BC}" type="datetimeFigureOut">
               <a:rPr lang="en-US" smtClean="0"/>
-              <a:t>5/9/2016</a:t>
+              <a:t>5/12/2016</a:t>
             </a:fld>
             <a:endParaRPr lang="en-US"/>
           </a:p>
@@ -2921,7 +2925,7 @@
           <a:p>
             <a:fld id="{10589FC0-A008-4DEA-8067-226D6B8CA3BC}" type="datetimeFigureOut">
               <a:rPr lang="en-US" smtClean="0"/>
-              <a:t>5/9/2016</a:t>
+              <a:t>5/12/2016</a:t>
             </a:fld>
             <a:endParaRPr lang="en-US"/>
           </a:p>
@@ -3387,7 +3391,7 @@
       </p:grpSpPr>
       <p:sp>
         <p:nvSpPr>
-          <p:cNvPr id="2" name="Title 1"/>
+          <p:cNvPr id="3" name="Title 1"/>
           <p:cNvSpPr>
             <a:spLocks noGrp="1"/>
           </p:cNvSpPr>
@@ -3395,94 +3399,132 @@
             <p:ph type="title"/>
           </p:nvPr>
         </p:nvSpPr>
-        <p:spPr/>
-        <p:txBody>
-          <a:bodyPr/>
-          <a:lstStyle/>
-          <a:p>
-            <a:r>
-              <a:rPr lang="en-US" dirty="0" smtClean="0"/>
-              <a:t>Workflow “Failure”</a:t>
-            </a:r>
-            <a:endParaRPr lang="en-US" dirty="0"/>
-          </a:p>
-        </p:txBody>
-      </p:sp>
-      <p:sp>
-        <p:nvSpPr>
-          <p:cNvPr id="3" name="Content Placeholder 2"/>
-          <p:cNvSpPr>
-            <a:spLocks noGrp="1"/>
-          </p:cNvSpPr>
-          <p:nvPr>
-            <p:ph idx="1"/>
-          </p:nvPr>
-        </p:nvSpPr>
-        <p:spPr/>
+        <p:spPr>
+          <a:xfrm>
+            <a:off x="457200" y="0"/>
+            <a:ext cx="8229600" cy="914400"/>
+          </a:xfrm>
+        </p:spPr>
         <p:txBody>
           <a:bodyPr>
-            <a:normAutofit fontScale="85000" lnSpcReduction="20000"/>
+            <a:normAutofit/>
           </a:bodyPr>
           <a:lstStyle/>
           <a:p>
             <a:r>
-              <a:rPr lang="en-US" dirty="0" smtClean="0"/>
-              <a:t>Terminology</a:t>
-            </a:r>
-          </a:p>
-          <a:p>
-            <a:pPr lvl="1"/>
-            <a:r>
-              <a:rPr lang="en-US" dirty="0" smtClean="0"/>
-              <a:t>Relating info about a correctable situation = “Advisement Message” </a:t>
-            </a:r>
-          </a:p>
-          <a:p>
-            <a:pPr lvl="1"/>
-            <a:r>
-              <a:rPr lang="en-US" dirty="0" smtClean="0"/>
-              <a:t>Declaring failure (i.e., non-correctable situation) = “Failure Message”</a:t>
-            </a:r>
-          </a:p>
-          <a:p>
-            <a:r>
-              <a:rPr lang="en-US" dirty="0" smtClean="0"/>
-              <a:t>NCH / BPC Will Send Advisement Messages only</a:t>
-            </a:r>
-          </a:p>
-          <a:p>
-            <a:pPr lvl="1"/>
-            <a:r>
-              <a:rPr lang="en-US" dirty="0" smtClean="0"/>
-              <a:t>The BPC is not in the position to declare that the overall case is at risk from a PED-MATCH workflow standpoint</a:t>
-            </a:r>
-          </a:p>
-          <a:p>
-            <a:pPr lvl="1"/>
-            <a:r>
-              <a:rPr lang="en-US" dirty="0" smtClean="0"/>
-              <a:t>We will notify MATCHBOX that something exceptional has happened via Advisement Messages</a:t>
-            </a:r>
-          </a:p>
-          <a:p>
-            <a:pPr lvl="1"/>
-            <a:r>
-              <a:rPr lang="en-US" dirty="0" smtClean="0"/>
-              <a:t>Advisement Messages will include discrete data about the patient/specimen(s) affected as well as the reason(s)</a:t>
-            </a:r>
-          </a:p>
-        </p:txBody>
-      </p:sp>
+              <a:rPr lang="en-US" sz="3600" dirty="0" smtClean="0"/>
+              <a:t>“Workflow Exception” </a:t>
+            </a:r>
+            <a:r>
+              <a:rPr lang="en-US" sz="3600" dirty="0" smtClean="0"/>
+              <a:t>Integration Message</a:t>
+            </a:r>
+            <a:endParaRPr lang="en-US" sz="3600" dirty="0"/>
+          </a:p>
+        </p:txBody>
+      </p:sp>
+      <p:sp>
+        <p:nvSpPr>
+          <p:cNvPr id="2" name="Rectangle 1"/>
+          <p:cNvSpPr/>
+          <p:nvPr/>
+        </p:nvSpPr>
+        <p:spPr>
+          <a:xfrm>
+            <a:off x="3276600" y="6509173"/>
+            <a:ext cx="4191000" cy="246221"/>
+          </a:xfrm>
+          <a:prstGeom prst="rect">
+            <a:avLst/>
+          </a:prstGeom>
+          <a:solidFill>
+            <a:schemeClr val="bg1"/>
+          </a:solidFill>
+        </p:spPr>
+        <p:txBody>
+          <a:bodyPr wrap="square">
+            <a:spAutoFit/>
+          </a:bodyPr>
+          <a:lstStyle/>
+          <a:p>
+            <a:r>
+              <a:rPr lang="en-US" sz="1000" i="1" dirty="0"/>
+              <a:t>http://www.jsoneditoronline.org/?id=8980b0e336c36ef69c6bd471f07f6c6d</a:t>
+            </a:r>
+          </a:p>
+        </p:txBody>
+      </p:sp>
+      <p:pic>
+        <p:nvPicPr>
+          <p:cNvPr id="4" name="Picture 2"/>
+          <p:cNvPicPr>
+            <a:picLocks noChangeAspect="1" noChangeArrowheads="1"/>
+          </p:cNvPicPr>
+          <p:nvPr/>
+        </p:nvPicPr>
+        <p:blipFill>
+          <a:blip r:embed="rId2">
+            <a:extLst>
+              <a:ext uri="{28A0092B-C50C-407E-A947-70E740481C1C}">
+                <a14:useLocalDpi xmlns:a14="http://schemas.microsoft.com/office/drawing/2010/main" val="0"/>
+              </a:ext>
+            </a:extLst>
+          </a:blip>
+          <a:srcRect/>
+          <a:stretch>
+            <a:fillRect/>
+          </a:stretch>
+        </p:blipFill>
+        <p:spPr bwMode="auto">
+          <a:xfrm>
+            <a:off x="228601" y="777289"/>
+            <a:ext cx="8686800" cy="5732960"/>
+          </a:xfrm>
+          <a:prstGeom prst="rect">
+            <a:avLst/>
+          </a:prstGeom>
+          <a:noFill/>
+          <a:ln>
+            <a:noFill/>
+          </a:ln>
+          <a:extLst>
+            <a:ext uri="{909E8E84-426E-40DD-AFC4-6F175D3DCCD1}">
+              <a14:hiddenFill xmlns:a14="http://schemas.microsoft.com/office/drawing/2010/main">
+                <a:solidFill>
+                  <a:schemeClr val="accent1"/>
+                </a:solidFill>
+              </a14:hiddenFill>
+            </a:ext>
+            <a:ext uri="{91240B29-F687-4F45-9708-019B960494DF}">
+              <a14:hiddenLine xmlns:a14="http://schemas.microsoft.com/office/drawing/2010/main" w="9525">
+                <a:solidFill>
+                  <a:schemeClr val="tx1"/>
+                </a:solidFill>
+                <a:miter lim="800000"/>
+                <a:headEnd/>
+                <a:tailEnd/>
+              </a14:hiddenLine>
+            </a:ext>
+          </a:extLst>
+        </p:spPr>
+      </p:pic>
     </p:spTree>
     <p:extLst>
       <p:ext uri="{BB962C8B-B14F-4D97-AF65-F5344CB8AC3E}">
-        <p14:creationId xmlns:p14="http://schemas.microsoft.com/office/powerpoint/2010/main" val="875289672"/>
+        <p14:creationId xmlns:p14="http://schemas.microsoft.com/office/powerpoint/2010/main" val="4209202885"/>
       </p:ext>
     </p:extLst>
   </p:cSld>
   <p:clrMapOvr>
     <a:masterClrMapping/>
   </p:clrMapOvr>
+  <p:timing>
+    <p:tnLst>
+      <p:par>
+        <p:cTn id="1" dur="indefinite" restart="never" nodeType="tmRoot"/>
+      </p:par>
+    </p:tnLst>
+  </p:timing>
 </p:sld>
 </file>
 
@@ -3515,14 +3557,16 @@
         </p:nvSpPr>
         <p:spPr/>
         <p:txBody>
-          <a:bodyPr/>
-          <a:lstStyle/>
-          <a:p>
-            <a:r>
-              <a:rPr lang="en-US" dirty="0"/>
-              <a:t>Advisement Message scenarios</a:t>
-            </a:r>
-            <a:endParaRPr lang="en-US" dirty="0"/>
+          <a:bodyPr>
+            <a:normAutofit/>
+          </a:bodyPr>
+          <a:lstStyle/>
+          <a:p>
+            <a:r>
+              <a:rPr lang="en-US" sz="3600" dirty="0" smtClean="0"/>
+              <a:t>Workflow Exception/Advisement Scenarios</a:t>
+            </a:r>
+            <a:endParaRPr lang="en-US" sz="3600" dirty="0"/>
           </a:p>
         </p:txBody>
       </p:sp>
@@ -3538,7 +3582,7 @@
         </p:nvSpPr>
         <p:spPr>
           <a:xfrm>
-            <a:off x="457200" y="1600200"/>
+            <a:off x="457200" y="1447800"/>
             <a:ext cx="8229600" cy="4800600"/>
           </a:xfrm>
         </p:spPr>
@@ -3648,6 +3692,44 @@
               <a:rPr lang="en-US" dirty="0" smtClean="0"/>
               <a:t>Patient Not Enrolled (based on enrollment data from COG data share)</a:t>
             </a:r>
+          </a:p>
+        </p:txBody>
+      </p:sp>
+      <p:sp>
+        <p:nvSpPr>
+          <p:cNvPr id="4" name="TextBox 3"/>
+          <p:cNvSpPr txBox="1"/>
+          <p:nvPr/>
+        </p:nvSpPr>
+        <p:spPr>
+          <a:xfrm rot="19845029">
+            <a:off x="192925" y="319342"/>
+            <a:ext cx="779701" cy="369332"/>
+          </a:xfrm>
+          <a:prstGeom prst="rect">
+            <a:avLst/>
+          </a:prstGeom>
+          <a:noFill/>
+        </p:spPr>
+        <p:txBody>
+          <a:bodyPr wrap="none" rtlCol="0">
+            <a:spAutoFit/>
+          </a:bodyPr>
+          <a:lstStyle/>
+          <a:p>
+            <a:r>
+              <a:rPr lang="en-US" dirty="0" smtClean="0">
+                <a:solidFill>
+                  <a:srgbClr val="FF0000"/>
+                </a:solidFill>
+              </a:rPr>
+              <a:t>(draft)</a:t>
+            </a:r>
+            <a:endParaRPr lang="en-US" dirty="0">
+              <a:solidFill>
+                <a:srgbClr val="FF0000"/>
+              </a:solidFill>
+            </a:endParaRPr>
           </a:p>
         </p:txBody>
       </p:sp>
@@ -3665,6 +3747,173 @@
 </file>
 
 <file path=ppt/slides/slide12.xml><?xml version="1.0" encoding="utf-8"?>
+<p:sld xmlns:a="http://schemas.openxmlformats.org/drawingml/2006/main" xmlns:r="http://schemas.openxmlformats.org/officeDocument/2006/relationships" xmlns:p="http://schemas.openxmlformats.org/presentationml/2006/main">
+  <p:cSld>
+    <p:spTree>
+      <p:nvGrpSpPr>
+        <p:cNvPr id="1" name=""/>
+        <p:cNvGrpSpPr/>
+        <p:nvPr/>
+      </p:nvGrpSpPr>
+      <p:grpSpPr>
+        <a:xfrm>
+          <a:off x="0" y="0"/>
+          <a:ext cx="0" cy="0"/>
+          <a:chOff x="0" y="0"/>
+          <a:chExt cx="0" cy="0"/>
+        </a:xfrm>
+      </p:grpSpPr>
+      <p:sp>
+        <p:nvSpPr>
+          <p:cNvPr id="2" name="Title 1"/>
+          <p:cNvSpPr>
+            <a:spLocks noGrp="1"/>
+          </p:cNvSpPr>
+          <p:nvPr>
+            <p:ph type="title"/>
+          </p:nvPr>
+        </p:nvSpPr>
+        <p:spPr/>
+        <p:txBody>
+          <a:bodyPr/>
+          <a:lstStyle/>
+          <a:p>
+            <a:r>
+              <a:rPr lang="en-US" dirty="0" smtClean="0"/>
+              <a:t>To be continued…</a:t>
+            </a:r>
+            <a:endParaRPr lang="en-US" dirty="0"/>
+          </a:p>
+        </p:txBody>
+      </p:sp>
+      <p:sp>
+        <p:nvSpPr>
+          <p:cNvPr id="3" name="Content Placeholder 2"/>
+          <p:cNvSpPr>
+            <a:spLocks noGrp="1"/>
+          </p:cNvSpPr>
+          <p:nvPr>
+            <p:ph idx="1"/>
+          </p:nvPr>
+        </p:nvSpPr>
+        <p:spPr/>
+        <p:txBody>
+          <a:bodyPr/>
+          <a:lstStyle/>
+          <a:p>
+            <a:r>
+              <a:rPr lang="en-US" dirty="0" smtClean="0"/>
+              <a:t>Definition of specific attributes for grouping specimens for CGID derivation</a:t>
+            </a:r>
+          </a:p>
+          <a:p>
+            <a:r>
+              <a:rPr lang="en-US" dirty="0" smtClean="0"/>
+              <a:t>Semantics and messaging scenarios for “specimen failed” messaging</a:t>
+            </a:r>
+          </a:p>
+          <a:p>
+            <a:endParaRPr lang="en-US" dirty="0"/>
+          </a:p>
+        </p:txBody>
+      </p:sp>
+    </p:spTree>
+    <p:extLst>
+      <p:ext uri="{BB962C8B-B14F-4D97-AF65-F5344CB8AC3E}">
+        <p14:creationId xmlns:p14="http://schemas.microsoft.com/office/powerpoint/2010/main" val="2443700564"/>
+      </p:ext>
+    </p:extLst>
+  </p:cSld>
+  <p:clrMapOvr>
+    <a:masterClrMapping/>
+  </p:clrMapOvr>
+  <p:timing>
+    <p:tnLst>
+      <p:par>
+        <p:cTn id="1" dur="indefinite" restart="never" nodeType="tmRoot"/>
+      </p:par>
+    </p:tnLst>
+  </p:timing>
+</p:sld>
+</file>
+
+<file path=ppt/slides/slide13.xml><?xml version="1.0" encoding="utf-8"?>
+<p:sld xmlns:a="http://schemas.openxmlformats.org/drawingml/2006/main" xmlns:r="http://schemas.openxmlformats.org/officeDocument/2006/relationships" xmlns:p="http://schemas.openxmlformats.org/presentationml/2006/main">
+  <p:cSld>
+    <p:spTree>
+      <p:nvGrpSpPr>
+        <p:cNvPr id="1" name=""/>
+        <p:cNvGrpSpPr/>
+        <p:nvPr/>
+      </p:nvGrpSpPr>
+      <p:grpSpPr>
+        <a:xfrm>
+          <a:off x="0" y="0"/>
+          <a:ext cx="0" cy="0"/>
+          <a:chOff x="0" y="0"/>
+          <a:chExt cx="0" cy="0"/>
+        </a:xfrm>
+      </p:grpSpPr>
+      <p:sp>
+        <p:nvSpPr>
+          <p:cNvPr id="2" name="Title 1"/>
+          <p:cNvSpPr>
+            <a:spLocks noGrp="1"/>
+          </p:cNvSpPr>
+          <p:nvPr>
+            <p:ph type="title"/>
+          </p:nvPr>
+        </p:nvSpPr>
+        <p:spPr/>
+        <p:txBody>
+          <a:bodyPr/>
+          <a:lstStyle/>
+          <a:p>
+            <a:r>
+              <a:rPr lang="en-US" dirty="0" smtClean="0"/>
+              <a:t>Testing Screen Mock Ups</a:t>
+            </a:r>
+            <a:endParaRPr lang="en-US" dirty="0"/>
+          </a:p>
+        </p:txBody>
+      </p:sp>
+      <p:sp>
+        <p:nvSpPr>
+          <p:cNvPr id="3" name="Content Placeholder 2"/>
+          <p:cNvSpPr>
+            <a:spLocks noGrp="1"/>
+          </p:cNvSpPr>
+          <p:nvPr>
+            <p:ph idx="1"/>
+          </p:nvPr>
+        </p:nvSpPr>
+        <p:spPr/>
+        <p:txBody>
+          <a:bodyPr/>
+          <a:lstStyle/>
+          <a:p>
+            <a:r>
+              <a:rPr lang="en-US" dirty="0" smtClean="0"/>
+              <a:t>…scenarios for JGF…</a:t>
+            </a:r>
+            <a:endParaRPr lang="en-US" dirty="0"/>
+          </a:p>
+        </p:txBody>
+      </p:sp>
+    </p:spTree>
+    <p:extLst>
+      <p:ext uri="{BB962C8B-B14F-4D97-AF65-F5344CB8AC3E}">
+        <p14:creationId xmlns:p14="http://schemas.microsoft.com/office/powerpoint/2010/main" val="1553971423"/>
+      </p:ext>
+    </p:extLst>
+  </p:cSld>
+  <p:clrMapOvr>
+    <a:masterClrMapping/>
+  </p:clrMapOvr>
+</p:sld>
+</file>
+
+<file path=ppt/slides/slide14.xml><?xml version="1.0" encoding="utf-8"?>
 <p:sld xmlns:a="http://schemas.openxmlformats.org/drawingml/2006/main" xmlns:r="http://schemas.openxmlformats.org/officeDocument/2006/relationships" xmlns:p="http://schemas.openxmlformats.org/presentationml/2006/main">
   <p:cSld>
     <p:spTree>
@@ -6305,6 +6554,37 @@
           </a:extLst>
         </p:spPr>
       </p:pic>
+      <p:sp>
+        <p:nvSpPr>
+          <p:cNvPr id="2" name="Rectangle 1"/>
+          <p:cNvSpPr/>
+          <p:nvPr/>
+        </p:nvSpPr>
+        <p:spPr>
+          <a:xfrm>
+            <a:off x="3276600" y="6509173"/>
+            <a:ext cx="4191000" cy="246221"/>
+          </a:xfrm>
+          <a:prstGeom prst="rect">
+            <a:avLst/>
+          </a:prstGeom>
+          <a:solidFill>
+            <a:schemeClr val="bg1"/>
+          </a:solidFill>
+        </p:spPr>
+        <p:txBody>
+          <a:bodyPr wrap="square">
+            <a:spAutoFit/>
+          </a:bodyPr>
+          <a:lstStyle/>
+          <a:p>
+            <a:r>
+              <a:rPr lang="en-US" sz="1000" i="1" dirty="0"/>
+              <a:t>http://www.jsoneditoronline.org/?id=2bb98110923f6ffbed5df847737154b3</a:t>
+            </a:r>
+          </a:p>
+        </p:txBody>
+      </p:sp>
     </p:spTree>
     <p:extLst>
       <p:ext uri="{BB962C8B-B14F-4D97-AF65-F5344CB8AC3E}">
@@ -6359,7 +6639,7 @@
           <a:p>
             <a:r>
               <a:rPr lang="en-US" dirty="0" smtClean="0"/>
-              <a:t>To be continued…</a:t>
+              <a:t>Terminology (continued)</a:t>
             </a:r>
             <a:endParaRPr lang="en-US" dirty="0"/>
           </a:p>
@@ -6377,42 +6657,134 @@
         </p:nvSpPr>
         <p:spPr/>
         <p:txBody>
-          <a:bodyPr/>
+          <a:bodyPr>
+            <a:normAutofit fontScale="70000" lnSpcReduction="20000"/>
+          </a:bodyPr>
           <a:lstStyle/>
           <a:p>
             <a:r>
               <a:rPr lang="en-US" dirty="0" smtClean="0"/>
-              <a:t>Definition of specific attributes for grouping specimens for CGID derivation</a:t>
-            </a:r>
-          </a:p>
-          <a:p>
+              <a:t>Workflow Exception</a:t>
+            </a:r>
+            <a:endParaRPr lang="en-US" dirty="0" smtClean="0"/>
+          </a:p>
+          <a:p>
+            <a:pPr lvl="1"/>
             <a:r>
               <a:rPr lang="en-US" dirty="0" smtClean="0"/>
-              <a:t>Semantics and messaging scenarios for “specimen failed” messaging</a:t>
-            </a:r>
-          </a:p>
-          <a:p>
-            <a:endParaRPr lang="en-US" dirty="0"/>
+              <a:t>Something that does not follow the happy path</a:t>
+            </a:r>
+          </a:p>
+          <a:p>
+            <a:pPr lvl="1"/>
+            <a:r>
+              <a:rPr lang="en-US" dirty="0" smtClean="0"/>
+              <a:t>Does not necessarily imply failure—could be informative</a:t>
+            </a:r>
+          </a:p>
+          <a:p>
+            <a:pPr lvl="1"/>
+            <a:r>
+              <a:rPr lang="en-US" dirty="0" smtClean="0"/>
+              <a:t>May be a patient-level or specimen-level issue</a:t>
+            </a:r>
+          </a:p>
+          <a:p>
+            <a:r>
+              <a:rPr lang="en-US" dirty="0" smtClean="0"/>
+              <a:t>Workflow Exception Severity</a:t>
+            </a:r>
+            <a:endParaRPr lang="en-US" dirty="0" smtClean="0"/>
+          </a:p>
+          <a:p>
+            <a:pPr lvl="1"/>
+            <a:r>
+              <a:rPr lang="en-US" dirty="0" smtClean="0"/>
+              <a:t>“Advisement” = C</a:t>
+            </a:r>
+            <a:r>
+              <a:rPr lang="en-US" dirty="0" smtClean="0"/>
+              <a:t>orrectable situation or status update</a:t>
+            </a:r>
+          </a:p>
+          <a:p>
+            <a:pPr lvl="1"/>
+            <a:r>
+              <a:rPr lang="en-US" dirty="0" smtClean="0"/>
+              <a:t>“Failure” = Non-correctable situation (with likely downside implications for patient’s involvement in </a:t>
+            </a:r>
+            <a:r>
+              <a:rPr lang="en-US" dirty="0" err="1" smtClean="0"/>
+              <a:t>Ped</a:t>
+            </a:r>
+            <a:r>
+              <a:rPr lang="en-US" dirty="0" smtClean="0"/>
+              <a:t>-MATCH)</a:t>
+            </a:r>
+            <a:endParaRPr lang="en-US" dirty="0" smtClean="0"/>
+          </a:p>
+          <a:p>
+            <a:r>
+              <a:rPr lang="en-US" dirty="0" smtClean="0"/>
+              <a:t>Workflow Exception Details</a:t>
+            </a:r>
+          </a:p>
+          <a:p>
+            <a:pPr lvl="1"/>
+            <a:r>
+              <a:rPr lang="en-US" dirty="0" smtClean="0"/>
+              <a:t>Will include a discrete “</a:t>
+            </a:r>
+            <a:r>
+              <a:rPr lang="en-US" dirty="0" err="1" smtClean="0"/>
+              <a:t>exception_reason</a:t>
+            </a:r>
+            <a:r>
+              <a:rPr lang="en-US" dirty="0" smtClean="0"/>
+              <a:t>” from a pre-defined list (e.g., “</a:t>
+            </a:r>
+            <a:r>
+              <a:rPr lang="en-US" dirty="0" err="1" smtClean="0"/>
+              <a:t>path_not_concordant</a:t>
+            </a:r>
+            <a:r>
+              <a:rPr lang="en-US" dirty="0" smtClean="0"/>
+              <a:t>”); semantics still being defined—future draft will propose</a:t>
+            </a:r>
+            <a:endParaRPr lang="en-US" dirty="0" smtClean="0"/>
+          </a:p>
+          <a:p>
+            <a:pPr lvl="1"/>
+            <a:r>
+              <a:rPr lang="en-US" dirty="0" smtClean="0"/>
+              <a:t>May include a free-form textual “</a:t>
+            </a:r>
+            <a:r>
+              <a:rPr lang="en-US" dirty="0" err="1" smtClean="0"/>
+              <a:t>exception_notes</a:t>
+            </a:r>
+            <a:r>
+              <a:rPr lang="en-US" dirty="0" smtClean="0"/>
+              <a:t>” with additional details to help understand the context of the exception (e.g., “Specimen appears to have been contaminated</a:t>
+            </a:r>
+            <a:r>
+              <a:rPr lang="en-US" dirty="0" smtClean="0"/>
+              <a:t>”)</a:t>
+            </a:r>
+            <a:endParaRPr lang="en-US" dirty="0" smtClean="0"/>
           </a:p>
         </p:txBody>
       </p:sp>
     </p:spTree>
     <p:extLst>
       <p:ext uri="{BB962C8B-B14F-4D97-AF65-F5344CB8AC3E}">
-        <p14:creationId xmlns:p14="http://schemas.microsoft.com/office/powerpoint/2010/main" val="2443700564"/>
+        <p14:creationId xmlns:p14="http://schemas.microsoft.com/office/powerpoint/2010/main" val="875289672"/>
       </p:ext>
     </p:extLst>
   </p:cSld>
   <p:clrMapOvr>
     <a:masterClrMapping/>
   </p:clrMapOvr>
-  <p:timing>
-    <p:tnLst>
-      <p:par>
-        <p:cTn id="1" dur="indefinite" restart="never" nodeType="tmRoot"/>
-      </p:par>
-    </p:tnLst>
-  </p:timing>
 </p:sld>
 </file>
 

</xml_diff>

<commit_message>
Revisions to slide #11 to remove "advisement"/"failure" categorization
</commit_message>
<xml_diff>
--- a/NCH-PEDMATCH - Integration Walkthrough.pptx
+++ b/NCH-PEDMATCH - Integration Walkthrough.pptx
@@ -3413,11 +3413,7 @@
           <a:p>
             <a:r>
               <a:rPr lang="en-US" sz="3600" dirty="0" smtClean="0"/>
-              <a:t>“Workflow Exception” </a:t>
-            </a:r>
-            <a:r>
-              <a:rPr lang="en-US" sz="3600" dirty="0" smtClean="0"/>
-              <a:t>Integration Message</a:t>
+              <a:t>“Workflow Exception” Integration Message</a:t>
             </a:r>
             <a:endParaRPr lang="en-US" sz="3600" dirty="0"/>
           </a:p>
@@ -3564,7 +3560,11 @@
           <a:p>
             <a:r>
               <a:rPr lang="en-US" sz="3600" dirty="0" smtClean="0"/>
-              <a:t>Workflow Exception/Advisement Scenarios</a:t>
+              <a:t>Workflow </a:t>
+            </a:r>
+            <a:r>
+              <a:rPr lang="en-US" sz="3600" dirty="0" smtClean="0"/>
+              <a:t>Exception Scenarios</a:t>
             </a:r>
             <a:endParaRPr lang="en-US" sz="3600" dirty="0"/>
           </a:p>
@@ -3594,8 +3594,13 @@
           <a:p>
             <a:r>
               <a:rPr lang="en-US" dirty="0" smtClean="0"/>
-              <a:t>Specimen Adequacy Advisements</a:t>
-            </a:r>
+              <a:t>Specimen </a:t>
+            </a:r>
+            <a:r>
+              <a:rPr lang="en-US" dirty="0" smtClean="0"/>
+              <a:t>Adequacy</a:t>
+            </a:r>
+            <a:endParaRPr lang="en-US" dirty="0" smtClean="0"/>
           </a:p>
           <a:p>
             <a:pPr lvl="1"/>
@@ -3628,8 +3633,13 @@
           <a:p>
             <a:r>
               <a:rPr lang="en-US" dirty="0" smtClean="0"/>
-              <a:t>Pathology Review Advisements</a:t>
-            </a:r>
+              <a:t>Pathology </a:t>
+            </a:r>
+            <a:r>
+              <a:rPr lang="en-US" dirty="0" smtClean="0"/>
+              <a:t>Review</a:t>
+            </a:r>
+            <a:endParaRPr lang="en-US" dirty="0" smtClean="0"/>
           </a:p>
           <a:p>
             <a:pPr lvl="1"/>
@@ -3649,14 +3659,18 @@
           <a:p>
             <a:r>
               <a:rPr lang="en-US" dirty="0" smtClean="0"/>
-              <a:t>Extraction Advisements</a:t>
+              <a:t>Extraction</a:t>
             </a:r>
           </a:p>
           <a:p>
             <a:pPr lvl="1"/>
             <a:r>
               <a:rPr lang="en-US" dirty="0" smtClean="0"/>
-              <a:t>Low Yield / QNS</a:t>
+              <a:t>Low </a:t>
+            </a:r>
+            <a:r>
+              <a:rPr lang="en-US" dirty="0" smtClean="0"/>
+              <a:t>Yield / QNS</a:t>
             </a:r>
           </a:p>
           <a:p>
@@ -3676,8 +3690,13 @@
           <a:p>
             <a:r>
               <a:rPr lang="en-US" dirty="0" smtClean="0"/>
-              <a:t>Patient Advisements</a:t>
-            </a:r>
+              <a:t>Patient </a:t>
+            </a:r>
+            <a:r>
+              <a:rPr lang="en-US" dirty="0" smtClean="0"/>
+              <a:t>Issues</a:t>
+            </a:r>
+            <a:endParaRPr lang="en-US" dirty="0" smtClean="0"/>
           </a:p>
           <a:p>
             <a:pPr lvl="1"/>
@@ -6666,7 +6685,6 @@
               <a:rPr lang="en-US" dirty="0" smtClean="0"/>
               <a:t>Workflow Exception</a:t>
             </a:r>
-            <a:endParaRPr lang="en-US" dirty="0" smtClean="0"/>
           </a:p>
           <a:p>
             <a:pPr lvl="1"/>
@@ -6694,17 +6712,12 @@
               <a:rPr lang="en-US" dirty="0" smtClean="0"/>
               <a:t>Workflow Exception Severity</a:t>
             </a:r>
-            <a:endParaRPr lang="en-US" dirty="0" smtClean="0"/>
           </a:p>
           <a:p>
             <a:pPr lvl="1"/>
             <a:r>
               <a:rPr lang="en-US" dirty="0" smtClean="0"/>
-              <a:t>“Advisement” = C</a:t>
-            </a:r>
-            <a:r>
-              <a:rPr lang="en-US" dirty="0" smtClean="0"/>
-              <a:t>orrectable situation or status update</a:t>
+              <a:t>“Advisement” = Correctable situation or status update</a:t>
             </a:r>
           </a:p>
           <a:p>
@@ -6721,7 +6734,6 @@
               <a:rPr lang="en-US" dirty="0" smtClean="0"/>
               <a:t>-MATCH)</a:t>
             </a:r>
-            <a:endParaRPr lang="en-US" dirty="0" smtClean="0"/>
           </a:p>
           <a:p>
             <a:r>
@@ -6751,7 +6763,6 @@
               <a:rPr lang="en-US" dirty="0" smtClean="0"/>
               <a:t>”); semantics still being defined—future draft will propose</a:t>
             </a:r>
-            <a:endParaRPr lang="en-US" dirty="0" smtClean="0"/>
           </a:p>
           <a:p>
             <a:pPr lvl="1"/>
@@ -6765,13 +6776,8 @@
             </a:r>
             <a:r>
               <a:rPr lang="en-US" dirty="0" smtClean="0"/>
-              <a:t>” with additional details to help understand the context of the exception (e.g., “Specimen appears to have been contaminated</a:t>
-            </a:r>
-            <a:r>
-              <a:rPr lang="en-US" dirty="0" smtClean="0"/>
-              <a:t>”)</a:t>
-            </a:r>
-            <a:endParaRPr lang="en-US" dirty="0" smtClean="0"/>
+              <a:t>” with additional details to help understand the context of the exception (e.g., “Specimen appears to have been contaminated”)</a:t>
+            </a:r>
           </a:p>
         </p:txBody>
       </p:sp>

</xml_diff>

<commit_message>
Updates prior to JGF meeting
</commit_message>
<xml_diff>
--- a/NCH-PEDMATCH - Integration Walkthrough.pptx
+++ b/NCH-PEDMATCH - Integration Walkthrough.pptx
@@ -3340,17 +3340,13 @@
           <a:p>
             <a:r>
               <a:rPr lang="en-US" dirty="0" smtClean="0"/>
-              <a:t>Integration Overview, </a:t>
-            </a:r>
-            <a:r>
-              <a:rPr lang="en-US" dirty="0" smtClean="0"/>
-              <a:t>v1.1-draft</a:t>
+              <a:t>Integration Overview, v1.0-draft</a:t>
             </a:r>
           </a:p>
           <a:p>
             <a:r>
               <a:rPr lang="en-US" sz="2000" i="1" dirty="0" smtClean="0"/>
-              <a:t>Last revised, 5/12/2016, ESK</a:t>
+              <a:t>Last revised, 5/9/2016, ESK</a:t>
             </a:r>
             <a:endParaRPr lang="en-US" sz="2000" i="1" dirty="0"/>
           </a:p>

</xml_diff>

<commit_message>
Changed for JGF presentation
</commit_message>
<xml_diff>
--- a/NCH-PEDMATCH - Integration Walkthrough.pptx
+++ b/NCH-PEDMATCH - Integration Walkthrough.pptx
@@ -3340,13 +3340,17 @@
           <a:p>
             <a:r>
               <a:rPr lang="en-US" dirty="0" smtClean="0"/>
-              <a:t>Integration Overview, v1.0-draft</a:t>
+              <a:t>Integration Overview, </a:t>
+            </a:r>
+            <a:r>
+              <a:rPr lang="en-US" dirty="0" smtClean="0"/>
+              <a:t>v1.1-draft</a:t>
             </a:r>
           </a:p>
           <a:p>
             <a:r>
               <a:rPr lang="en-US" sz="2000" i="1" dirty="0" smtClean="0"/>
-              <a:t>Last revised, 5/9/2016, ESK</a:t>
+              <a:t>Last revised, 5/12/2016, ESK</a:t>
             </a:r>
             <a:endParaRPr lang="en-US" sz="2000" i="1" dirty="0"/>
           </a:p>

</xml_diff>